<commit_message>
Working on seminar presentation
</commit_message>
<xml_diff>
--- a/papers/seminar.pptx
+++ b/papers/seminar.pptx
@@ -15,9 +15,13 @@
     <p:sldId id="266" r:id="rId9"/>
     <p:sldId id="267" r:id="rId10"/>
     <p:sldId id="264" r:id="rId11"/>
-    <p:sldId id="260" r:id="rId12"/>
-    <p:sldId id="261" r:id="rId13"/>
-    <p:sldId id="262" r:id="rId14"/>
+    <p:sldId id="269" r:id="rId12"/>
+    <p:sldId id="271" r:id="rId13"/>
+    <p:sldId id="270" r:id="rId14"/>
+    <p:sldId id="260" r:id="rId15"/>
+    <p:sldId id="268" r:id="rId16"/>
+    <p:sldId id="261" r:id="rId17"/>
+    <p:sldId id="262" r:id="rId18"/>
   </p:sldIdLst>
   <p:sldSz cx="12192000" cy="6858000"/>
   <p:notesSz cx="6858000" cy="9144000"/>
@@ -12125,7 +12129,7 @@
           <a:lstStyle/>
           <a:p>
             <a:pPr algn="ctr"/>
-            <a:endParaRPr lang="en-US"/>
+            <a:endParaRPr lang="en-US" dirty="0"/>
           </a:p>
         </p:txBody>
       </p:sp>
@@ -12218,36 +12222,673 @@
           <a:lstStyle/>
           <a:p>
             <a:r>
-              <a:rPr lang="en-US" sz="3600" dirty="0" smtClean="0"/>
-              <a:t>Results</a:t>
+              <a:rPr lang="en-US" dirty="0" smtClean="0"/>
+              <a:t>Loss Function</a:t>
             </a:r>
             <a:endParaRPr lang="en-US" sz="3600" dirty="0"/>
           </a:p>
         </p:txBody>
       </p:sp>
-      <p:sp>
-        <p:nvSpPr>
-          <p:cNvPr id="3" name="Text Placeholder 2"/>
-          <p:cNvSpPr>
-            <a:spLocks noGrp="1"/>
-          </p:cNvSpPr>
-          <p:nvPr>
-            <p:ph type="body" idx="1"/>
-          </p:nvPr>
-        </p:nvSpPr>
-        <p:spPr/>
-        <p:txBody>
-          <a:bodyPr/>
-          <a:lstStyle/>
-          <a:p>
-            <a:endParaRPr lang="en-CA" dirty="0"/>
-          </a:p>
-        </p:txBody>
-      </p:sp>
+      <mc:AlternateContent xmlns:mc="http://schemas.openxmlformats.org/markup-compatibility/2006">
+        <mc:Choice xmlns:a14="http://schemas.microsoft.com/office/drawing/2010/main" Requires="a14">
+          <p:sp>
+            <p:nvSpPr>
+              <p:cNvPr id="4" name="TextBox 3"/>
+              <p:cNvSpPr txBox="1"/>
+              <p:nvPr/>
+            </p:nvSpPr>
+            <p:spPr>
+              <a:xfrm>
+                <a:off x="500743" y="2381795"/>
+                <a:ext cx="5941306" cy="1036502"/>
+              </a:xfrm>
+              <a:prstGeom prst="rect">
+                <a:avLst/>
+              </a:prstGeom>
+              <a:noFill/>
+            </p:spPr>
+            <p:txBody>
+              <a:bodyPr wrap="none" lIns="0" tIns="0" rIns="0" bIns="0" rtlCol="0">
+                <a:spAutoFit/>
+              </a:bodyPr>
+              <a:lstStyle/>
+              <a:p>
+                <a14:m>
+                  <m:oMathPara xmlns:m="http://schemas.openxmlformats.org/officeDocument/2006/math">
+                    <m:oMathParaPr>
+                      <m:jc m:val="centerGroup"/>
+                    </m:oMathParaPr>
+                    <m:oMath xmlns:m="http://schemas.openxmlformats.org/officeDocument/2006/math">
+                      <m:sSub>
+                        <m:sSubPr>
+                          <m:ctrlPr>
+                            <a:rPr lang="en-CA" sz="2400" i="1" smtClean="0">
+                              <a:latin typeface="Cambria Math" panose="02040503050406030204" pitchFamily="18" charset="0"/>
+                            </a:rPr>
+                          </m:ctrlPr>
+                        </m:sSubPr>
+                        <m:e>
+                          <m:r>
+                            <a:rPr lang="en-US" sz="2400" b="0" i="1" smtClean="0">
+                              <a:latin typeface="Cambria Math" panose="02040503050406030204" pitchFamily="18" charset="0"/>
+                            </a:rPr>
+                            <m:t>𝐿</m:t>
+                          </m:r>
+                        </m:e>
+                        <m:sub>
+                          <m:r>
+                            <a:rPr lang="en-US" sz="2400" b="0" i="1" smtClean="0">
+                              <a:latin typeface="Cambria Math" panose="02040503050406030204" pitchFamily="18" charset="0"/>
+                            </a:rPr>
+                            <m:t>𝑎𝑐𝑐</m:t>
+                          </m:r>
+                        </m:sub>
+                      </m:sSub>
+                      <m:r>
+                        <a:rPr lang="en-US" sz="2400" b="0" i="1" smtClean="0">
+                          <a:latin typeface="Cambria Math" panose="02040503050406030204" pitchFamily="18" charset="0"/>
+                        </a:rPr>
+                        <m:t>=</m:t>
+                      </m:r>
+                      <m:f>
+                        <m:fPr>
+                          <m:ctrlPr>
+                            <a:rPr lang="en-US" sz="2400" b="0" i="1" smtClean="0">
+                              <a:latin typeface="Cambria Math" panose="02040503050406030204" pitchFamily="18" charset="0"/>
+                            </a:rPr>
+                          </m:ctrlPr>
+                        </m:fPr>
+                        <m:num>
+                          <m:r>
+                            <a:rPr lang="en-US" sz="2400" b="0" i="1" smtClean="0">
+                              <a:latin typeface="Cambria Math" panose="02040503050406030204" pitchFamily="18" charset="0"/>
+                            </a:rPr>
+                            <m:t>1</m:t>
+                          </m:r>
+                        </m:num>
+                        <m:den>
+                          <m:r>
+                            <a:rPr lang="en-US" sz="2400" b="0" i="1" smtClean="0">
+                              <a:latin typeface="Cambria Math" panose="02040503050406030204" pitchFamily="18" charset="0"/>
+                            </a:rPr>
+                            <m:t>𝑛</m:t>
+                          </m:r>
+                        </m:den>
+                      </m:f>
+                      <m:nary>
+                        <m:naryPr>
+                          <m:chr m:val="∑"/>
+                          <m:supHide m:val="on"/>
+                          <m:ctrlPr>
+                            <a:rPr lang="en-US" sz="2400" b="0" i="1" smtClean="0">
+                              <a:latin typeface="Cambria Math" panose="02040503050406030204" pitchFamily="18" charset="0"/>
+                            </a:rPr>
+                          </m:ctrlPr>
+                        </m:naryPr>
+                        <m:sub>
+                          <m:r>
+                            <m:rPr>
+                              <m:brk m:alnAt="7"/>
+                            </m:rPr>
+                            <a:rPr lang="en-US" sz="2400" b="0" i="1" smtClean="0">
+                              <a:latin typeface="Cambria Math" panose="02040503050406030204" pitchFamily="18" charset="0"/>
+                            </a:rPr>
+                            <m:t>𝑈</m:t>
+                          </m:r>
+                          <m:r>
+                            <a:rPr lang="en-US" sz="2400" b="0" i="1" smtClean="0">
+                              <a:latin typeface="Cambria Math" panose="02040503050406030204" pitchFamily="18" charset="0"/>
+                            </a:rPr>
+                            <m:t>=</m:t>
+                          </m:r>
+                          <m:r>
+                            <a:rPr lang="en-US" sz="2400" b="0" i="1" smtClean="0">
+                              <a:latin typeface="Cambria Math" panose="02040503050406030204" pitchFamily="18" charset="0"/>
+                            </a:rPr>
+                            <m:t>𝑆</m:t>
+                          </m:r>
+                          <m:r>
+                            <a:rPr lang="en-US" sz="2400" b="0" i="1" smtClean="0">
+                              <a:latin typeface="Cambria Math" panose="02040503050406030204" pitchFamily="18" charset="0"/>
+                            </a:rPr>
+                            <m:t>,</m:t>
+                          </m:r>
+                          <m:r>
+                            <a:rPr lang="en-US" sz="2400" b="0" i="1" smtClean="0">
+                              <a:latin typeface="Cambria Math" panose="02040503050406030204" pitchFamily="18" charset="0"/>
+                            </a:rPr>
+                            <m:t>𝐼</m:t>
+                          </m:r>
+                          <m:r>
+                            <a:rPr lang="en-US" sz="2400" b="0" i="1" smtClean="0">
+                              <a:latin typeface="Cambria Math" panose="02040503050406030204" pitchFamily="18" charset="0"/>
+                            </a:rPr>
+                            <m:t>,</m:t>
+                          </m:r>
+                          <m:r>
+                            <a:rPr lang="en-US" sz="2400" b="0" i="1" smtClean="0">
+                              <a:latin typeface="Cambria Math" panose="02040503050406030204" pitchFamily="18" charset="0"/>
+                            </a:rPr>
+                            <m:t>𝑀</m:t>
+                          </m:r>
+                        </m:sub>
+                        <m:sup/>
+                        <m:e>
+                          <m:f>
+                            <m:fPr>
+                              <m:ctrlPr>
+                                <a:rPr lang="en-US" sz="2400" i="1">
+                                  <a:latin typeface="Cambria Math" panose="02040503050406030204" pitchFamily="18" charset="0"/>
+                                </a:rPr>
+                              </m:ctrlPr>
+                            </m:fPr>
+                            <m:num>
+                              <m:r>
+                                <a:rPr lang="en-US" sz="2400" i="1">
+                                  <a:latin typeface="Cambria Math" panose="02040503050406030204" pitchFamily="18" charset="0"/>
+                                </a:rPr>
+                                <m:t>1</m:t>
+                              </m:r>
+                            </m:num>
+                            <m:den>
+                              <m:r>
+                                <a:rPr lang="en-US" sz="2400" i="1">
+                                  <a:latin typeface="Cambria Math" panose="02040503050406030204" pitchFamily="18" charset="0"/>
+                                </a:rPr>
+                                <m:t>(</m:t>
+                              </m:r>
+                              <m:sSub>
+                                <m:sSubPr>
+                                  <m:ctrlPr>
+                                    <a:rPr lang="en-US" sz="2400" i="1">
+                                      <a:latin typeface="Cambria Math" panose="02040503050406030204" pitchFamily="18" charset="0"/>
+                                    </a:rPr>
+                                  </m:ctrlPr>
+                                </m:sSubPr>
+                                <m:e>
+                                  <m:r>
+                                    <a:rPr lang="en-US" sz="2400" i="1">
+                                      <a:latin typeface="Cambria Math" panose="02040503050406030204" pitchFamily="18" charset="0"/>
+                                    </a:rPr>
+                                    <m:t>𝑈</m:t>
+                                  </m:r>
+                                </m:e>
+                                <m:sub>
+                                  <m:r>
+                                    <a:rPr lang="en-US" sz="2400" i="1">
+                                      <a:latin typeface="Cambria Math" panose="02040503050406030204" pitchFamily="18" charset="0"/>
+                                    </a:rPr>
+                                    <m:t>𝑚𝑎𝑥</m:t>
+                                  </m:r>
+                                </m:sub>
+                              </m:sSub>
+                              <m:r>
+                                <a:rPr lang="en-US" sz="2400" i="1">
+                                  <a:latin typeface="Cambria Math" panose="02040503050406030204" pitchFamily="18" charset="0"/>
+                                </a:rPr>
+                                <m:t>−</m:t>
+                              </m:r>
+                              <m:sSub>
+                                <m:sSubPr>
+                                  <m:ctrlPr>
+                                    <a:rPr lang="en-US" sz="2400" i="1">
+                                      <a:latin typeface="Cambria Math" panose="02040503050406030204" pitchFamily="18" charset="0"/>
+                                    </a:rPr>
+                                  </m:ctrlPr>
+                                </m:sSubPr>
+                                <m:e>
+                                  <m:r>
+                                    <a:rPr lang="en-US" sz="2400" i="1">
+                                      <a:latin typeface="Cambria Math" panose="02040503050406030204" pitchFamily="18" charset="0"/>
+                                    </a:rPr>
+                                    <m:t>𝑈</m:t>
+                                  </m:r>
+                                </m:e>
+                                <m:sub>
+                                  <m:r>
+                                    <a:rPr lang="en-US" sz="2400" i="1">
+                                      <a:latin typeface="Cambria Math" panose="02040503050406030204" pitchFamily="18" charset="0"/>
+                                    </a:rPr>
+                                    <m:t>𝑚𝑖𝑛</m:t>
+                                  </m:r>
+                                </m:sub>
+                              </m:sSub>
+                              <m:r>
+                                <a:rPr lang="en-US" sz="2400" i="1">
+                                  <a:latin typeface="Cambria Math" panose="02040503050406030204" pitchFamily="18" charset="0"/>
+                                </a:rPr>
+                                <m:t>)</m:t>
+                              </m:r>
+                            </m:den>
+                          </m:f>
+                          <m:nary>
+                            <m:naryPr>
+                              <m:chr m:val="∑"/>
+                              <m:ctrlPr>
+                                <a:rPr lang="en-US" sz="2400" i="1">
+                                  <a:latin typeface="Cambria Math" panose="02040503050406030204" pitchFamily="18" charset="0"/>
+                                </a:rPr>
+                              </m:ctrlPr>
+                            </m:naryPr>
+                            <m:sub>
+                              <m:r>
+                                <m:rPr>
+                                  <m:brk m:alnAt="23"/>
+                                </m:rPr>
+                                <a:rPr lang="en-US" sz="2400" i="1">
+                                  <a:latin typeface="Cambria Math" panose="02040503050406030204" pitchFamily="18" charset="0"/>
+                                </a:rPr>
+                                <m:t>𝑖</m:t>
+                              </m:r>
+                              <m:r>
+                                <a:rPr lang="en-US" sz="2400" i="1">
+                                  <a:latin typeface="Cambria Math" panose="02040503050406030204" pitchFamily="18" charset="0"/>
+                                </a:rPr>
+                                <m:t>=1</m:t>
+                              </m:r>
+                            </m:sub>
+                            <m:sup>
+                              <m:r>
+                                <a:rPr lang="en-US" sz="2400" i="1">
+                                  <a:latin typeface="Cambria Math" panose="02040503050406030204" pitchFamily="18" charset="0"/>
+                                </a:rPr>
+                                <m:t>𝑛</m:t>
+                              </m:r>
+                            </m:sup>
+                            <m:e>
+                              <m:sSup>
+                                <m:sSupPr>
+                                  <m:ctrlPr>
+                                    <a:rPr lang="en-US" sz="2400" i="1">
+                                      <a:latin typeface="Cambria Math" panose="02040503050406030204" pitchFamily="18" charset="0"/>
+                                    </a:rPr>
+                                  </m:ctrlPr>
+                                </m:sSupPr>
+                                <m:e>
+                                  <m:r>
+                                    <a:rPr lang="en-US" sz="2400" i="1">
+                                      <a:latin typeface="Cambria Math" panose="02040503050406030204" pitchFamily="18" charset="0"/>
+                                    </a:rPr>
+                                    <m:t>(</m:t>
+                                  </m:r>
+                                  <m:sSub>
+                                    <m:sSubPr>
+                                      <m:ctrlPr>
+                                        <a:rPr lang="en-US" sz="2400" i="1">
+                                          <a:latin typeface="Cambria Math" panose="02040503050406030204" pitchFamily="18" charset="0"/>
+                                        </a:rPr>
+                                      </m:ctrlPr>
+                                    </m:sSubPr>
+                                    <m:e>
+                                      <m:r>
+                                        <a:rPr lang="en-US" sz="2400" i="1">
+                                          <a:latin typeface="Cambria Math" panose="02040503050406030204" pitchFamily="18" charset="0"/>
+                                        </a:rPr>
+                                        <m:t>𝑈</m:t>
+                                      </m:r>
+                                    </m:e>
+                                    <m:sub>
+                                      <m:r>
+                                        <a:rPr lang="en-US" sz="2400" i="1">
+                                          <a:latin typeface="Cambria Math" panose="02040503050406030204" pitchFamily="18" charset="0"/>
+                                        </a:rPr>
+                                        <m:t>𝑖</m:t>
+                                      </m:r>
+                                    </m:sub>
+                                  </m:sSub>
+                                  <m:r>
+                                    <a:rPr lang="en-US" sz="2400" i="1">
+                                      <a:latin typeface="Cambria Math" panose="02040503050406030204" pitchFamily="18" charset="0"/>
+                                    </a:rPr>
+                                    <m:t>−</m:t>
+                                  </m:r>
+                                  <m:sSub>
+                                    <m:sSubPr>
+                                      <m:ctrlPr>
+                                        <a:rPr lang="en-US" sz="2400" i="1">
+                                          <a:latin typeface="Cambria Math" panose="02040503050406030204" pitchFamily="18" charset="0"/>
+                                        </a:rPr>
+                                      </m:ctrlPr>
+                                    </m:sSubPr>
+                                    <m:e>
+                                      <m:acc>
+                                        <m:accPr>
+                                          <m:chr m:val="̅"/>
+                                          <m:ctrlPr>
+                                            <a:rPr lang="en-US" sz="2400" i="1">
+                                              <a:latin typeface="Cambria Math" panose="02040503050406030204" pitchFamily="18" charset="0"/>
+                                            </a:rPr>
+                                          </m:ctrlPr>
+                                        </m:accPr>
+                                        <m:e>
+                                          <m:r>
+                                            <a:rPr lang="en-US" sz="2400" i="1">
+                                              <a:latin typeface="Cambria Math" panose="02040503050406030204" pitchFamily="18" charset="0"/>
+                                            </a:rPr>
+                                            <m:t>𝑈</m:t>
+                                          </m:r>
+                                        </m:e>
+                                      </m:acc>
+                                    </m:e>
+                                    <m:sub>
+                                      <m:r>
+                                        <a:rPr lang="en-US" sz="2400" i="1">
+                                          <a:latin typeface="Cambria Math" panose="02040503050406030204" pitchFamily="18" charset="0"/>
+                                        </a:rPr>
+                                        <m:t>𝑖</m:t>
+                                      </m:r>
+                                    </m:sub>
+                                  </m:sSub>
+                                  <m:r>
+                                    <a:rPr lang="en-US" sz="2400" i="1">
+                                      <a:latin typeface="Cambria Math" panose="02040503050406030204" pitchFamily="18" charset="0"/>
+                                    </a:rPr>
+                                    <m:t>)</m:t>
+                                  </m:r>
+                                </m:e>
+                                <m:sup>
+                                  <m:r>
+                                    <a:rPr lang="en-US" sz="2400" i="1">
+                                      <a:latin typeface="Cambria Math" panose="02040503050406030204" pitchFamily="18" charset="0"/>
+                                    </a:rPr>
+                                    <m:t>2</m:t>
+                                  </m:r>
+                                </m:sup>
+                              </m:sSup>
+                            </m:e>
+                          </m:nary>
+                        </m:e>
+                      </m:nary>
+                    </m:oMath>
+                  </m:oMathPara>
+                </a14:m>
+                <a:endParaRPr lang="en-CA" sz="2400" dirty="0"/>
+              </a:p>
+            </p:txBody>
+          </p:sp>
+        </mc:Choice>
+        <mc:Fallback>
+          <p:sp>
+            <p:nvSpPr>
+              <p:cNvPr id="4" name="TextBox 3"/>
+              <p:cNvSpPr txBox="1">
+                <a:spLocks noRot="1" noChangeAspect="1" noMove="1" noResize="1" noEditPoints="1" noAdjustHandles="1" noChangeArrowheads="1" noChangeShapeType="1" noTextEdit="1"/>
+              </p:cNvSpPr>
+              <p:nvPr/>
+            </p:nvSpPr>
+            <p:spPr>
+              <a:xfrm>
+                <a:off x="500743" y="2381795"/>
+                <a:ext cx="5941306" cy="1036502"/>
+              </a:xfrm>
+              <a:prstGeom prst="rect">
+                <a:avLst/>
+              </a:prstGeom>
+              <a:blipFill rotWithShape="0">
+                <a:blip r:embed="rId2"/>
+                <a:stretch>
+                  <a:fillRect/>
+                </a:stretch>
+              </a:blipFill>
+            </p:spPr>
+            <p:txBody>
+              <a:bodyPr/>
+              <a:lstStyle/>
+              <a:p>
+                <a:r>
+                  <a:rPr lang="en-CA">
+                    <a:noFill/>
+                  </a:rPr>
+                  <a:t> </a:t>
+                </a:r>
+              </a:p>
+            </p:txBody>
+          </p:sp>
+        </mc:Fallback>
+      </mc:AlternateContent>
+      <mc:AlternateContent xmlns:mc="http://schemas.openxmlformats.org/markup-compatibility/2006">
+        <mc:Choice xmlns:a14="http://schemas.microsoft.com/office/drawing/2010/main" Requires="a14">
+          <p:sp>
+            <p:nvSpPr>
+              <p:cNvPr id="5" name="TextBox 4"/>
+              <p:cNvSpPr txBox="1"/>
+              <p:nvPr/>
+            </p:nvSpPr>
+            <p:spPr>
+              <a:xfrm>
+                <a:off x="500743" y="4093029"/>
+                <a:ext cx="5730240" cy="1200329"/>
+              </a:xfrm>
+              <a:prstGeom prst="rect">
+                <a:avLst/>
+              </a:prstGeom>
+              <a:noFill/>
+            </p:spPr>
+            <p:txBody>
+              <a:bodyPr wrap="square" rtlCol="0">
+                <a:spAutoFit/>
+              </a:bodyPr>
+              <a:lstStyle/>
+              <a:p>
+                <a14:m>
+                  <m:oMath xmlns:m="http://schemas.openxmlformats.org/officeDocument/2006/math">
+                    <m:r>
+                      <a:rPr lang="en-US" sz="2400" i="1" smtClean="0">
+                        <a:latin typeface="Cambria Math" panose="02040503050406030204" pitchFamily="18" charset="0"/>
+                      </a:rPr>
+                      <m:t>𝑛</m:t>
+                    </m:r>
+                    <m:r>
+                      <a:rPr lang="en-US" sz="2400" i="1" smtClean="0">
+                        <a:latin typeface="Cambria Math" panose="02040503050406030204" pitchFamily="18" charset="0"/>
+                      </a:rPr>
+                      <m:t> </m:t>
+                    </m:r>
+                  </m:oMath>
+                </a14:m>
+                <a:r>
+                  <a:rPr lang="en-US" sz="2400" dirty="0" smtClean="0"/>
+                  <a:t>: Number of observations</a:t>
+                </a:r>
+              </a:p>
+              <a:p>
+                <a14:m>
+                  <m:oMath xmlns:m="http://schemas.openxmlformats.org/officeDocument/2006/math">
+                    <m:sSub>
+                      <m:sSubPr>
+                        <m:ctrlPr>
+                          <a:rPr lang="en-US" sz="2400" i="1">
+                            <a:latin typeface="Cambria Math" panose="02040503050406030204" pitchFamily="18" charset="0"/>
+                          </a:rPr>
+                        </m:ctrlPr>
+                      </m:sSubPr>
+                      <m:e>
+                        <m:r>
+                          <a:rPr lang="en-US" sz="2400" i="1">
+                            <a:latin typeface="Cambria Math" panose="02040503050406030204" pitchFamily="18" charset="0"/>
+                          </a:rPr>
+                          <m:t>𝑈</m:t>
+                        </m:r>
+                      </m:e>
+                      <m:sub>
+                        <m:r>
+                          <a:rPr lang="en-US" sz="2400" i="1">
+                            <a:latin typeface="Cambria Math" panose="02040503050406030204" pitchFamily="18" charset="0"/>
+                          </a:rPr>
+                          <m:t>𝑖</m:t>
+                        </m:r>
+                      </m:sub>
+                    </m:sSub>
+                  </m:oMath>
+                </a14:m>
+                <a:r>
+                  <a:rPr lang="en-US" sz="2400" dirty="0" smtClean="0"/>
+                  <a:t>: </a:t>
+                </a:r>
+                <a14:m>
+                  <m:oMath xmlns:m="http://schemas.openxmlformats.org/officeDocument/2006/math">
+                    <m:r>
+                      <m:rPr>
+                        <m:brk m:alnAt="23"/>
+                      </m:rPr>
+                      <a:rPr lang="en-US" sz="2400" i="1">
+                        <a:latin typeface="Cambria Math" panose="02040503050406030204" pitchFamily="18" charset="0"/>
+                      </a:rPr>
+                      <m:t>𝑖</m:t>
+                    </m:r>
+                  </m:oMath>
+                </a14:m>
+                <a:r>
+                  <a:rPr lang="en-US" sz="2400" dirty="0" err="1" smtClean="0"/>
+                  <a:t>th</a:t>
+                </a:r>
+                <a:r>
+                  <a:rPr lang="en-US" sz="2400" dirty="0" smtClean="0"/>
+                  <a:t> observation of state</a:t>
+                </a:r>
+                <a14:m>
+                  <m:oMath xmlns:m="http://schemas.openxmlformats.org/officeDocument/2006/math">
+                    <m:r>
+                      <a:rPr lang="en-US" sz="2400" b="0" i="0" smtClean="0">
+                        <a:latin typeface="Cambria Math" panose="02040503050406030204" pitchFamily="18" charset="0"/>
+                      </a:rPr>
+                      <m:t> </m:t>
+                    </m:r>
+                    <m:r>
+                      <a:rPr lang="en-US" sz="2400" b="0" i="1" smtClean="0">
+                        <a:latin typeface="Cambria Math" panose="02040503050406030204" pitchFamily="18" charset="0"/>
+                      </a:rPr>
+                      <m:t>𝑈</m:t>
+                    </m:r>
+                  </m:oMath>
+                </a14:m>
+                <a:endParaRPr lang="en-US" sz="2400" dirty="0" smtClean="0"/>
+              </a:p>
+              <a:p>
+                <a14:m>
+                  <m:oMath xmlns:m="http://schemas.openxmlformats.org/officeDocument/2006/math">
+                    <m:sSub>
+                      <m:sSubPr>
+                        <m:ctrlPr>
+                          <a:rPr lang="en-US" sz="2400" i="1">
+                            <a:latin typeface="Cambria Math" panose="02040503050406030204" pitchFamily="18" charset="0"/>
+                          </a:rPr>
+                        </m:ctrlPr>
+                      </m:sSubPr>
+                      <m:e>
+                        <m:acc>
+                          <m:accPr>
+                            <m:chr m:val="̅"/>
+                            <m:ctrlPr>
+                              <a:rPr lang="en-US" sz="2400" i="1">
+                                <a:latin typeface="Cambria Math" panose="02040503050406030204" pitchFamily="18" charset="0"/>
+                              </a:rPr>
+                            </m:ctrlPr>
+                          </m:accPr>
+                          <m:e>
+                            <m:r>
+                              <a:rPr lang="en-US" sz="2400" i="1">
+                                <a:latin typeface="Cambria Math" panose="02040503050406030204" pitchFamily="18" charset="0"/>
+                              </a:rPr>
+                              <m:t>𝑈</m:t>
+                            </m:r>
+                          </m:e>
+                        </m:acc>
+                      </m:e>
+                      <m:sub>
+                        <m:r>
+                          <a:rPr lang="en-US" sz="2400" i="1">
+                            <a:latin typeface="Cambria Math" panose="02040503050406030204" pitchFamily="18" charset="0"/>
+                          </a:rPr>
+                          <m:t>𝑖</m:t>
+                        </m:r>
+                      </m:sub>
+                    </m:sSub>
+                  </m:oMath>
+                </a14:m>
+                <a:r>
+                  <a:rPr lang="en-US" sz="2400" dirty="0" smtClean="0"/>
+                  <a:t>: </a:t>
+                </a:r>
+                <a14:m>
+                  <m:oMath xmlns:m="http://schemas.openxmlformats.org/officeDocument/2006/math">
+                    <m:r>
+                      <m:rPr>
+                        <m:brk m:alnAt="23"/>
+                      </m:rPr>
+                      <a:rPr lang="en-US" sz="2400" i="1">
+                        <a:latin typeface="Cambria Math" panose="02040503050406030204" pitchFamily="18" charset="0"/>
+                      </a:rPr>
+                      <m:t>𝑖</m:t>
+                    </m:r>
+                  </m:oMath>
+                </a14:m>
+                <a:r>
+                  <a:rPr lang="en-US" sz="2400" dirty="0" err="1" smtClean="0"/>
+                  <a:t>th</a:t>
+                </a:r>
+                <a:r>
+                  <a:rPr lang="en-US" sz="2400" dirty="0" smtClean="0"/>
+                  <a:t> UDE approximation of state </a:t>
+                </a:r>
+                <a14:m>
+                  <m:oMath xmlns:m="http://schemas.openxmlformats.org/officeDocument/2006/math">
+                    <m:r>
+                      <a:rPr lang="en-US" sz="2400" i="1">
+                        <a:latin typeface="Cambria Math" panose="02040503050406030204" pitchFamily="18" charset="0"/>
+                      </a:rPr>
+                      <m:t>𝑈</m:t>
+                    </m:r>
+                  </m:oMath>
+                </a14:m>
+                <a:endParaRPr lang="en-US" sz="2400" dirty="0"/>
+              </a:p>
+            </p:txBody>
+          </p:sp>
+        </mc:Choice>
+        <mc:Fallback>
+          <p:sp>
+            <p:nvSpPr>
+              <p:cNvPr id="5" name="TextBox 4"/>
+              <p:cNvSpPr txBox="1">
+                <a:spLocks noRot="1" noChangeAspect="1" noMove="1" noResize="1" noEditPoints="1" noAdjustHandles="1" noChangeArrowheads="1" noChangeShapeType="1" noTextEdit="1"/>
+              </p:cNvSpPr>
+              <p:nvPr/>
+            </p:nvSpPr>
+            <p:spPr>
+              <a:xfrm>
+                <a:off x="500743" y="4093029"/>
+                <a:ext cx="5730240" cy="1200329"/>
+              </a:xfrm>
+              <a:prstGeom prst="rect">
+                <a:avLst/>
+              </a:prstGeom>
+              <a:blipFill rotWithShape="0">
+                <a:blip r:embed="rId3"/>
+                <a:stretch>
+                  <a:fillRect l="-213" t="-4061" b="-10660"/>
+                </a:stretch>
+              </a:blipFill>
+            </p:spPr>
+            <p:txBody>
+              <a:bodyPr/>
+              <a:lstStyle/>
+              <a:p>
+                <a:r>
+                  <a:rPr lang="en-CA">
+                    <a:noFill/>
+                  </a:rPr>
+                  <a:t> </a:t>
+                </a:r>
+              </a:p>
+            </p:txBody>
+          </p:sp>
+        </mc:Fallback>
+      </mc:AlternateContent>
     </p:spTree>
     <p:extLst>
       <p:ext uri="{BB962C8B-B14F-4D97-AF65-F5344CB8AC3E}">
-        <p14:creationId xmlns:p14="http://schemas.microsoft.com/office/powerpoint/2010/main" val="246905136"/>
+        <p14:creationId xmlns:p14="http://schemas.microsoft.com/office/powerpoint/2010/main" val="288256614"/>
       </p:ext>
     </p:extLst>
   </p:cSld>
@@ -12338,7 +12979,7 @@
           <a:lstStyle/>
           <a:p>
             <a:pPr algn="ctr"/>
-            <a:endParaRPr lang="en-US"/>
+            <a:endParaRPr lang="en-US" dirty="0"/>
           </a:p>
         </p:txBody>
       </p:sp>
@@ -12431,6 +13072,2013 @@
           <a:lstStyle/>
           <a:p>
             <a:r>
+              <a:rPr lang="en-US" dirty="0" smtClean="0"/>
+              <a:t>Loss Function</a:t>
+            </a:r>
+            <a:endParaRPr lang="en-US" sz="3600" dirty="0"/>
+          </a:p>
+        </p:txBody>
+      </p:sp>
+      <mc:AlternateContent xmlns:mc="http://schemas.openxmlformats.org/markup-compatibility/2006">
+        <mc:Choice xmlns:a14="http://schemas.microsoft.com/office/drawing/2010/main" Requires="a14">
+          <p:sp>
+            <p:nvSpPr>
+              <p:cNvPr id="4" name="TextBox 3"/>
+              <p:cNvSpPr txBox="1"/>
+              <p:nvPr/>
+            </p:nvSpPr>
+            <p:spPr>
+              <a:xfrm>
+                <a:off x="500743" y="2451467"/>
+                <a:ext cx="6997493" cy="1008225"/>
+              </a:xfrm>
+              <a:prstGeom prst="rect">
+                <a:avLst/>
+              </a:prstGeom>
+              <a:noFill/>
+            </p:spPr>
+            <p:txBody>
+              <a:bodyPr wrap="none" lIns="0" tIns="0" rIns="0" bIns="0" rtlCol="0">
+                <a:spAutoFit/>
+              </a:bodyPr>
+              <a:lstStyle/>
+              <a:p>
+                <a14:m>
+                  <m:oMathPara xmlns:m="http://schemas.openxmlformats.org/officeDocument/2006/math">
+                    <m:oMathParaPr>
+                      <m:jc m:val="centerGroup"/>
+                    </m:oMathParaPr>
+                    <m:oMath xmlns:m="http://schemas.openxmlformats.org/officeDocument/2006/math">
+                      <m:sSub>
+                        <m:sSubPr>
+                          <m:ctrlPr>
+                            <a:rPr lang="en-CA" sz="2400" i="1" smtClean="0">
+                              <a:latin typeface="Cambria Math" panose="02040503050406030204" pitchFamily="18" charset="0"/>
+                            </a:rPr>
+                          </m:ctrlPr>
+                        </m:sSubPr>
+                        <m:e>
+                          <m:r>
+                            <a:rPr lang="en-US" sz="2400" b="0" i="1" smtClean="0">
+                              <a:latin typeface="Cambria Math" panose="02040503050406030204" pitchFamily="18" charset="0"/>
+                            </a:rPr>
+                            <m:t>𝐿</m:t>
+                          </m:r>
+                        </m:e>
+                        <m:sub>
+                          <m:r>
+                            <a:rPr lang="en-CA" sz="2400" i="1" smtClean="0">
+                              <a:latin typeface="Cambria Math" panose="02040503050406030204" pitchFamily="18" charset="0"/>
+                              <a:ea typeface="Cambria Math" panose="02040503050406030204" pitchFamily="18" charset="0"/>
+                            </a:rPr>
+                            <m:t>𝛽</m:t>
+                          </m:r>
+                        </m:sub>
+                      </m:sSub>
+                      <m:r>
+                        <a:rPr lang="en-US" sz="2400" b="0" i="1" smtClean="0">
+                          <a:latin typeface="Cambria Math" panose="02040503050406030204" pitchFamily="18" charset="0"/>
+                        </a:rPr>
+                        <m:t>=</m:t>
+                      </m:r>
+                      <m:nary>
+                        <m:naryPr>
+                          <m:chr m:val="∑"/>
+                          <m:ctrlPr>
+                            <a:rPr lang="en-US" sz="2400" b="0" i="1" smtClean="0">
+                              <a:latin typeface="Cambria Math" panose="02040503050406030204" pitchFamily="18" charset="0"/>
+                            </a:rPr>
+                          </m:ctrlPr>
+                        </m:naryPr>
+                        <m:sub>
+                          <m:r>
+                            <m:rPr>
+                              <m:brk m:alnAt="23"/>
+                            </m:rPr>
+                            <a:rPr lang="en-US" sz="2400" b="0" i="1" smtClean="0">
+                              <a:latin typeface="Cambria Math" panose="02040503050406030204" pitchFamily="18" charset="0"/>
+                            </a:rPr>
+                            <m:t>𝑖</m:t>
+                          </m:r>
+                          <m:r>
+                            <a:rPr lang="en-US" sz="2400" b="0" i="1" smtClean="0">
+                              <a:latin typeface="Cambria Math" panose="02040503050406030204" pitchFamily="18" charset="0"/>
+                            </a:rPr>
+                            <m:t>=1</m:t>
+                          </m:r>
+                        </m:sub>
+                        <m:sup>
+                          <m:r>
+                            <a:rPr lang="en-US" sz="2400" b="0" i="1" smtClean="0">
+                              <a:latin typeface="Cambria Math" panose="02040503050406030204" pitchFamily="18" charset="0"/>
+                            </a:rPr>
+                            <m:t>𝑚</m:t>
+                          </m:r>
+                        </m:sup>
+                        <m:e>
+                          <m:r>
+                            <a:rPr lang="en-US" sz="2400" b="0" i="1" smtClean="0">
+                              <a:latin typeface="Cambria Math" panose="02040503050406030204" pitchFamily="18" charset="0"/>
+                            </a:rPr>
+                            <m:t>𝑟𝑒𝑙𝑢</m:t>
+                          </m:r>
+                          <m:r>
+                            <a:rPr lang="en-US" sz="2400" b="0" i="1" smtClean="0">
+                              <a:latin typeface="Cambria Math" panose="02040503050406030204" pitchFamily="18" charset="0"/>
+                            </a:rPr>
+                            <m:t>(</m:t>
+                          </m:r>
+                          <m:d>
+                            <m:dPr>
+                              <m:ctrlPr>
+                                <a:rPr lang="en-US" sz="2400" b="0" i="1" smtClean="0">
+                                  <a:latin typeface="Cambria Math" panose="02040503050406030204" pitchFamily="18" charset="0"/>
+                                </a:rPr>
+                              </m:ctrlPr>
+                            </m:dPr>
+                            <m:e>
+                              <m:r>
+                                <a:rPr lang="en-US" sz="2400" b="0" i="1" smtClean="0">
+                                  <a:latin typeface="Cambria Math" panose="02040503050406030204" pitchFamily="18" charset="0"/>
+                                  <a:ea typeface="Cambria Math" panose="02040503050406030204" pitchFamily="18" charset="0"/>
+                                </a:rPr>
+                                <m:t>𝛽</m:t>
+                              </m:r>
+                              <m:d>
+                                <m:dPr>
+                                  <m:ctrlPr>
+                                    <a:rPr lang="en-US" sz="2400" b="0" i="1" smtClean="0">
+                                      <a:latin typeface="Cambria Math" panose="02040503050406030204" pitchFamily="18" charset="0"/>
+                                      <a:ea typeface="Cambria Math" panose="02040503050406030204" pitchFamily="18" charset="0"/>
+                                    </a:rPr>
+                                  </m:ctrlPr>
+                                </m:dPr>
+                                <m:e>
+                                  <m:sSub>
+                                    <m:sSubPr>
+                                      <m:ctrlPr>
+                                        <a:rPr lang="en-US" sz="2400" b="0" i="1" smtClean="0">
+                                          <a:latin typeface="Cambria Math" panose="02040503050406030204" pitchFamily="18" charset="0"/>
+                                          <a:ea typeface="Cambria Math" panose="02040503050406030204" pitchFamily="18" charset="0"/>
+                                        </a:rPr>
+                                      </m:ctrlPr>
+                                    </m:sSubPr>
+                                    <m:e>
+                                      <m:r>
+                                        <a:rPr lang="en-US" sz="2400" b="0" i="1" smtClean="0">
+                                          <a:latin typeface="Cambria Math" panose="02040503050406030204" pitchFamily="18" charset="0"/>
+                                          <a:ea typeface="Cambria Math" panose="02040503050406030204" pitchFamily="18" charset="0"/>
+                                        </a:rPr>
+                                        <m:t>𝑀</m:t>
+                                      </m:r>
+                                    </m:e>
+                                    <m:sub>
+                                      <m:r>
+                                        <a:rPr lang="en-US" sz="2400" b="0" i="1" smtClean="0">
+                                          <a:latin typeface="Cambria Math" panose="02040503050406030204" pitchFamily="18" charset="0"/>
+                                          <a:ea typeface="Cambria Math" panose="02040503050406030204" pitchFamily="18" charset="0"/>
+                                        </a:rPr>
+                                        <m:t>𝑖</m:t>
+                                      </m:r>
+                                    </m:sub>
+                                  </m:sSub>
+                                </m:e>
+                              </m:d>
+                              <m:r>
+                                <a:rPr lang="en-US" sz="2400" b="0" i="1" smtClean="0">
+                                  <a:latin typeface="Cambria Math" panose="02040503050406030204" pitchFamily="18" charset="0"/>
+                                </a:rPr>
+                                <m:t>−</m:t>
+                              </m:r>
+                              <m:r>
+                                <a:rPr lang="en-US" sz="2400" b="0" i="1" smtClean="0">
+                                  <a:latin typeface="Cambria Math" panose="02040503050406030204" pitchFamily="18" charset="0"/>
+                                  <a:ea typeface="Cambria Math" panose="02040503050406030204" pitchFamily="18" charset="0"/>
+                                </a:rPr>
+                                <m:t>𝛽</m:t>
+                              </m:r>
+                              <m:d>
+                                <m:dPr>
+                                  <m:ctrlPr>
+                                    <a:rPr lang="en-US" sz="2400" b="0" i="1" smtClean="0">
+                                      <a:latin typeface="Cambria Math" panose="02040503050406030204" pitchFamily="18" charset="0"/>
+                                      <a:ea typeface="Cambria Math" panose="02040503050406030204" pitchFamily="18" charset="0"/>
+                                    </a:rPr>
+                                  </m:ctrlPr>
+                                </m:dPr>
+                                <m:e>
+                                  <m:sSub>
+                                    <m:sSubPr>
+                                      <m:ctrlPr>
+                                        <a:rPr lang="en-US" sz="2400" b="0" i="1" smtClean="0">
+                                          <a:latin typeface="Cambria Math" panose="02040503050406030204" pitchFamily="18" charset="0"/>
+                                          <a:ea typeface="Cambria Math" panose="02040503050406030204" pitchFamily="18" charset="0"/>
+                                        </a:rPr>
+                                      </m:ctrlPr>
+                                    </m:sSubPr>
+                                    <m:e>
+                                      <m:r>
+                                        <a:rPr lang="en-US" sz="2400" b="0" i="1" smtClean="0">
+                                          <a:latin typeface="Cambria Math" panose="02040503050406030204" pitchFamily="18" charset="0"/>
+                                          <a:ea typeface="Cambria Math" panose="02040503050406030204" pitchFamily="18" charset="0"/>
+                                        </a:rPr>
+                                        <m:t>𝑀</m:t>
+                                      </m:r>
+                                    </m:e>
+                                    <m:sub>
+                                      <m:r>
+                                        <a:rPr lang="en-US" sz="2400" b="0" i="1" smtClean="0">
+                                          <a:latin typeface="Cambria Math" panose="02040503050406030204" pitchFamily="18" charset="0"/>
+                                          <a:ea typeface="Cambria Math" panose="02040503050406030204" pitchFamily="18" charset="0"/>
+                                        </a:rPr>
+                                        <m:t>𝑖</m:t>
+                                      </m:r>
+                                    </m:sub>
+                                  </m:sSub>
+                                  <m:r>
+                                    <a:rPr lang="en-US" sz="2400" b="0" i="1" smtClean="0">
+                                      <a:latin typeface="Cambria Math" panose="02040503050406030204" pitchFamily="18" charset="0"/>
+                                      <a:ea typeface="Cambria Math" panose="02040503050406030204" pitchFamily="18" charset="0"/>
+                                    </a:rPr>
+                                    <m:t>+</m:t>
+                                  </m:r>
+                                  <m:r>
+                                    <a:rPr lang="en-US" sz="2400" b="0" i="1" smtClean="0">
+                                      <a:latin typeface="Cambria Math" panose="02040503050406030204" pitchFamily="18" charset="0"/>
+                                      <a:ea typeface="Cambria Math" panose="02040503050406030204" pitchFamily="18" charset="0"/>
+                                    </a:rPr>
+                                    <m:t>𝜖</m:t>
+                                  </m:r>
+                                </m:e>
+                              </m:d>
+                            </m:e>
+                          </m:d>
+                          <m:r>
+                            <a:rPr lang="en-US" sz="2400" b="0" i="1" smtClean="0">
+                              <a:latin typeface="Cambria Math" panose="02040503050406030204" pitchFamily="18" charset="0"/>
+                              <a:ea typeface="Cambria Math" panose="02040503050406030204" pitchFamily="18" charset="0"/>
+                            </a:rPr>
+                            <m:t>+</m:t>
+                          </m:r>
+                          <m:r>
+                            <a:rPr lang="en-US" sz="2400" b="0" i="1" smtClean="0">
+                              <a:latin typeface="Cambria Math" panose="02040503050406030204" pitchFamily="18" charset="0"/>
+                              <a:ea typeface="Cambria Math" panose="02040503050406030204" pitchFamily="18" charset="0"/>
+                            </a:rPr>
+                            <m:t>𝑟𝑒𝑙𝑢</m:t>
+                          </m:r>
+                          <m:r>
+                            <a:rPr lang="en-US" sz="2400" b="0" i="1" smtClean="0">
+                              <a:latin typeface="Cambria Math" panose="02040503050406030204" pitchFamily="18" charset="0"/>
+                              <a:ea typeface="Cambria Math" panose="02040503050406030204" pitchFamily="18" charset="0"/>
+                            </a:rPr>
+                            <m:t>(−</m:t>
+                          </m:r>
+                        </m:e>
+                      </m:nary>
+                      <m:r>
+                        <a:rPr lang="en-US" sz="2400" i="1">
+                          <a:latin typeface="Cambria Math" panose="02040503050406030204" pitchFamily="18" charset="0"/>
+                          <a:ea typeface="Cambria Math" panose="02040503050406030204" pitchFamily="18" charset="0"/>
+                        </a:rPr>
+                        <m:t>𝛽</m:t>
+                      </m:r>
+                      <m:d>
+                        <m:dPr>
+                          <m:ctrlPr>
+                            <a:rPr lang="en-US" sz="2400" i="1">
+                              <a:latin typeface="Cambria Math" panose="02040503050406030204" pitchFamily="18" charset="0"/>
+                              <a:ea typeface="Cambria Math" panose="02040503050406030204" pitchFamily="18" charset="0"/>
+                            </a:rPr>
+                          </m:ctrlPr>
+                        </m:dPr>
+                        <m:e>
+                          <m:sSub>
+                            <m:sSubPr>
+                              <m:ctrlPr>
+                                <a:rPr lang="en-US" sz="2400" i="1">
+                                  <a:latin typeface="Cambria Math" panose="02040503050406030204" pitchFamily="18" charset="0"/>
+                                  <a:ea typeface="Cambria Math" panose="02040503050406030204" pitchFamily="18" charset="0"/>
+                                </a:rPr>
+                              </m:ctrlPr>
+                            </m:sSubPr>
+                            <m:e>
+                              <m:r>
+                                <a:rPr lang="en-US" sz="2400" i="1">
+                                  <a:latin typeface="Cambria Math" panose="02040503050406030204" pitchFamily="18" charset="0"/>
+                                  <a:ea typeface="Cambria Math" panose="02040503050406030204" pitchFamily="18" charset="0"/>
+                                </a:rPr>
+                                <m:t>𝑀</m:t>
+                              </m:r>
+                            </m:e>
+                            <m:sub>
+                              <m:r>
+                                <a:rPr lang="en-US" sz="2400" i="1">
+                                  <a:latin typeface="Cambria Math" panose="02040503050406030204" pitchFamily="18" charset="0"/>
+                                  <a:ea typeface="Cambria Math" panose="02040503050406030204" pitchFamily="18" charset="0"/>
+                                </a:rPr>
+                                <m:t>𝑖</m:t>
+                              </m:r>
+                            </m:sub>
+                          </m:sSub>
+                        </m:e>
+                      </m:d>
+                      <m:r>
+                        <a:rPr lang="en-US" sz="2400" b="0" i="1" smtClean="0">
+                          <a:latin typeface="Cambria Math" panose="02040503050406030204" pitchFamily="18" charset="0"/>
+                          <a:ea typeface="Cambria Math" panose="02040503050406030204" pitchFamily="18" charset="0"/>
+                        </a:rPr>
+                        <m:t>)</m:t>
+                      </m:r>
+                    </m:oMath>
+                  </m:oMathPara>
+                </a14:m>
+                <a:endParaRPr lang="en-CA" sz="2400" dirty="0"/>
+              </a:p>
+            </p:txBody>
+          </p:sp>
+        </mc:Choice>
+        <mc:Fallback>
+          <p:sp>
+            <p:nvSpPr>
+              <p:cNvPr id="4" name="TextBox 3"/>
+              <p:cNvSpPr txBox="1">
+                <a:spLocks noRot="1" noChangeAspect="1" noMove="1" noResize="1" noEditPoints="1" noAdjustHandles="1" noChangeArrowheads="1" noChangeShapeType="1" noTextEdit="1"/>
+              </p:cNvSpPr>
+              <p:nvPr/>
+            </p:nvSpPr>
+            <p:spPr>
+              <a:xfrm>
+                <a:off x="500743" y="2451467"/>
+                <a:ext cx="6997493" cy="1008225"/>
+              </a:xfrm>
+              <a:prstGeom prst="rect">
+                <a:avLst/>
+              </a:prstGeom>
+              <a:blipFill rotWithShape="0">
+                <a:blip r:embed="rId2"/>
+                <a:stretch>
+                  <a:fillRect/>
+                </a:stretch>
+              </a:blipFill>
+            </p:spPr>
+            <p:txBody>
+              <a:bodyPr/>
+              <a:lstStyle/>
+              <a:p>
+                <a:r>
+                  <a:rPr lang="en-CA">
+                    <a:noFill/>
+                  </a:rPr>
+                  <a:t> </a:t>
+                </a:r>
+              </a:p>
+            </p:txBody>
+          </p:sp>
+        </mc:Fallback>
+      </mc:AlternateContent>
+      <mc:AlternateContent xmlns:mc="http://schemas.openxmlformats.org/markup-compatibility/2006">
+        <mc:Choice xmlns:a14="http://schemas.microsoft.com/office/drawing/2010/main" Requires="a14">
+          <p:sp>
+            <p:nvSpPr>
+              <p:cNvPr id="5" name="TextBox 4"/>
+              <p:cNvSpPr txBox="1"/>
+              <p:nvPr/>
+            </p:nvSpPr>
+            <p:spPr>
+              <a:xfrm>
+                <a:off x="500743" y="4093029"/>
+                <a:ext cx="5730240" cy="830997"/>
+              </a:xfrm>
+              <a:prstGeom prst="rect">
+                <a:avLst/>
+              </a:prstGeom>
+              <a:noFill/>
+            </p:spPr>
+            <p:txBody>
+              <a:bodyPr wrap="square" rtlCol="0">
+                <a:spAutoFit/>
+              </a:bodyPr>
+              <a:lstStyle/>
+              <a:p>
+                <a14:m>
+                  <m:oMath xmlns:m="http://schemas.openxmlformats.org/officeDocument/2006/math">
+                    <m:r>
+                      <a:rPr lang="en-US" sz="2400" b="0" i="1" smtClean="0">
+                        <a:latin typeface="Cambria Math" panose="02040503050406030204" pitchFamily="18" charset="0"/>
+                      </a:rPr>
+                      <m:t>𝑚</m:t>
+                    </m:r>
+                    <m:r>
+                      <a:rPr lang="en-US" sz="2400" i="1" smtClean="0">
+                        <a:latin typeface="Cambria Math" panose="02040503050406030204" pitchFamily="18" charset="0"/>
+                      </a:rPr>
+                      <m:t> </m:t>
+                    </m:r>
+                  </m:oMath>
+                </a14:m>
+                <a:r>
+                  <a:rPr lang="en-US" sz="2400" dirty="0" smtClean="0"/>
+                  <a:t>: Number of points sampled</a:t>
+                </a:r>
+              </a:p>
+              <a:p>
+                <a14:m>
+                  <m:oMath xmlns:m="http://schemas.openxmlformats.org/officeDocument/2006/math">
+                    <m:sSub>
+                      <m:sSubPr>
+                        <m:ctrlPr>
+                          <a:rPr lang="en-US" sz="2400" i="1" smtClean="0">
+                            <a:latin typeface="Cambria Math" panose="02040503050406030204" pitchFamily="18" charset="0"/>
+                          </a:rPr>
+                        </m:ctrlPr>
+                      </m:sSubPr>
+                      <m:e>
+                        <m:r>
+                          <a:rPr lang="en-US" sz="2400" b="0" i="1" smtClean="0">
+                            <a:latin typeface="Cambria Math" panose="02040503050406030204" pitchFamily="18" charset="0"/>
+                          </a:rPr>
+                          <m:t>𝑀</m:t>
+                        </m:r>
+                      </m:e>
+                      <m:sub>
+                        <m:r>
+                          <a:rPr lang="en-US" sz="2400" i="1">
+                            <a:latin typeface="Cambria Math" panose="02040503050406030204" pitchFamily="18" charset="0"/>
+                          </a:rPr>
+                          <m:t>𝑖</m:t>
+                        </m:r>
+                      </m:sub>
+                    </m:sSub>
+                  </m:oMath>
+                </a14:m>
+                <a:r>
+                  <a:rPr lang="en-US" sz="2400" dirty="0" smtClean="0"/>
+                  <a:t>: </a:t>
+                </a:r>
+                <a14:m>
+                  <m:oMath xmlns:m="http://schemas.openxmlformats.org/officeDocument/2006/math">
+                    <m:r>
+                      <m:rPr>
+                        <m:brk m:alnAt="23"/>
+                      </m:rPr>
+                      <a:rPr lang="en-US" sz="2400" i="1">
+                        <a:latin typeface="Cambria Math" panose="02040503050406030204" pitchFamily="18" charset="0"/>
+                      </a:rPr>
+                      <m:t>𝑖</m:t>
+                    </m:r>
+                  </m:oMath>
+                </a14:m>
+                <a:r>
+                  <a:rPr lang="en-US" sz="2400" dirty="0" err="1" smtClean="0"/>
+                  <a:t>th</a:t>
+                </a:r>
+                <a:r>
+                  <a:rPr lang="en-US" sz="2400" dirty="0" smtClean="0"/>
+                  <a:t> sampled value of state</a:t>
+                </a:r>
+                <a14:m>
+                  <m:oMath xmlns:m="http://schemas.openxmlformats.org/officeDocument/2006/math">
+                    <m:r>
+                      <a:rPr lang="en-US" sz="2400" b="0" i="0" smtClean="0">
+                        <a:latin typeface="Cambria Math" panose="02040503050406030204" pitchFamily="18" charset="0"/>
+                      </a:rPr>
+                      <m:t> </m:t>
+                    </m:r>
+                    <m:r>
+                      <a:rPr lang="en-US" sz="2400" b="0" i="1" smtClean="0">
+                        <a:latin typeface="Cambria Math" panose="02040503050406030204" pitchFamily="18" charset="0"/>
+                      </a:rPr>
+                      <m:t>𝑀</m:t>
+                    </m:r>
+                  </m:oMath>
+                </a14:m>
+                <a:endParaRPr lang="en-US" sz="2400" dirty="0" smtClean="0"/>
+              </a:p>
+            </p:txBody>
+          </p:sp>
+        </mc:Choice>
+        <mc:Fallback>
+          <p:sp>
+            <p:nvSpPr>
+              <p:cNvPr id="5" name="TextBox 4"/>
+              <p:cNvSpPr txBox="1">
+                <a:spLocks noRot="1" noChangeAspect="1" noMove="1" noResize="1" noEditPoints="1" noAdjustHandles="1" noChangeArrowheads="1" noChangeShapeType="1" noTextEdit="1"/>
+              </p:cNvSpPr>
+              <p:nvPr/>
+            </p:nvSpPr>
+            <p:spPr>
+              <a:xfrm>
+                <a:off x="500743" y="4093029"/>
+                <a:ext cx="5730240" cy="830997"/>
+              </a:xfrm>
+              <a:prstGeom prst="rect">
+                <a:avLst/>
+              </a:prstGeom>
+              <a:blipFill rotWithShape="0">
+                <a:blip r:embed="rId3"/>
+                <a:stretch>
+                  <a:fillRect l="-213" t="-5839" b="-15328"/>
+                </a:stretch>
+              </a:blipFill>
+            </p:spPr>
+            <p:txBody>
+              <a:bodyPr/>
+              <a:lstStyle/>
+              <a:p>
+                <a:r>
+                  <a:rPr lang="en-CA">
+                    <a:noFill/>
+                  </a:rPr>
+                  <a:t> </a:t>
+                </a:r>
+              </a:p>
+            </p:txBody>
+          </p:sp>
+        </mc:Fallback>
+      </mc:AlternateContent>
+    </p:spTree>
+    <p:extLst>
+      <p:ext uri="{BB962C8B-B14F-4D97-AF65-F5344CB8AC3E}">
+        <p14:creationId xmlns:p14="http://schemas.microsoft.com/office/powerpoint/2010/main" val="3222575153"/>
+      </p:ext>
+    </p:extLst>
+  </p:cSld>
+  <p:clrMapOvr>
+    <a:overrideClrMapping bg1="dk1" tx1="lt1" bg2="dk2" tx2="lt2" accent1="accent1" accent2="accent2" accent3="accent3" accent4="accent4" accent5="accent5" accent6="accent6" hlink="hlink" folHlink="folHlink"/>
+  </p:clrMapOvr>
+</p:sld>
+</file>
+
+<file path=ppt/slides/slide12.xml><?xml version="1.0" encoding="utf-8"?>
+<p:sld xmlns:a="http://schemas.openxmlformats.org/drawingml/2006/main" xmlns:r="http://schemas.openxmlformats.org/officeDocument/2006/relationships" xmlns:p="http://schemas.openxmlformats.org/presentationml/2006/main">
+  <p:cSld>
+    <p:bg>
+      <p:bgPr>
+        <a:solidFill>
+          <a:schemeClr val="bg2"/>
+        </a:solidFill>
+        <a:effectLst/>
+      </p:bgPr>
+    </p:bg>
+    <p:spTree>
+      <p:nvGrpSpPr>
+        <p:cNvPr id="1" name=""/>
+        <p:cNvGrpSpPr/>
+        <p:nvPr/>
+      </p:nvGrpSpPr>
+      <p:grpSpPr>
+        <a:xfrm>
+          <a:off x="0" y="0"/>
+          <a:ext cx="0" cy="0"/>
+          <a:chOff x="0" y="0"/>
+          <a:chExt cx="0" cy="0"/>
+        </a:xfrm>
+      </p:grpSpPr>
+      <p:sp useBgFill="1">
+        <p:nvSpPr>
+          <p:cNvPr id="36" name="Rectangle 35">
+            <a:extLst>
+              <a:ext uri="{FF2B5EF4-FFF2-40B4-BE49-F238E27FC236}">
+                <a16:creationId xmlns:a16="http://schemas.microsoft.com/office/drawing/2014/main" xmlns="" id="{8BCFA5F4-1A8E-48F5-9209-7F24485B1D78}"/>
+              </a:ext>
+              <a:ext uri="{C183D7F6-B498-43B3-948B-1728B52AA6E4}">
+                <adec:decorative xmlns:adec="http://schemas.microsoft.com/office/drawing/2017/decorative" xmlns="" val="1"/>
+              </a:ext>
+            </a:extLst>
+          </p:cNvPr>
+          <p:cNvSpPr>
+            <a:spLocks noGrp="1" noRot="1" noChangeAspect="1" noMove="1" noResize="1" noEditPoints="1" noAdjustHandles="1" noChangeArrowheads="1" noChangeShapeType="1" noTextEdit="1"/>
+          </p:cNvSpPr>
+          <p:nvPr>
+            <p:extLst>
+              <p:ext uri="{386F3935-93C4-4BCD-93E2-E3B085C9AB24}">
+                <p16:designElem xmlns:p16="http://schemas.microsoft.com/office/powerpoint/2015/main" xmlns="" val="1"/>
+              </p:ext>
+            </p:extLst>
+          </p:nvPr>
+        </p:nvSpPr>
+        <p:spPr>
+          <a:xfrm>
+            <a:off x="0" y="0"/>
+            <a:ext cx="12192000" cy="6858000"/>
+          </a:xfrm>
+          <a:prstGeom prst="rect">
+            <a:avLst/>
+          </a:prstGeom>
+          <a:ln>
+            <a:noFill/>
+          </a:ln>
+        </p:spPr>
+        <p:style>
+          <a:lnRef idx="2">
+            <a:schemeClr val="accent1">
+              <a:shade val="50000"/>
+            </a:schemeClr>
+          </a:lnRef>
+          <a:fillRef idx="1">
+            <a:schemeClr val="accent1"/>
+          </a:fillRef>
+          <a:effectRef idx="0">
+            <a:schemeClr val="accent1"/>
+          </a:effectRef>
+          <a:fontRef idx="minor">
+            <a:schemeClr val="lt1"/>
+          </a:fontRef>
+        </p:style>
+        <p:txBody>
+          <a:bodyPr rtlCol="0" anchor="ctr"/>
+          <a:lstStyle/>
+          <a:p>
+            <a:pPr algn="ctr"/>
+            <a:endParaRPr lang="en-US" dirty="0"/>
+          </a:p>
+        </p:txBody>
+      </p:sp>
+      <p:sp>
+        <p:nvSpPr>
+          <p:cNvPr id="38" name="Rectangle 37">
+            <a:extLst>
+              <a:ext uri="{FF2B5EF4-FFF2-40B4-BE49-F238E27FC236}">
+                <a16:creationId xmlns:a16="http://schemas.microsoft.com/office/drawing/2014/main" xmlns="" id="{A8074621-AE44-40C4-8323-DF5185BC954E}"/>
+              </a:ext>
+              <a:ext uri="{C183D7F6-B498-43B3-948B-1728B52AA6E4}">
+                <adec:decorative xmlns:adec="http://schemas.microsoft.com/office/drawing/2017/decorative" xmlns="" val="1"/>
+              </a:ext>
+            </a:extLst>
+          </p:cNvPr>
+          <p:cNvSpPr>
+            <a:spLocks noGrp="1" noRot="1" noChangeAspect="1" noMove="1" noResize="1" noEditPoints="1" noAdjustHandles="1" noChangeArrowheads="1" noChangeShapeType="1" noTextEdit="1"/>
+          </p:cNvSpPr>
+          <p:nvPr>
+            <p:extLst>
+              <p:ext uri="{386F3935-93C4-4BCD-93E2-E3B085C9AB24}">
+                <p16:designElem xmlns:p16="http://schemas.microsoft.com/office/powerpoint/2015/main" xmlns="" val="1"/>
+              </p:ext>
+            </p:extLst>
+          </p:nvPr>
+        </p:nvSpPr>
+        <p:spPr>
+          <a:xfrm>
+            <a:off x="0" y="0"/>
+            <a:ext cx="12192000" cy="2053062"/>
+          </a:xfrm>
+          <a:prstGeom prst="rect">
+            <a:avLst/>
+          </a:prstGeom>
+          <a:solidFill>
+            <a:schemeClr val="bg2">
+              <a:lumMod val="75000"/>
+            </a:schemeClr>
+          </a:solidFill>
+          <a:ln>
+            <a:noFill/>
+          </a:ln>
+        </p:spPr>
+        <p:style>
+          <a:lnRef idx="2">
+            <a:schemeClr val="accent1">
+              <a:shade val="50000"/>
+            </a:schemeClr>
+          </a:lnRef>
+          <a:fillRef idx="1">
+            <a:schemeClr val="accent1"/>
+          </a:fillRef>
+          <a:effectRef idx="0">
+            <a:schemeClr val="accent1"/>
+          </a:effectRef>
+          <a:fontRef idx="minor">
+            <a:schemeClr val="lt1"/>
+          </a:fontRef>
+        </p:style>
+        <p:txBody>
+          <a:bodyPr rtlCol="0" anchor="ctr"/>
+          <a:lstStyle/>
+          <a:p>
+            <a:pPr algn="ctr"/>
+            <a:endParaRPr lang="en-US"/>
+          </a:p>
+        </p:txBody>
+      </p:sp>
+      <p:sp>
+        <p:nvSpPr>
+          <p:cNvPr id="2" name="Title 1">
+            <a:extLst>
+              <a:ext uri="{FF2B5EF4-FFF2-40B4-BE49-F238E27FC236}">
+                <a16:creationId xmlns:a16="http://schemas.microsoft.com/office/drawing/2014/main" xmlns="" id="{98665829-B67C-1898-629C-AC1781FAF9BD}"/>
+              </a:ext>
+            </a:extLst>
+          </p:cNvPr>
+          <p:cNvSpPr>
+            <a:spLocks noGrp="1"/>
+          </p:cNvSpPr>
+          <p:nvPr>
+            <p:ph type="title"/>
+          </p:nvPr>
+        </p:nvSpPr>
+        <p:spPr/>
+        <p:txBody>
+          <a:bodyPr>
+            <a:normAutofit/>
+          </a:bodyPr>
+          <a:lstStyle/>
+          <a:p>
+            <a:r>
+              <a:rPr lang="en-US" dirty="0" smtClean="0"/>
+              <a:t>Training algorithm</a:t>
+            </a:r>
+            <a:endParaRPr lang="en-US" sz="3600" dirty="0"/>
+          </a:p>
+        </p:txBody>
+      </p:sp>
+      <mc:AlternateContent xmlns:mc="http://schemas.openxmlformats.org/markup-compatibility/2006">
+        <mc:Choice xmlns:a14="http://schemas.microsoft.com/office/drawing/2010/main" Requires="a14">
+          <p:sp>
+            <p:nvSpPr>
+              <p:cNvPr id="4" name="TextBox 3"/>
+              <p:cNvSpPr txBox="1"/>
+              <p:nvPr/>
+            </p:nvSpPr>
+            <p:spPr>
+              <a:xfrm>
+                <a:off x="500743" y="2381795"/>
+                <a:ext cx="5941306" cy="1036502"/>
+              </a:xfrm>
+              <a:prstGeom prst="rect">
+                <a:avLst/>
+              </a:prstGeom>
+              <a:noFill/>
+            </p:spPr>
+            <p:txBody>
+              <a:bodyPr wrap="none" lIns="0" tIns="0" rIns="0" bIns="0" rtlCol="0">
+                <a:spAutoFit/>
+              </a:bodyPr>
+              <a:lstStyle/>
+              <a:p>
+                <a14:m>
+                  <m:oMathPara xmlns:m="http://schemas.openxmlformats.org/officeDocument/2006/math">
+                    <m:oMathParaPr>
+                      <m:jc m:val="centerGroup"/>
+                    </m:oMathParaPr>
+                    <m:oMath xmlns:m="http://schemas.openxmlformats.org/officeDocument/2006/math">
+                      <m:sSub>
+                        <m:sSubPr>
+                          <m:ctrlPr>
+                            <a:rPr lang="en-CA" sz="2400" i="1" smtClean="0">
+                              <a:latin typeface="Cambria Math" panose="02040503050406030204" pitchFamily="18" charset="0"/>
+                            </a:rPr>
+                          </m:ctrlPr>
+                        </m:sSubPr>
+                        <m:e>
+                          <m:r>
+                            <a:rPr lang="en-US" sz="2400" b="0" i="1" smtClean="0">
+                              <a:latin typeface="Cambria Math" panose="02040503050406030204" pitchFamily="18" charset="0"/>
+                            </a:rPr>
+                            <m:t>𝐿</m:t>
+                          </m:r>
+                        </m:e>
+                        <m:sub>
+                          <m:r>
+                            <a:rPr lang="en-US" sz="2400" b="0" i="1" smtClean="0">
+                              <a:latin typeface="Cambria Math" panose="02040503050406030204" pitchFamily="18" charset="0"/>
+                            </a:rPr>
+                            <m:t>𝑎𝑐𝑐</m:t>
+                          </m:r>
+                        </m:sub>
+                      </m:sSub>
+                      <m:r>
+                        <a:rPr lang="en-US" sz="2400" b="0" i="1" smtClean="0">
+                          <a:latin typeface="Cambria Math" panose="02040503050406030204" pitchFamily="18" charset="0"/>
+                        </a:rPr>
+                        <m:t>=</m:t>
+                      </m:r>
+                      <m:f>
+                        <m:fPr>
+                          <m:ctrlPr>
+                            <a:rPr lang="en-US" sz="2400" b="0" i="1" smtClean="0">
+                              <a:latin typeface="Cambria Math" panose="02040503050406030204" pitchFamily="18" charset="0"/>
+                            </a:rPr>
+                          </m:ctrlPr>
+                        </m:fPr>
+                        <m:num>
+                          <m:r>
+                            <a:rPr lang="en-US" sz="2400" b="0" i="1" smtClean="0">
+                              <a:latin typeface="Cambria Math" panose="02040503050406030204" pitchFamily="18" charset="0"/>
+                            </a:rPr>
+                            <m:t>1</m:t>
+                          </m:r>
+                        </m:num>
+                        <m:den>
+                          <m:r>
+                            <a:rPr lang="en-US" sz="2400" b="0" i="1" smtClean="0">
+                              <a:latin typeface="Cambria Math" panose="02040503050406030204" pitchFamily="18" charset="0"/>
+                            </a:rPr>
+                            <m:t>𝑛</m:t>
+                          </m:r>
+                        </m:den>
+                      </m:f>
+                      <m:nary>
+                        <m:naryPr>
+                          <m:chr m:val="∑"/>
+                          <m:supHide m:val="on"/>
+                          <m:ctrlPr>
+                            <a:rPr lang="en-US" sz="2400" b="0" i="1" smtClean="0">
+                              <a:latin typeface="Cambria Math" panose="02040503050406030204" pitchFamily="18" charset="0"/>
+                            </a:rPr>
+                          </m:ctrlPr>
+                        </m:naryPr>
+                        <m:sub>
+                          <m:r>
+                            <m:rPr>
+                              <m:brk m:alnAt="7"/>
+                            </m:rPr>
+                            <a:rPr lang="en-US" sz="2400" b="0" i="1" smtClean="0">
+                              <a:latin typeface="Cambria Math" panose="02040503050406030204" pitchFamily="18" charset="0"/>
+                            </a:rPr>
+                            <m:t>𝑈</m:t>
+                          </m:r>
+                          <m:r>
+                            <a:rPr lang="en-US" sz="2400" b="0" i="1" smtClean="0">
+                              <a:latin typeface="Cambria Math" panose="02040503050406030204" pitchFamily="18" charset="0"/>
+                            </a:rPr>
+                            <m:t>=</m:t>
+                          </m:r>
+                          <m:r>
+                            <a:rPr lang="en-US" sz="2400" b="0" i="1" smtClean="0">
+                              <a:latin typeface="Cambria Math" panose="02040503050406030204" pitchFamily="18" charset="0"/>
+                            </a:rPr>
+                            <m:t>𝑆</m:t>
+                          </m:r>
+                          <m:r>
+                            <a:rPr lang="en-US" sz="2400" b="0" i="1" smtClean="0">
+                              <a:latin typeface="Cambria Math" panose="02040503050406030204" pitchFamily="18" charset="0"/>
+                            </a:rPr>
+                            <m:t>,</m:t>
+                          </m:r>
+                          <m:r>
+                            <a:rPr lang="en-US" sz="2400" b="0" i="1" smtClean="0">
+                              <a:latin typeface="Cambria Math" panose="02040503050406030204" pitchFamily="18" charset="0"/>
+                            </a:rPr>
+                            <m:t>𝐼</m:t>
+                          </m:r>
+                          <m:r>
+                            <a:rPr lang="en-US" sz="2400" b="0" i="1" smtClean="0">
+                              <a:latin typeface="Cambria Math" panose="02040503050406030204" pitchFamily="18" charset="0"/>
+                            </a:rPr>
+                            <m:t>,</m:t>
+                          </m:r>
+                          <m:r>
+                            <a:rPr lang="en-US" sz="2400" b="0" i="1" smtClean="0">
+                              <a:latin typeface="Cambria Math" panose="02040503050406030204" pitchFamily="18" charset="0"/>
+                            </a:rPr>
+                            <m:t>𝑀</m:t>
+                          </m:r>
+                        </m:sub>
+                        <m:sup/>
+                        <m:e>
+                          <m:f>
+                            <m:fPr>
+                              <m:ctrlPr>
+                                <a:rPr lang="en-US" sz="2400" i="1">
+                                  <a:latin typeface="Cambria Math" panose="02040503050406030204" pitchFamily="18" charset="0"/>
+                                </a:rPr>
+                              </m:ctrlPr>
+                            </m:fPr>
+                            <m:num>
+                              <m:r>
+                                <a:rPr lang="en-US" sz="2400" i="1">
+                                  <a:latin typeface="Cambria Math" panose="02040503050406030204" pitchFamily="18" charset="0"/>
+                                </a:rPr>
+                                <m:t>1</m:t>
+                              </m:r>
+                            </m:num>
+                            <m:den>
+                              <m:r>
+                                <a:rPr lang="en-US" sz="2400" i="1">
+                                  <a:latin typeface="Cambria Math" panose="02040503050406030204" pitchFamily="18" charset="0"/>
+                                </a:rPr>
+                                <m:t>(</m:t>
+                              </m:r>
+                              <m:sSub>
+                                <m:sSubPr>
+                                  <m:ctrlPr>
+                                    <a:rPr lang="en-US" sz="2400" i="1">
+                                      <a:latin typeface="Cambria Math" panose="02040503050406030204" pitchFamily="18" charset="0"/>
+                                    </a:rPr>
+                                  </m:ctrlPr>
+                                </m:sSubPr>
+                                <m:e>
+                                  <m:r>
+                                    <a:rPr lang="en-US" sz="2400" i="1">
+                                      <a:latin typeface="Cambria Math" panose="02040503050406030204" pitchFamily="18" charset="0"/>
+                                    </a:rPr>
+                                    <m:t>𝑈</m:t>
+                                  </m:r>
+                                </m:e>
+                                <m:sub>
+                                  <m:r>
+                                    <a:rPr lang="en-US" sz="2400" i="1">
+                                      <a:latin typeface="Cambria Math" panose="02040503050406030204" pitchFamily="18" charset="0"/>
+                                    </a:rPr>
+                                    <m:t>𝑚𝑎𝑥</m:t>
+                                  </m:r>
+                                </m:sub>
+                              </m:sSub>
+                              <m:r>
+                                <a:rPr lang="en-US" sz="2400" i="1">
+                                  <a:latin typeface="Cambria Math" panose="02040503050406030204" pitchFamily="18" charset="0"/>
+                                </a:rPr>
+                                <m:t>−</m:t>
+                              </m:r>
+                              <m:sSub>
+                                <m:sSubPr>
+                                  <m:ctrlPr>
+                                    <a:rPr lang="en-US" sz="2400" i="1">
+                                      <a:latin typeface="Cambria Math" panose="02040503050406030204" pitchFamily="18" charset="0"/>
+                                    </a:rPr>
+                                  </m:ctrlPr>
+                                </m:sSubPr>
+                                <m:e>
+                                  <m:r>
+                                    <a:rPr lang="en-US" sz="2400" i="1">
+                                      <a:latin typeface="Cambria Math" panose="02040503050406030204" pitchFamily="18" charset="0"/>
+                                    </a:rPr>
+                                    <m:t>𝑈</m:t>
+                                  </m:r>
+                                </m:e>
+                                <m:sub>
+                                  <m:r>
+                                    <a:rPr lang="en-US" sz="2400" i="1">
+                                      <a:latin typeface="Cambria Math" panose="02040503050406030204" pitchFamily="18" charset="0"/>
+                                    </a:rPr>
+                                    <m:t>𝑚𝑖𝑛</m:t>
+                                  </m:r>
+                                </m:sub>
+                              </m:sSub>
+                              <m:r>
+                                <a:rPr lang="en-US" sz="2400" i="1">
+                                  <a:latin typeface="Cambria Math" panose="02040503050406030204" pitchFamily="18" charset="0"/>
+                                </a:rPr>
+                                <m:t>)</m:t>
+                              </m:r>
+                            </m:den>
+                          </m:f>
+                          <m:nary>
+                            <m:naryPr>
+                              <m:chr m:val="∑"/>
+                              <m:ctrlPr>
+                                <a:rPr lang="en-US" sz="2400" i="1">
+                                  <a:latin typeface="Cambria Math" panose="02040503050406030204" pitchFamily="18" charset="0"/>
+                                </a:rPr>
+                              </m:ctrlPr>
+                            </m:naryPr>
+                            <m:sub>
+                              <m:r>
+                                <m:rPr>
+                                  <m:brk m:alnAt="23"/>
+                                </m:rPr>
+                                <a:rPr lang="en-US" sz="2400" i="1">
+                                  <a:latin typeface="Cambria Math" panose="02040503050406030204" pitchFamily="18" charset="0"/>
+                                </a:rPr>
+                                <m:t>𝑖</m:t>
+                              </m:r>
+                              <m:r>
+                                <a:rPr lang="en-US" sz="2400" i="1">
+                                  <a:latin typeface="Cambria Math" panose="02040503050406030204" pitchFamily="18" charset="0"/>
+                                </a:rPr>
+                                <m:t>=</m:t>
+                              </m:r>
+                              <m:r>
+                                <a:rPr lang="en-US" sz="2400" i="1">
+                                  <a:latin typeface="Cambria Math" panose="02040503050406030204" pitchFamily="18" charset="0"/>
+                                </a:rPr>
+                                <m:t>1</m:t>
+                              </m:r>
+                            </m:sub>
+                            <m:sup>
+                              <m:r>
+                                <a:rPr lang="en-US" sz="2400" i="1">
+                                  <a:latin typeface="Cambria Math" panose="02040503050406030204" pitchFamily="18" charset="0"/>
+                                </a:rPr>
+                                <m:t>𝑛</m:t>
+                              </m:r>
+                            </m:sup>
+                            <m:e>
+                              <m:sSup>
+                                <m:sSupPr>
+                                  <m:ctrlPr>
+                                    <a:rPr lang="en-US" sz="2400" i="1">
+                                      <a:latin typeface="Cambria Math" panose="02040503050406030204" pitchFamily="18" charset="0"/>
+                                    </a:rPr>
+                                  </m:ctrlPr>
+                                </m:sSupPr>
+                                <m:e>
+                                  <m:r>
+                                    <a:rPr lang="en-US" sz="2400" i="1">
+                                      <a:latin typeface="Cambria Math" panose="02040503050406030204" pitchFamily="18" charset="0"/>
+                                    </a:rPr>
+                                    <m:t>(</m:t>
+                                  </m:r>
+                                  <m:sSub>
+                                    <m:sSubPr>
+                                      <m:ctrlPr>
+                                        <a:rPr lang="en-US" sz="2400" i="1">
+                                          <a:latin typeface="Cambria Math" panose="02040503050406030204" pitchFamily="18" charset="0"/>
+                                        </a:rPr>
+                                      </m:ctrlPr>
+                                    </m:sSubPr>
+                                    <m:e>
+                                      <m:r>
+                                        <a:rPr lang="en-US" sz="2400" i="1">
+                                          <a:latin typeface="Cambria Math" panose="02040503050406030204" pitchFamily="18" charset="0"/>
+                                        </a:rPr>
+                                        <m:t>𝑈</m:t>
+                                      </m:r>
+                                    </m:e>
+                                    <m:sub>
+                                      <m:r>
+                                        <a:rPr lang="en-US" sz="2400" i="1">
+                                          <a:latin typeface="Cambria Math" panose="02040503050406030204" pitchFamily="18" charset="0"/>
+                                        </a:rPr>
+                                        <m:t>𝑖</m:t>
+                                      </m:r>
+                                    </m:sub>
+                                  </m:sSub>
+                                  <m:r>
+                                    <a:rPr lang="en-US" sz="2400" i="1">
+                                      <a:latin typeface="Cambria Math" panose="02040503050406030204" pitchFamily="18" charset="0"/>
+                                    </a:rPr>
+                                    <m:t>−</m:t>
+                                  </m:r>
+                                  <m:sSub>
+                                    <m:sSubPr>
+                                      <m:ctrlPr>
+                                        <a:rPr lang="en-US" sz="2400" i="1">
+                                          <a:latin typeface="Cambria Math" panose="02040503050406030204" pitchFamily="18" charset="0"/>
+                                        </a:rPr>
+                                      </m:ctrlPr>
+                                    </m:sSubPr>
+                                    <m:e>
+                                      <m:acc>
+                                        <m:accPr>
+                                          <m:chr m:val="̅"/>
+                                          <m:ctrlPr>
+                                            <a:rPr lang="en-US" sz="2400" i="1">
+                                              <a:latin typeface="Cambria Math" panose="02040503050406030204" pitchFamily="18" charset="0"/>
+                                            </a:rPr>
+                                          </m:ctrlPr>
+                                        </m:accPr>
+                                        <m:e>
+                                          <m:r>
+                                            <a:rPr lang="en-US" sz="2400" i="1">
+                                              <a:latin typeface="Cambria Math" panose="02040503050406030204" pitchFamily="18" charset="0"/>
+                                            </a:rPr>
+                                            <m:t>𝑈</m:t>
+                                          </m:r>
+                                        </m:e>
+                                      </m:acc>
+                                    </m:e>
+                                    <m:sub>
+                                      <m:r>
+                                        <a:rPr lang="en-US" sz="2400" i="1">
+                                          <a:latin typeface="Cambria Math" panose="02040503050406030204" pitchFamily="18" charset="0"/>
+                                        </a:rPr>
+                                        <m:t>𝑖</m:t>
+                                      </m:r>
+                                    </m:sub>
+                                  </m:sSub>
+                                  <m:r>
+                                    <a:rPr lang="en-US" sz="2400" i="1">
+                                      <a:latin typeface="Cambria Math" panose="02040503050406030204" pitchFamily="18" charset="0"/>
+                                    </a:rPr>
+                                    <m:t>)</m:t>
+                                  </m:r>
+                                </m:e>
+                                <m:sup>
+                                  <m:r>
+                                    <a:rPr lang="en-US" sz="2400" i="1">
+                                      <a:latin typeface="Cambria Math" panose="02040503050406030204" pitchFamily="18" charset="0"/>
+                                    </a:rPr>
+                                    <m:t>2</m:t>
+                                  </m:r>
+                                </m:sup>
+                              </m:sSup>
+                            </m:e>
+                          </m:nary>
+                        </m:e>
+                      </m:nary>
+                    </m:oMath>
+                  </m:oMathPara>
+                </a14:m>
+                <a:endParaRPr lang="en-CA" sz="2400" dirty="0"/>
+              </a:p>
+            </p:txBody>
+          </p:sp>
+        </mc:Choice>
+        <mc:Fallback>
+          <p:sp>
+            <p:nvSpPr>
+              <p:cNvPr id="4" name="TextBox 3"/>
+              <p:cNvSpPr txBox="1">
+                <a:spLocks noRot="1" noChangeAspect="1" noMove="1" noResize="1" noEditPoints="1" noAdjustHandles="1" noChangeArrowheads="1" noChangeShapeType="1" noTextEdit="1"/>
+              </p:cNvSpPr>
+              <p:nvPr/>
+            </p:nvSpPr>
+            <p:spPr>
+              <a:xfrm>
+                <a:off x="500743" y="2381795"/>
+                <a:ext cx="5941306" cy="1036502"/>
+              </a:xfrm>
+              <a:prstGeom prst="rect">
+                <a:avLst/>
+              </a:prstGeom>
+              <a:blipFill rotWithShape="0">
+                <a:blip r:embed="rId2"/>
+                <a:stretch>
+                  <a:fillRect/>
+                </a:stretch>
+              </a:blipFill>
+            </p:spPr>
+            <p:txBody>
+              <a:bodyPr/>
+              <a:lstStyle/>
+              <a:p>
+                <a:r>
+                  <a:rPr lang="en-CA">
+                    <a:noFill/>
+                  </a:rPr>
+                  <a:t> </a:t>
+                </a:r>
+              </a:p>
+            </p:txBody>
+          </p:sp>
+        </mc:Fallback>
+      </mc:AlternateContent>
+      <mc:AlternateContent xmlns:mc="http://schemas.openxmlformats.org/markup-compatibility/2006">
+        <mc:Choice xmlns:a14="http://schemas.microsoft.com/office/drawing/2010/main" Requires="a14">
+          <p:sp>
+            <p:nvSpPr>
+              <p:cNvPr id="5" name="TextBox 4"/>
+              <p:cNvSpPr txBox="1"/>
+              <p:nvPr/>
+            </p:nvSpPr>
+            <p:spPr>
+              <a:xfrm>
+                <a:off x="500743" y="4093029"/>
+                <a:ext cx="5730240" cy="1200329"/>
+              </a:xfrm>
+              <a:prstGeom prst="rect">
+                <a:avLst/>
+              </a:prstGeom>
+              <a:noFill/>
+            </p:spPr>
+            <p:txBody>
+              <a:bodyPr wrap="square" rtlCol="0">
+                <a:spAutoFit/>
+              </a:bodyPr>
+              <a:lstStyle/>
+              <a:p>
+                <a14:m>
+                  <m:oMath xmlns:m="http://schemas.openxmlformats.org/officeDocument/2006/math">
+                    <m:r>
+                      <a:rPr lang="en-US" sz="2400" i="1" smtClean="0">
+                        <a:latin typeface="Cambria Math" panose="02040503050406030204" pitchFamily="18" charset="0"/>
+                      </a:rPr>
+                      <m:t>𝑛</m:t>
+                    </m:r>
+                    <m:r>
+                      <a:rPr lang="en-US" sz="2400" i="1" smtClean="0">
+                        <a:latin typeface="Cambria Math" panose="02040503050406030204" pitchFamily="18" charset="0"/>
+                      </a:rPr>
+                      <m:t> </m:t>
+                    </m:r>
+                  </m:oMath>
+                </a14:m>
+                <a:r>
+                  <a:rPr lang="en-US" sz="2400" dirty="0" smtClean="0"/>
+                  <a:t>: Number of observations</a:t>
+                </a:r>
+              </a:p>
+              <a:p>
+                <a14:m>
+                  <m:oMath xmlns:m="http://schemas.openxmlformats.org/officeDocument/2006/math">
+                    <m:sSub>
+                      <m:sSubPr>
+                        <m:ctrlPr>
+                          <a:rPr lang="en-US" sz="2400" i="1">
+                            <a:latin typeface="Cambria Math" panose="02040503050406030204" pitchFamily="18" charset="0"/>
+                          </a:rPr>
+                        </m:ctrlPr>
+                      </m:sSubPr>
+                      <m:e>
+                        <m:r>
+                          <a:rPr lang="en-US" sz="2400" i="1">
+                            <a:latin typeface="Cambria Math" panose="02040503050406030204" pitchFamily="18" charset="0"/>
+                          </a:rPr>
+                          <m:t>𝑈</m:t>
+                        </m:r>
+                      </m:e>
+                      <m:sub>
+                        <m:r>
+                          <a:rPr lang="en-US" sz="2400" i="1">
+                            <a:latin typeface="Cambria Math" panose="02040503050406030204" pitchFamily="18" charset="0"/>
+                          </a:rPr>
+                          <m:t>𝑖</m:t>
+                        </m:r>
+                      </m:sub>
+                    </m:sSub>
+                  </m:oMath>
+                </a14:m>
+                <a:r>
+                  <a:rPr lang="en-US" sz="2400" dirty="0" smtClean="0"/>
+                  <a:t>: </a:t>
+                </a:r>
+                <a14:m>
+                  <m:oMath xmlns:m="http://schemas.openxmlformats.org/officeDocument/2006/math">
+                    <m:r>
+                      <m:rPr>
+                        <m:brk m:alnAt="23"/>
+                      </m:rPr>
+                      <a:rPr lang="en-US" sz="2400" i="1">
+                        <a:latin typeface="Cambria Math" panose="02040503050406030204" pitchFamily="18" charset="0"/>
+                      </a:rPr>
+                      <m:t>𝑖</m:t>
+                    </m:r>
+                  </m:oMath>
+                </a14:m>
+                <a:r>
+                  <a:rPr lang="en-US" sz="2400" dirty="0" err="1" smtClean="0"/>
+                  <a:t>th</a:t>
+                </a:r>
+                <a:r>
+                  <a:rPr lang="en-US" sz="2400" dirty="0" smtClean="0"/>
+                  <a:t> observation of state</a:t>
+                </a:r>
+                <a14:m>
+                  <m:oMath xmlns:m="http://schemas.openxmlformats.org/officeDocument/2006/math">
+                    <m:r>
+                      <a:rPr lang="en-US" sz="2400" b="0" i="0" smtClean="0">
+                        <a:latin typeface="Cambria Math" panose="02040503050406030204" pitchFamily="18" charset="0"/>
+                      </a:rPr>
+                      <m:t> </m:t>
+                    </m:r>
+                    <m:r>
+                      <a:rPr lang="en-US" sz="2400" b="0" i="1" smtClean="0">
+                        <a:latin typeface="Cambria Math" panose="02040503050406030204" pitchFamily="18" charset="0"/>
+                      </a:rPr>
+                      <m:t>𝑈</m:t>
+                    </m:r>
+                  </m:oMath>
+                </a14:m>
+                <a:endParaRPr lang="en-US" sz="2400" dirty="0" smtClean="0"/>
+              </a:p>
+              <a:p>
+                <a14:m>
+                  <m:oMath xmlns:m="http://schemas.openxmlformats.org/officeDocument/2006/math">
+                    <m:sSub>
+                      <m:sSubPr>
+                        <m:ctrlPr>
+                          <a:rPr lang="en-US" sz="2400" i="1">
+                            <a:latin typeface="Cambria Math" panose="02040503050406030204" pitchFamily="18" charset="0"/>
+                          </a:rPr>
+                        </m:ctrlPr>
+                      </m:sSubPr>
+                      <m:e>
+                        <m:acc>
+                          <m:accPr>
+                            <m:chr m:val="̅"/>
+                            <m:ctrlPr>
+                              <a:rPr lang="en-US" sz="2400" i="1">
+                                <a:latin typeface="Cambria Math" panose="02040503050406030204" pitchFamily="18" charset="0"/>
+                              </a:rPr>
+                            </m:ctrlPr>
+                          </m:accPr>
+                          <m:e>
+                            <m:r>
+                              <a:rPr lang="en-US" sz="2400" i="1">
+                                <a:latin typeface="Cambria Math" panose="02040503050406030204" pitchFamily="18" charset="0"/>
+                              </a:rPr>
+                              <m:t>𝑈</m:t>
+                            </m:r>
+                          </m:e>
+                        </m:acc>
+                      </m:e>
+                      <m:sub>
+                        <m:r>
+                          <a:rPr lang="en-US" sz="2400" i="1">
+                            <a:latin typeface="Cambria Math" panose="02040503050406030204" pitchFamily="18" charset="0"/>
+                          </a:rPr>
+                          <m:t>𝑖</m:t>
+                        </m:r>
+                      </m:sub>
+                    </m:sSub>
+                  </m:oMath>
+                </a14:m>
+                <a:r>
+                  <a:rPr lang="en-US" sz="2400" dirty="0" smtClean="0"/>
+                  <a:t>: </a:t>
+                </a:r>
+                <a14:m>
+                  <m:oMath xmlns:m="http://schemas.openxmlformats.org/officeDocument/2006/math">
+                    <m:r>
+                      <m:rPr>
+                        <m:brk m:alnAt="23"/>
+                      </m:rPr>
+                      <a:rPr lang="en-US" sz="2400" i="1">
+                        <a:latin typeface="Cambria Math" panose="02040503050406030204" pitchFamily="18" charset="0"/>
+                      </a:rPr>
+                      <m:t>𝑖</m:t>
+                    </m:r>
+                  </m:oMath>
+                </a14:m>
+                <a:r>
+                  <a:rPr lang="en-US" sz="2400" dirty="0" err="1" smtClean="0"/>
+                  <a:t>th</a:t>
+                </a:r>
+                <a:r>
+                  <a:rPr lang="en-US" sz="2400" dirty="0" smtClean="0"/>
+                  <a:t> UDE approximation of state </a:t>
+                </a:r>
+                <a14:m>
+                  <m:oMath xmlns:m="http://schemas.openxmlformats.org/officeDocument/2006/math">
+                    <m:r>
+                      <a:rPr lang="en-US" sz="2400" i="1">
+                        <a:latin typeface="Cambria Math" panose="02040503050406030204" pitchFamily="18" charset="0"/>
+                      </a:rPr>
+                      <m:t>𝑈</m:t>
+                    </m:r>
+                  </m:oMath>
+                </a14:m>
+                <a:endParaRPr lang="en-US" sz="2400" dirty="0"/>
+              </a:p>
+            </p:txBody>
+          </p:sp>
+        </mc:Choice>
+        <mc:Fallback>
+          <p:sp>
+            <p:nvSpPr>
+              <p:cNvPr id="5" name="TextBox 4"/>
+              <p:cNvSpPr txBox="1">
+                <a:spLocks noRot="1" noChangeAspect="1" noMove="1" noResize="1" noEditPoints="1" noAdjustHandles="1" noChangeArrowheads="1" noChangeShapeType="1" noTextEdit="1"/>
+              </p:cNvSpPr>
+              <p:nvPr/>
+            </p:nvSpPr>
+            <p:spPr>
+              <a:xfrm>
+                <a:off x="500743" y="4093029"/>
+                <a:ext cx="5730240" cy="1200329"/>
+              </a:xfrm>
+              <a:prstGeom prst="rect">
+                <a:avLst/>
+              </a:prstGeom>
+              <a:blipFill rotWithShape="0">
+                <a:blip r:embed="rId3"/>
+                <a:stretch>
+                  <a:fillRect l="-213" t="-4061" b="-10660"/>
+                </a:stretch>
+              </a:blipFill>
+            </p:spPr>
+            <p:txBody>
+              <a:bodyPr/>
+              <a:lstStyle/>
+              <a:p>
+                <a:r>
+                  <a:rPr lang="en-CA">
+                    <a:noFill/>
+                  </a:rPr>
+                  <a:t> </a:t>
+                </a:r>
+              </a:p>
+            </p:txBody>
+          </p:sp>
+        </mc:Fallback>
+      </mc:AlternateContent>
+    </p:spTree>
+    <p:extLst>
+      <p:ext uri="{BB962C8B-B14F-4D97-AF65-F5344CB8AC3E}">
+        <p14:creationId xmlns:p14="http://schemas.microsoft.com/office/powerpoint/2010/main" val="2254017749"/>
+      </p:ext>
+    </p:extLst>
+  </p:cSld>
+  <p:clrMapOvr>
+    <a:overrideClrMapping bg1="dk1" tx1="lt1" bg2="dk2" tx2="lt2" accent1="accent1" accent2="accent2" accent3="accent3" accent4="accent4" accent5="accent5" accent6="accent6" hlink="hlink" folHlink="folHlink"/>
+  </p:clrMapOvr>
+</p:sld>
+</file>
+
+<file path=ppt/slides/slide13.xml><?xml version="1.0" encoding="utf-8"?>
+<p:sld xmlns:a="http://schemas.openxmlformats.org/drawingml/2006/main" xmlns:r="http://schemas.openxmlformats.org/officeDocument/2006/relationships" xmlns:p="http://schemas.openxmlformats.org/presentationml/2006/main">
+  <p:cSld>
+    <p:bg>
+      <p:bgPr>
+        <a:solidFill>
+          <a:schemeClr val="bg2"/>
+        </a:solidFill>
+        <a:effectLst/>
+      </p:bgPr>
+    </p:bg>
+    <p:spTree>
+      <p:nvGrpSpPr>
+        <p:cNvPr id="1" name=""/>
+        <p:cNvGrpSpPr/>
+        <p:nvPr/>
+      </p:nvGrpSpPr>
+      <p:grpSpPr>
+        <a:xfrm>
+          <a:off x="0" y="0"/>
+          <a:ext cx="0" cy="0"/>
+          <a:chOff x="0" y="0"/>
+          <a:chExt cx="0" cy="0"/>
+        </a:xfrm>
+      </p:grpSpPr>
+      <p:sp useBgFill="1">
+        <p:nvSpPr>
+          <p:cNvPr id="36" name="Rectangle 35">
+            <a:extLst>
+              <a:ext uri="{FF2B5EF4-FFF2-40B4-BE49-F238E27FC236}">
+                <a16:creationId xmlns:a16="http://schemas.microsoft.com/office/drawing/2014/main" xmlns="" id="{8BCFA5F4-1A8E-48F5-9209-7F24485B1D78}"/>
+              </a:ext>
+              <a:ext uri="{C183D7F6-B498-43B3-948B-1728B52AA6E4}">
+                <adec:decorative xmlns:adec="http://schemas.microsoft.com/office/drawing/2017/decorative" xmlns="" val="1"/>
+              </a:ext>
+            </a:extLst>
+          </p:cNvPr>
+          <p:cNvSpPr>
+            <a:spLocks noGrp="1" noRot="1" noChangeAspect="1" noMove="1" noResize="1" noEditPoints="1" noAdjustHandles="1" noChangeArrowheads="1" noChangeShapeType="1" noTextEdit="1"/>
+          </p:cNvSpPr>
+          <p:nvPr>
+            <p:extLst>
+              <p:ext uri="{386F3935-93C4-4BCD-93E2-E3B085C9AB24}">
+                <p16:designElem xmlns:p16="http://schemas.microsoft.com/office/powerpoint/2015/main" xmlns="" val="1"/>
+              </p:ext>
+            </p:extLst>
+          </p:nvPr>
+        </p:nvSpPr>
+        <p:spPr>
+          <a:xfrm>
+            <a:off x="0" y="0"/>
+            <a:ext cx="12192000" cy="6858000"/>
+          </a:xfrm>
+          <a:prstGeom prst="rect">
+            <a:avLst/>
+          </a:prstGeom>
+          <a:ln>
+            <a:noFill/>
+          </a:ln>
+        </p:spPr>
+        <p:style>
+          <a:lnRef idx="2">
+            <a:schemeClr val="accent1">
+              <a:shade val="50000"/>
+            </a:schemeClr>
+          </a:lnRef>
+          <a:fillRef idx="1">
+            <a:schemeClr val="accent1"/>
+          </a:fillRef>
+          <a:effectRef idx="0">
+            <a:schemeClr val="accent1"/>
+          </a:effectRef>
+          <a:fontRef idx="minor">
+            <a:schemeClr val="lt1"/>
+          </a:fontRef>
+        </p:style>
+        <p:txBody>
+          <a:bodyPr rtlCol="0" anchor="ctr"/>
+          <a:lstStyle/>
+          <a:p>
+            <a:pPr algn="ctr"/>
+            <a:endParaRPr lang="en-US"/>
+          </a:p>
+        </p:txBody>
+      </p:sp>
+      <p:sp>
+        <p:nvSpPr>
+          <p:cNvPr id="38" name="Rectangle 37">
+            <a:extLst>
+              <a:ext uri="{FF2B5EF4-FFF2-40B4-BE49-F238E27FC236}">
+                <a16:creationId xmlns:a16="http://schemas.microsoft.com/office/drawing/2014/main" xmlns="" id="{A8074621-AE44-40C4-8323-DF5185BC954E}"/>
+              </a:ext>
+              <a:ext uri="{C183D7F6-B498-43B3-948B-1728B52AA6E4}">
+                <adec:decorative xmlns:adec="http://schemas.microsoft.com/office/drawing/2017/decorative" xmlns="" val="1"/>
+              </a:ext>
+            </a:extLst>
+          </p:cNvPr>
+          <p:cNvSpPr>
+            <a:spLocks noGrp="1" noRot="1" noChangeAspect="1" noMove="1" noResize="1" noEditPoints="1" noAdjustHandles="1" noChangeArrowheads="1" noChangeShapeType="1" noTextEdit="1"/>
+          </p:cNvSpPr>
+          <p:nvPr>
+            <p:extLst>
+              <p:ext uri="{386F3935-93C4-4BCD-93E2-E3B085C9AB24}">
+                <p16:designElem xmlns:p16="http://schemas.microsoft.com/office/powerpoint/2015/main" xmlns="" val="1"/>
+              </p:ext>
+            </p:extLst>
+          </p:nvPr>
+        </p:nvSpPr>
+        <p:spPr>
+          <a:xfrm>
+            <a:off x="0" y="0"/>
+            <a:ext cx="12192000" cy="2053062"/>
+          </a:xfrm>
+          <a:prstGeom prst="rect">
+            <a:avLst/>
+          </a:prstGeom>
+          <a:solidFill>
+            <a:schemeClr val="bg2">
+              <a:lumMod val="75000"/>
+            </a:schemeClr>
+          </a:solidFill>
+          <a:ln>
+            <a:noFill/>
+          </a:ln>
+        </p:spPr>
+        <p:style>
+          <a:lnRef idx="2">
+            <a:schemeClr val="accent1">
+              <a:shade val="50000"/>
+            </a:schemeClr>
+          </a:lnRef>
+          <a:fillRef idx="1">
+            <a:schemeClr val="accent1"/>
+          </a:fillRef>
+          <a:effectRef idx="0">
+            <a:schemeClr val="accent1"/>
+          </a:effectRef>
+          <a:fontRef idx="minor">
+            <a:schemeClr val="lt1"/>
+          </a:fontRef>
+        </p:style>
+        <p:txBody>
+          <a:bodyPr rtlCol="0" anchor="ctr"/>
+          <a:lstStyle/>
+          <a:p>
+            <a:pPr algn="ctr"/>
+            <a:endParaRPr lang="en-US"/>
+          </a:p>
+        </p:txBody>
+      </p:sp>
+      <p:sp>
+        <p:nvSpPr>
+          <p:cNvPr id="2" name="Title 1">
+            <a:extLst>
+              <a:ext uri="{FF2B5EF4-FFF2-40B4-BE49-F238E27FC236}">
+                <a16:creationId xmlns:a16="http://schemas.microsoft.com/office/drawing/2014/main" xmlns="" id="{98665829-B67C-1898-629C-AC1781FAF9BD}"/>
+              </a:ext>
+            </a:extLst>
+          </p:cNvPr>
+          <p:cNvSpPr>
+            <a:spLocks noGrp="1"/>
+          </p:cNvSpPr>
+          <p:nvPr>
+            <p:ph type="title"/>
+          </p:nvPr>
+        </p:nvSpPr>
+        <p:spPr/>
+        <p:txBody>
+          <a:bodyPr>
+            <a:normAutofit/>
+          </a:bodyPr>
+          <a:lstStyle/>
+          <a:p>
+            <a:r>
+              <a:rPr lang="en-US" sz="3600" dirty="0" smtClean="0"/>
+              <a:t>Results</a:t>
+            </a:r>
+            <a:endParaRPr lang="en-US" sz="3600" dirty="0"/>
+          </a:p>
+        </p:txBody>
+      </p:sp>
+      <p:sp>
+        <p:nvSpPr>
+          <p:cNvPr id="3" name="Text Placeholder 2"/>
+          <p:cNvSpPr>
+            <a:spLocks noGrp="1"/>
+          </p:cNvSpPr>
+          <p:nvPr>
+            <p:ph type="body" idx="1"/>
+          </p:nvPr>
+        </p:nvSpPr>
+        <p:spPr/>
+        <p:txBody>
+          <a:bodyPr/>
+          <a:lstStyle/>
+          <a:p>
+            <a:endParaRPr lang="en-CA" dirty="0"/>
+          </a:p>
+        </p:txBody>
+      </p:sp>
+    </p:spTree>
+    <p:extLst>
+      <p:ext uri="{BB962C8B-B14F-4D97-AF65-F5344CB8AC3E}">
+        <p14:creationId xmlns:p14="http://schemas.microsoft.com/office/powerpoint/2010/main" val="246905136"/>
+      </p:ext>
+    </p:extLst>
+  </p:cSld>
+  <p:clrMapOvr>
+    <a:overrideClrMapping bg1="dk1" tx1="lt1" bg2="dk2" tx2="lt2" accent1="accent1" accent2="accent2" accent3="accent3" accent4="accent4" accent5="accent5" accent6="accent6" hlink="hlink" folHlink="folHlink"/>
+  </p:clrMapOvr>
+</p:sld>
+</file>
+
+<file path=ppt/slides/slide14.xml><?xml version="1.0" encoding="utf-8"?>
+<p:sld xmlns:a="http://schemas.openxmlformats.org/drawingml/2006/main" xmlns:r="http://schemas.openxmlformats.org/officeDocument/2006/relationships" xmlns:p="http://schemas.openxmlformats.org/presentationml/2006/main">
+  <p:cSld>
+    <p:bg>
+      <p:bgPr>
+        <a:solidFill>
+          <a:schemeClr val="bg2"/>
+        </a:solidFill>
+        <a:effectLst/>
+      </p:bgPr>
+    </p:bg>
+    <p:spTree>
+      <p:nvGrpSpPr>
+        <p:cNvPr id="1" name=""/>
+        <p:cNvGrpSpPr/>
+        <p:nvPr/>
+      </p:nvGrpSpPr>
+      <p:grpSpPr>
+        <a:xfrm>
+          <a:off x="0" y="0"/>
+          <a:ext cx="0" cy="0"/>
+          <a:chOff x="0" y="0"/>
+          <a:chExt cx="0" cy="0"/>
+        </a:xfrm>
+      </p:grpSpPr>
+      <p:sp useBgFill="1">
+        <p:nvSpPr>
+          <p:cNvPr id="36" name="Rectangle 35">
+            <a:extLst>
+              <a:ext uri="{FF2B5EF4-FFF2-40B4-BE49-F238E27FC236}">
+                <a16:creationId xmlns:a16="http://schemas.microsoft.com/office/drawing/2014/main" xmlns="" id="{8BCFA5F4-1A8E-48F5-9209-7F24485B1D78}"/>
+              </a:ext>
+              <a:ext uri="{C183D7F6-B498-43B3-948B-1728B52AA6E4}">
+                <adec:decorative xmlns:adec="http://schemas.microsoft.com/office/drawing/2017/decorative" xmlns="" val="1"/>
+              </a:ext>
+            </a:extLst>
+          </p:cNvPr>
+          <p:cNvSpPr>
+            <a:spLocks noGrp="1" noRot="1" noChangeAspect="1" noMove="1" noResize="1" noEditPoints="1" noAdjustHandles="1" noChangeArrowheads="1" noChangeShapeType="1" noTextEdit="1"/>
+          </p:cNvSpPr>
+          <p:nvPr>
+            <p:extLst>
+              <p:ext uri="{386F3935-93C4-4BCD-93E2-E3B085C9AB24}">
+                <p16:designElem xmlns:p16="http://schemas.microsoft.com/office/powerpoint/2015/main" xmlns="" val="1"/>
+              </p:ext>
+            </p:extLst>
+          </p:nvPr>
+        </p:nvSpPr>
+        <p:spPr>
+          <a:xfrm>
+            <a:off x="0" y="0"/>
+            <a:ext cx="12192000" cy="6858000"/>
+          </a:xfrm>
+          <a:prstGeom prst="rect">
+            <a:avLst/>
+          </a:prstGeom>
+          <a:ln>
+            <a:noFill/>
+          </a:ln>
+        </p:spPr>
+        <p:style>
+          <a:lnRef idx="2">
+            <a:schemeClr val="accent1">
+              <a:shade val="50000"/>
+            </a:schemeClr>
+          </a:lnRef>
+          <a:fillRef idx="1">
+            <a:schemeClr val="accent1"/>
+          </a:fillRef>
+          <a:effectRef idx="0">
+            <a:schemeClr val="accent1"/>
+          </a:effectRef>
+          <a:fontRef idx="minor">
+            <a:schemeClr val="lt1"/>
+          </a:fontRef>
+        </p:style>
+        <p:txBody>
+          <a:bodyPr rtlCol="0" anchor="ctr"/>
+          <a:lstStyle/>
+          <a:p>
+            <a:pPr algn="ctr"/>
+            <a:endParaRPr lang="en-US"/>
+          </a:p>
+        </p:txBody>
+      </p:sp>
+      <p:sp>
+        <p:nvSpPr>
+          <p:cNvPr id="38" name="Rectangle 37">
+            <a:extLst>
+              <a:ext uri="{FF2B5EF4-FFF2-40B4-BE49-F238E27FC236}">
+                <a16:creationId xmlns:a16="http://schemas.microsoft.com/office/drawing/2014/main" xmlns="" id="{A8074621-AE44-40C4-8323-DF5185BC954E}"/>
+              </a:ext>
+              <a:ext uri="{C183D7F6-B498-43B3-948B-1728B52AA6E4}">
+                <adec:decorative xmlns:adec="http://schemas.microsoft.com/office/drawing/2017/decorative" xmlns="" val="1"/>
+              </a:ext>
+            </a:extLst>
+          </p:cNvPr>
+          <p:cNvSpPr>
+            <a:spLocks noGrp="1" noRot="1" noChangeAspect="1" noMove="1" noResize="1" noEditPoints="1" noAdjustHandles="1" noChangeArrowheads="1" noChangeShapeType="1" noTextEdit="1"/>
+          </p:cNvSpPr>
+          <p:nvPr>
+            <p:extLst>
+              <p:ext uri="{386F3935-93C4-4BCD-93E2-E3B085C9AB24}">
+                <p16:designElem xmlns:p16="http://schemas.microsoft.com/office/powerpoint/2015/main" xmlns="" val="1"/>
+              </p:ext>
+            </p:extLst>
+          </p:nvPr>
+        </p:nvSpPr>
+        <p:spPr>
+          <a:xfrm>
+            <a:off x="0" y="0"/>
+            <a:ext cx="12192000" cy="2053062"/>
+          </a:xfrm>
+          <a:prstGeom prst="rect">
+            <a:avLst/>
+          </a:prstGeom>
+          <a:solidFill>
+            <a:schemeClr val="bg2">
+              <a:lumMod val="75000"/>
+            </a:schemeClr>
+          </a:solidFill>
+          <a:ln>
+            <a:noFill/>
+          </a:ln>
+        </p:spPr>
+        <p:style>
+          <a:lnRef idx="2">
+            <a:schemeClr val="accent1">
+              <a:shade val="50000"/>
+            </a:schemeClr>
+          </a:lnRef>
+          <a:fillRef idx="1">
+            <a:schemeClr val="accent1"/>
+          </a:fillRef>
+          <a:effectRef idx="0">
+            <a:schemeClr val="accent1"/>
+          </a:effectRef>
+          <a:fontRef idx="minor">
+            <a:schemeClr val="lt1"/>
+          </a:fontRef>
+        </p:style>
+        <p:txBody>
+          <a:bodyPr rtlCol="0" anchor="ctr"/>
+          <a:lstStyle/>
+          <a:p>
+            <a:pPr algn="ctr"/>
+            <a:endParaRPr lang="en-US"/>
+          </a:p>
+        </p:txBody>
+      </p:sp>
+      <p:sp>
+        <p:nvSpPr>
+          <p:cNvPr id="2" name="Title 1">
+            <a:extLst>
+              <a:ext uri="{FF2B5EF4-FFF2-40B4-BE49-F238E27FC236}">
+                <a16:creationId xmlns:a16="http://schemas.microsoft.com/office/drawing/2014/main" xmlns="" id="{98665829-B67C-1898-629C-AC1781FAF9BD}"/>
+              </a:ext>
+            </a:extLst>
+          </p:cNvPr>
+          <p:cNvSpPr>
+            <a:spLocks noGrp="1"/>
+          </p:cNvSpPr>
+          <p:nvPr>
+            <p:ph type="title"/>
+          </p:nvPr>
+        </p:nvSpPr>
+        <p:spPr/>
+        <p:txBody>
+          <a:bodyPr>
+            <a:normAutofit/>
+          </a:bodyPr>
+          <a:lstStyle/>
+          <a:p>
+            <a:r>
+              <a:rPr lang="en-US" dirty="0" smtClean="0"/>
+              <a:t>Who cares?</a:t>
+            </a:r>
+            <a:endParaRPr lang="en-US" sz="3600" dirty="0"/>
+          </a:p>
+        </p:txBody>
+      </p:sp>
+      <p:sp>
+        <p:nvSpPr>
+          <p:cNvPr id="4" name="Content Placeholder 3"/>
+          <p:cNvSpPr>
+            <a:spLocks noGrp="1"/>
+          </p:cNvSpPr>
+          <p:nvPr>
+            <p:ph sz="quarter" idx="13"/>
+          </p:nvPr>
+        </p:nvSpPr>
+        <p:spPr/>
+        <p:txBody>
+          <a:bodyPr/>
+          <a:lstStyle/>
+          <a:p>
+            <a:r>
+              <a:rPr lang="en-US" cap="none" dirty="0" smtClean="0"/>
+              <a:t>Frees us from choosing among possible candidate functions</a:t>
+            </a:r>
+            <a:endParaRPr lang="en-CA" cap="none" dirty="0" smtClean="0"/>
+          </a:p>
+          <a:p>
+            <a:r>
+              <a:rPr lang="en-US" cap="none" dirty="0" smtClean="0"/>
+              <a:t>Ensemble simulations capture variety of possible responses</a:t>
+            </a:r>
+          </a:p>
+          <a:p>
+            <a:endParaRPr lang="en-US" cap="none" dirty="0" smtClean="0"/>
+          </a:p>
+        </p:txBody>
+      </p:sp>
+    </p:spTree>
+    <p:extLst>
+      <p:ext uri="{BB962C8B-B14F-4D97-AF65-F5344CB8AC3E}">
+        <p14:creationId xmlns:p14="http://schemas.microsoft.com/office/powerpoint/2010/main" val="3003051711"/>
+      </p:ext>
+    </p:extLst>
+  </p:cSld>
+  <p:clrMapOvr>
+    <a:overrideClrMapping bg1="dk1" tx1="lt1" bg2="dk2" tx2="lt2" accent1="accent1" accent2="accent2" accent3="accent3" accent4="accent4" accent5="accent5" accent6="accent6" hlink="hlink" folHlink="folHlink"/>
+  </p:clrMapOvr>
+</p:sld>
+</file>
+
+<file path=ppt/slides/slide15.xml><?xml version="1.0" encoding="utf-8"?>
+<p:sld xmlns:a="http://schemas.openxmlformats.org/drawingml/2006/main" xmlns:r="http://schemas.openxmlformats.org/officeDocument/2006/relationships" xmlns:p="http://schemas.openxmlformats.org/presentationml/2006/main">
+  <p:cSld>
+    <p:bg>
+      <p:bgPr>
+        <a:solidFill>
+          <a:schemeClr val="bg2"/>
+        </a:solidFill>
+        <a:effectLst/>
+      </p:bgPr>
+    </p:bg>
+    <p:spTree>
+      <p:nvGrpSpPr>
+        <p:cNvPr id="1" name=""/>
+        <p:cNvGrpSpPr/>
+        <p:nvPr/>
+      </p:nvGrpSpPr>
+      <p:grpSpPr>
+        <a:xfrm>
+          <a:off x="0" y="0"/>
+          <a:ext cx="0" cy="0"/>
+          <a:chOff x="0" y="0"/>
+          <a:chExt cx="0" cy="0"/>
+        </a:xfrm>
+      </p:grpSpPr>
+      <p:sp useBgFill="1">
+        <p:nvSpPr>
+          <p:cNvPr id="36" name="Rectangle 35">
+            <a:extLst>
+              <a:ext uri="{FF2B5EF4-FFF2-40B4-BE49-F238E27FC236}">
+                <a16:creationId xmlns:a16="http://schemas.microsoft.com/office/drawing/2014/main" xmlns="" id="{8BCFA5F4-1A8E-48F5-9209-7F24485B1D78}"/>
+              </a:ext>
+              <a:ext uri="{C183D7F6-B498-43B3-948B-1728B52AA6E4}">
+                <adec:decorative xmlns:adec="http://schemas.microsoft.com/office/drawing/2017/decorative" xmlns="" val="1"/>
+              </a:ext>
+            </a:extLst>
+          </p:cNvPr>
+          <p:cNvSpPr>
+            <a:spLocks noGrp="1" noRot="1" noChangeAspect="1" noMove="1" noResize="1" noEditPoints="1" noAdjustHandles="1" noChangeArrowheads="1" noChangeShapeType="1" noTextEdit="1"/>
+          </p:cNvSpPr>
+          <p:nvPr>
+            <p:extLst>
+              <p:ext uri="{386F3935-93C4-4BCD-93E2-E3B085C9AB24}">
+                <p16:designElem xmlns:p16="http://schemas.microsoft.com/office/powerpoint/2015/main" xmlns="" val="1"/>
+              </p:ext>
+            </p:extLst>
+          </p:nvPr>
+        </p:nvSpPr>
+        <p:spPr>
+          <a:xfrm>
+            <a:off x="0" y="0"/>
+            <a:ext cx="12192000" cy="6858000"/>
+          </a:xfrm>
+          <a:prstGeom prst="rect">
+            <a:avLst/>
+          </a:prstGeom>
+          <a:ln>
+            <a:noFill/>
+          </a:ln>
+        </p:spPr>
+        <p:style>
+          <a:lnRef idx="2">
+            <a:schemeClr val="accent1">
+              <a:shade val="50000"/>
+            </a:schemeClr>
+          </a:lnRef>
+          <a:fillRef idx="1">
+            <a:schemeClr val="accent1"/>
+          </a:fillRef>
+          <a:effectRef idx="0">
+            <a:schemeClr val="accent1"/>
+          </a:effectRef>
+          <a:fontRef idx="minor">
+            <a:schemeClr val="lt1"/>
+          </a:fontRef>
+        </p:style>
+        <p:txBody>
+          <a:bodyPr rtlCol="0" anchor="ctr"/>
+          <a:lstStyle/>
+          <a:p>
+            <a:pPr algn="ctr"/>
+            <a:endParaRPr lang="en-US"/>
+          </a:p>
+        </p:txBody>
+      </p:sp>
+      <p:sp>
+        <p:nvSpPr>
+          <p:cNvPr id="38" name="Rectangle 37">
+            <a:extLst>
+              <a:ext uri="{FF2B5EF4-FFF2-40B4-BE49-F238E27FC236}">
+                <a16:creationId xmlns:a16="http://schemas.microsoft.com/office/drawing/2014/main" xmlns="" id="{A8074621-AE44-40C4-8323-DF5185BC954E}"/>
+              </a:ext>
+              <a:ext uri="{C183D7F6-B498-43B3-948B-1728B52AA6E4}">
+                <adec:decorative xmlns:adec="http://schemas.microsoft.com/office/drawing/2017/decorative" xmlns="" val="1"/>
+              </a:ext>
+            </a:extLst>
+          </p:cNvPr>
+          <p:cNvSpPr>
+            <a:spLocks noGrp="1" noRot="1" noChangeAspect="1" noMove="1" noResize="1" noEditPoints="1" noAdjustHandles="1" noChangeArrowheads="1" noChangeShapeType="1" noTextEdit="1"/>
+          </p:cNvSpPr>
+          <p:nvPr>
+            <p:extLst>
+              <p:ext uri="{386F3935-93C4-4BCD-93E2-E3B085C9AB24}">
+                <p16:designElem xmlns:p16="http://schemas.microsoft.com/office/powerpoint/2015/main" xmlns="" val="1"/>
+              </p:ext>
+            </p:extLst>
+          </p:nvPr>
+        </p:nvSpPr>
+        <p:spPr>
+          <a:xfrm>
+            <a:off x="0" y="0"/>
+            <a:ext cx="12192000" cy="2053062"/>
+          </a:xfrm>
+          <a:prstGeom prst="rect">
+            <a:avLst/>
+          </a:prstGeom>
+          <a:solidFill>
+            <a:schemeClr val="bg2">
+              <a:lumMod val="75000"/>
+            </a:schemeClr>
+          </a:solidFill>
+          <a:ln>
+            <a:noFill/>
+          </a:ln>
+        </p:spPr>
+        <p:style>
+          <a:lnRef idx="2">
+            <a:schemeClr val="accent1">
+              <a:shade val="50000"/>
+            </a:schemeClr>
+          </a:lnRef>
+          <a:fillRef idx="1">
+            <a:schemeClr val="accent1"/>
+          </a:fillRef>
+          <a:effectRef idx="0">
+            <a:schemeClr val="accent1"/>
+          </a:effectRef>
+          <a:fontRef idx="minor">
+            <a:schemeClr val="lt1"/>
+          </a:fontRef>
+        </p:style>
+        <p:txBody>
+          <a:bodyPr rtlCol="0" anchor="ctr"/>
+          <a:lstStyle/>
+          <a:p>
+            <a:pPr algn="ctr"/>
+            <a:endParaRPr lang="en-US"/>
+          </a:p>
+        </p:txBody>
+      </p:sp>
+      <p:sp>
+        <p:nvSpPr>
+          <p:cNvPr id="2" name="Title 1">
+            <a:extLst>
+              <a:ext uri="{FF2B5EF4-FFF2-40B4-BE49-F238E27FC236}">
+                <a16:creationId xmlns:a16="http://schemas.microsoft.com/office/drawing/2014/main" xmlns="" id="{98665829-B67C-1898-629C-AC1781FAF9BD}"/>
+              </a:ext>
+            </a:extLst>
+          </p:cNvPr>
+          <p:cNvSpPr>
+            <a:spLocks noGrp="1"/>
+          </p:cNvSpPr>
+          <p:nvPr>
+            <p:ph type="title"/>
+          </p:nvPr>
+        </p:nvSpPr>
+        <p:spPr/>
+        <p:txBody>
+          <a:bodyPr>
+            <a:normAutofit/>
+          </a:bodyPr>
+          <a:lstStyle/>
+          <a:p>
+            <a:r>
               <a:rPr lang="en-US" sz="3600" dirty="0" smtClean="0"/>
               <a:t>Future Directions</a:t>
             </a:r>
@@ -12470,7 +15118,7 @@
 </p:sld>
 </file>
 
-<file path=ppt/slides/slide12.xml><?xml version="1.0" encoding="utf-8"?>
+<file path=ppt/slides/slide16.xml><?xml version="1.0" encoding="utf-8"?>
 <p:sld xmlns:a="http://schemas.openxmlformats.org/drawingml/2006/main" xmlns:r="http://schemas.openxmlformats.org/officeDocument/2006/relationships" xmlns:p="http://schemas.openxmlformats.org/presentationml/2006/main">
   <p:cSld>
     <p:bg>
@@ -13076,29 +15724,573 @@
           <a:lstStyle/>
           <a:p>
             <a:r>
+              <a:rPr lang="en-US" dirty="0" err="1" smtClean="0"/>
+              <a:t>behavioural</a:t>
+            </a:r>
+            <a:r>
               <a:rPr lang="en-US" dirty="0" smtClean="0"/>
-              <a:t>Disease modeling</a:t>
+              <a:t> modeling</a:t>
             </a:r>
             <a:endParaRPr lang="en-US" sz="3600" dirty="0"/>
           </a:p>
         </p:txBody>
       </p:sp>
-      <p:sp>
-        <p:nvSpPr>
-          <p:cNvPr id="4" name="Content Placeholder 3"/>
-          <p:cNvSpPr>
-            <a:spLocks noGrp="1"/>
-          </p:cNvSpPr>
-          <p:nvPr>
-            <p:ph sz="quarter" idx="13"/>
-          </p:nvPr>
-        </p:nvSpPr>
-        <p:spPr/>
-        <p:txBody>
-          <a:bodyPr/>
+      <p:grpSp>
+        <p:nvGrpSpPr>
+          <p:cNvPr id="7" name="Group 6"/>
+          <p:cNvGrpSpPr/>
+          <p:nvPr/>
+        </p:nvGrpSpPr>
+        <p:grpSpPr>
+          <a:xfrm>
+            <a:off x="447404" y="2238109"/>
+            <a:ext cx="5257800" cy="2550310"/>
+            <a:chOff x="429986" y="2107474"/>
+            <a:chExt cx="5257800" cy="2550310"/>
+          </a:xfrm>
+        </p:grpSpPr>
+        <mc:AlternateContent xmlns:mc="http://schemas.openxmlformats.org/markup-compatibility/2006" xmlns:a14="http://schemas.microsoft.com/office/drawing/2010/main">
+          <mc:Choice Requires="a14">
+            <p:sp>
+              <p:nvSpPr>
+                <p:cNvPr id="8" name="TextBox 7"/>
+                <p:cNvSpPr txBox="1"/>
+                <p:nvPr/>
+              </p:nvSpPr>
+              <p:spPr>
+                <a:xfrm>
+                  <a:off x="429986" y="2107474"/>
+                  <a:ext cx="5257800" cy="2103653"/>
+                </a:xfrm>
+                <a:prstGeom prst="rect">
+                  <a:avLst/>
+                </a:prstGeom>
+                <a:noFill/>
+              </p:spPr>
+              <p:txBody>
+                <a:bodyPr wrap="square" lIns="0" tIns="0" rIns="0" bIns="0" rtlCol="0">
+                  <a:spAutoFit/>
+                </a:bodyPr>
+                <a:lstStyle/>
+                <a:p>
+                  <a:pPr/>
+                  <a14:m>
+                    <m:oMathPara xmlns:m="http://schemas.openxmlformats.org/officeDocument/2006/math">
+                      <m:oMathParaPr>
+                        <m:jc m:val="centerGroup"/>
+                      </m:oMathParaPr>
+                      <m:oMath xmlns:m="http://schemas.openxmlformats.org/officeDocument/2006/math">
+                        <m:f>
+                          <m:fPr>
+                            <m:ctrlPr>
+                              <a:rPr lang="en-CA" sz="2400" i="1" smtClean="0">
+                                <a:latin typeface="Cambria Math" panose="02040503050406030204" pitchFamily="18" charset="0"/>
+                              </a:rPr>
+                            </m:ctrlPr>
+                          </m:fPr>
+                          <m:num>
+                            <m:r>
+                              <a:rPr lang="en-CA" sz="2400" i="1" smtClean="0">
+                                <a:latin typeface="Cambria Math" panose="02040503050406030204" pitchFamily="18" charset="0"/>
+                              </a:rPr>
+                              <m:t>𝑑</m:t>
+                            </m:r>
+                            <m:r>
+                              <a:rPr lang="en-US" sz="2400" b="0" i="1" smtClean="0">
+                                <a:latin typeface="Cambria Math" panose="02040503050406030204" pitchFamily="18" charset="0"/>
+                              </a:rPr>
+                              <m:t>𝑆</m:t>
+                            </m:r>
+                          </m:num>
+                          <m:den>
+                            <m:r>
+                              <a:rPr lang="en-CA" sz="2400" i="1" smtClean="0">
+                                <a:latin typeface="Cambria Math" panose="02040503050406030204" pitchFamily="18" charset="0"/>
+                              </a:rPr>
+                              <m:t>𝑑</m:t>
+                            </m:r>
+                            <m:r>
+                              <a:rPr lang="en-US" sz="2400" b="0" i="1" smtClean="0">
+                                <a:latin typeface="Cambria Math" panose="02040503050406030204" pitchFamily="18" charset="0"/>
+                              </a:rPr>
+                              <m:t>𝑡</m:t>
+                            </m:r>
+                          </m:den>
+                        </m:f>
+                        <m:r>
+                          <a:rPr lang="en-US" sz="2400" b="0" i="1" smtClean="0">
+                            <a:latin typeface="Cambria Math" panose="02040503050406030204" pitchFamily="18" charset="0"/>
+                          </a:rPr>
+                          <m:t>=</m:t>
+                        </m:r>
+                        <m:r>
+                          <a:rPr lang="en-US" sz="2400" b="0" i="1" smtClean="0">
+                            <a:latin typeface="Cambria Math" panose="02040503050406030204" pitchFamily="18" charset="0"/>
+                            <a:ea typeface="Cambria Math" panose="02040503050406030204" pitchFamily="18" charset="0"/>
+                          </a:rPr>
+                          <m:t>𝜇</m:t>
+                        </m:r>
+                        <m:d>
+                          <m:dPr>
+                            <m:ctrlPr>
+                              <a:rPr lang="en-US" sz="2400" b="0" i="1" smtClean="0">
+                                <a:latin typeface="Cambria Math" panose="02040503050406030204" pitchFamily="18" charset="0"/>
+                                <a:ea typeface="Cambria Math" panose="02040503050406030204" pitchFamily="18" charset="0"/>
+                              </a:rPr>
+                            </m:ctrlPr>
+                          </m:dPr>
+                          <m:e>
+                            <m:r>
+                              <a:rPr lang="en-US" sz="2400" b="0" i="1" smtClean="0">
+                                <a:latin typeface="Cambria Math" panose="02040503050406030204" pitchFamily="18" charset="0"/>
+                                <a:ea typeface="Cambria Math" panose="02040503050406030204" pitchFamily="18" charset="0"/>
+                              </a:rPr>
+                              <m:t>1−</m:t>
+                            </m:r>
+                            <m:r>
+                              <a:rPr lang="en-US" sz="2400" b="0" i="1" smtClean="0">
+                                <a:latin typeface="Cambria Math" panose="02040503050406030204" pitchFamily="18" charset="0"/>
+                                <a:ea typeface="Cambria Math" panose="02040503050406030204" pitchFamily="18" charset="0"/>
+                              </a:rPr>
+                              <m:t>𝑥</m:t>
+                            </m:r>
+                          </m:e>
+                        </m:d>
+                        <m:r>
+                          <a:rPr lang="en-US" sz="2400" b="0" i="1" smtClean="0">
+                            <a:latin typeface="Cambria Math" panose="02040503050406030204" pitchFamily="18" charset="0"/>
+                            <a:ea typeface="Cambria Math" panose="02040503050406030204" pitchFamily="18" charset="0"/>
+                          </a:rPr>
+                          <m:t>−</m:t>
+                        </m:r>
+                        <m:r>
+                          <a:rPr lang="en-US" sz="2400" b="0" i="1" smtClean="0">
+                            <a:latin typeface="Cambria Math" panose="02040503050406030204" pitchFamily="18" charset="0"/>
+                            <a:ea typeface="Cambria Math" panose="02040503050406030204" pitchFamily="18" charset="0"/>
+                          </a:rPr>
+                          <m:t>𝛽</m:t>
+                        </m:r>
+                        <m:r>
+                          <a:rPr lang="en-US" sz="2400" b="0" i="1" smtClean="0">
+                            <a:latin typeface="Cambria Math" panose="02040503050406030204" pitchFamily="18" charset="0"/>
+                            <a:ea typeface="Cambria Math" panose="02040503050406030204" pitchFamily="18" charset="0"/>
+                          </a:rPr>
+                          <m:t>𝑆𝐼</m:t>
+                        </m:r>
+                      </m:oMath>
+                    </m:oMathPara>
+                  </a14:m>
+                  <a:endParaRPr lang="en-US" sz="2400" b="0" dirty="0" smtClean="0">
+                    <a:ea typeface="Cambria Math" panose="02040503050406030204" pitchFamily="18" charset="0"/>
+                  </a:endParaRPr>
+                </a:p>
+                <a:p>
+                  <a:pPr/>
+                  <a14:m>
+                    <m:oMathPara xmlns:m="http://schemas.openxmlformats.org/officeDocument/2006/math">
+                      <m:oMathParaPr>
+                        <m:jc m:val="centerGroup"/>
+                      </m:oMathParaPr>
+                      <m:oMath xmlns:m="http://schemas.openxmlformats.org/officeDocument/2006/math">
+                        <m:f>
+                          <m:fPr>
+                            <m:ctrlPr>
+                              <a:rPr lang="en-CA" sz="2400" i="1" smtClean="0">
+                                <a:latin typeface="Cambria Math" panose="02040503050406030204" pitchFamily="18" charset="0"/>
+                              </a:rPr>
+                            </m:ctrlPr>
+                          </m:fPr>
+                          <m:num>
+                            <m:r>
+                              <a:rPr lang="en-CA" sz="2400" i="1" smtClean="0">
+                                <a:latin typeface="Cambria Math" panose="02040503050406030204" pitchFamily="18" charset="0"/>
+                              </a:rPr>
+                              <m:t>𝑑</m:t>
+                            </m:r>
+                            <m:r>
+                              <a:rPr lang="en-US" sz="2400" b="0" i="1" smtClean="0">
+                                <a:latin typeface="Cambria Math" panose="02040503050406030204" pitchFamily="18" charset="0"/>
+                              </a:rPr>
+                              <m:t>𝐼</m:t>
+                            </m:r>
+                          </m:num>
+                          <m:den>
+                            <m:r>
+                              <a:rPr lang="en-CA" sz="2400" i="1" smtClean="0">
+                                <a:latin typeface="Cambria Math" panose="02040503050406030204" pitchFamily="18" charset="0"/>
+                              </a:rPr>
+                              <m:t>𝑑</m:t>
+                            </m:r>
+                            <m:r>
+                              <a:rPr lang="en-US" sz="2400" b="0" i="1" smtClean="0">
+                                <a:latin typeface="Cambria Math" panose="02040503050406030204" pitchFamily="18" charset="0"/>
+                              </a:rPr>
+                              <m:t>𝑡</m:t>
+                            </m:r>
+                          </m:den>
+                        </m:f>
+                        <m:r>
+                          <a:rPr lang="en-US" sz="2400" b="0" i="1" smtClean="0">
+                            <a:latin typeface="Cambria Math" panose="02040503050406030204" pitchFamily="18" charset="0"/>
+                          </a:rPr>
+                          <m:t>=</m:t>
+                        </m:r>
+                        <m:r>
+                          <a:rPr lang="en-US" sz="2400" b="0" i="1" smtClean="0">
+                            <a:latin typeface="Cambria Math" panose="02040503050406030204" pitchFamily="18" charset="0"/>
+                            <a:ea typeface="Cambria Math" panose="02040503050406030204" pitchFamily="18" charset="0"/>
+                          </a:rPr>
+                          <m:t>𝛽</m:t>
+                        </m:r>
+                        <m:r>
+                          <a:rPr lang="en-US" sz="2400" b="0" i="1" smtClean="0">
+                            <a:latin typeface="Cambria Math" panose="02040503050406030204" pitchFamily="18" charset="0"/>
+                            <a:ea typeface="Cambria Math" panose="02040503050406030204" pitchFamily="18" charset="0"/>
+                          </a:rPr>
+                          <m:t>𝑆𝐼</m:t>
+                        </m:r>
+                        <m:r>
+                          <a:rPr lang="en-US" sz="2400" b="0" i="1" smtClean="0">
+                            <a:latin typeface="Cambria Math" panose="02040503050406030204" pitchFamily="18" charset="0"/>
+                            <a:ea typeface="Cambria Math" panose="02040503050406030204" pitchFamily="18" charset="0"/>
+                          </a:rPr>
+                          <m:t>−</m:t>
+                        </m:r>
+                        <m:r>
+                          <a:rPr lang="en-US" sz="2400" b="0" i="1" smtClean="0">
+                            <a:latin typeface="Cambria Math" panose="02040503050406030204" pitchFamily="18" charset="0"/>
+                            <a:ea typeface="Cambria Math" panose="02040503050406030204" pitchFamily="18" charset="0"/>
+                          </a:rPr>
+                          <m:t>𝜇</m:t>
+                        </m:r>
+                        <m:r>
+                          <a:rPr lang="en-US" sz="2400" b="0" i="1" smtClean="0">
+                            <a:latin typeface="Cambria Math" panose="02040503050406030204" pitchFamily="18" charset="0"/>
+                            <a:ea typeface="Cambria Math" panose="02040503050406030204" pitchFamily="18" charset="0"/>
+                          </a:rPr>
+                          <m:t>𝐼</m:t>
+                        </m:r>
+                        <m:r>
+                          <a:rPr lang="en-US" sz="2400" b="0" i="1" smtClean="0">
+                            <a:latin typeface="Cambria Math" panose="02040503050406030204" pitchFamily="18" charset="0"/>
+                            <a:ea typeface="Cambria Math" panose="02040503050406030204" pitchFamily="18" charset="0"/>
+                          </a:rPr>
+                          <m:t>−</m:t>
+                        </m:r>
+                        <m:r>
+                          <a:rPr lang="en-US" sz="2400" b="0" i="1" smtClean="0">
+                            <a:latin typeface="Cambria Math" panose="02040503050406030204" pitchFamily="18" charset="0"/>
+                            <a:ea typeface="Cambria Math" panose="02040503050406030204" pitchFamily="18" charset="0"/>
+                          </a:rPr>
+                          <m:t>𝛾</m:t>
+                        </m:r>
+                        <m:r>
+                          <a:rPr lang="en-US" sz="2400" b="0" i="1" smtClean="0">
+                            <a:latin typeface="Cambria Math" panose="02040503050406030204" pitchFamily="18" charset="0"/>
+                            <a:ea typeface="Cambria Math" panose="02040503050406030204" pitchFamily="18" charset="0"/>
+                          </a:rPr>
+                          <m:t>𝐼</m:t>
+                        </m:r>
+                      </m:oMath>
+                    </m:oMathPara>
+                  </a14:m>
+                  <a:endParaRPr lang="en-US" sz="2400" b="0" dirty="0" smtClean="0">
+                    <a:ea typeface="Cambria Math" panose="02040503050406030204" pitchFamily="18" charset="0"/>
+                  </a:endParaRPr>
+                </a:p>
+                <a:p>
+                  <a:pPr/>
+                  <a14:m>
+                    <m:oMathPara xmlns:m="http://schemas.openxmlformats.org/officeDocument/2006/math">
+                      <m:oMathParaPr>
+                        <m:jc m:val="centerGroup"/>
+                      </m:oMathParaPr>
+                      <m:oMath xmlns:m="http://schemas.openxmlformats.org/officeDocument/2006/math">
+                        <m:f>
+                          <m:fPr>
+                            <m:ctrlPr>
+                              <a:rPr lang="en-CA" sz="2400" b="0" i="1" smtClean="0">
+                                <a:latin typeface="Cambria Math" panose="02040503050406030204" pitchFamily="18" charset="0"/>
+                              </a:rPr>
+                            </m:ctrlPr>
+                          </m:fPr>
+                          <m:num>
+                            <m:r>
+                              <a:rPr lang="en-CA" sz="2400" i="1" smtClean="0">
+                                <a:latin typeface="Cambria Math" panose="02040503050406030204" pitchFamily="18" charset="0"/>
+                              </a:rPr>
+                              <m:t>𝑑</m:t>
+                            </m:r>
+                            <m:r>
+                              <a:rPr lang="en-US" sz="2400" b="0" i="1" smtClean="0">
+                                <a:latin typeface="Cambria Math" panose="02040503050406030204" pitchFamily="18" charset="0"/>
+                              </a:rPr>
+                              <m:t>𝑉</m:t>
+                            </m:r>
+                          </m:num>
+                          <m:den>
+                            <m:r>
+                              <a:rPr lang="en-CA" sz="2400" i="1" smtClean="0">
+                                <a:latin typeface="Cambria Math" panose="02040503050406030204" pitchFamily="18" charset="0"/>
+                              </a:rPr>
+                              <m:t>𝑑</m:t>
+                            </m:r>
+                            <m:r>
+                              <a:rPr lang="en-US" sz="2400" b="0" i="1" smtClean="0">
+                                <a:latin typeface="Cambria Math" panose="02040503050406030204" pitchFamily="18" charset="0"/>
+                              </a:rPr>
+                              <m:t>𝑡</m:t>
+                            </m:r>
+                          </m:den>
+                        </m:f>
+                        <m:r>
+                          <a:rPr lang="en-US" sz="2400" b="0" i="1" smtClean="0">
+                            <a:latin typeface="Cambria Math" panose="02040503050406030204" pitchFamily="18" charset="0"/>
+                          </a:rPr>
+                          <m:t>=</m:t>
+                        </m:r>
+                        <m:r>
+                          <a:rPr lang="en-US" sz="2400" b="0" i="1" smtClean="0">
+                            <a:solidFill>
+                              <a:srgbClr val="FF0000"/>
+                            </a:solidFill>
+                            <a:latin typeface="Cambria Math" panose="02040503050406030204" pitchFamily="18" charset="0"/>
+                          </a:rPr>
+                          <m:t>𝑘</m:t>
+                        </m:r>
+                        <m:r>
+                          <a:rPr lang="en-US" sz="2400" b="0" i="1" smtClean="0">
+                            <a:latin typeface="Cambria Math" panose="02040503050406030204" pitchFamily="18" charset="0"/>
+                          </a:rPr>
+                          <m:t>𝑥</m:t>
+                        </m:r>
+                        <m:r>
+                          <a:rPr lang="en-US" sz="2400" b="0" i="1" smtClean="0">
+                            <a:latin typeface="Cambria Math" panose="02040503050406030204" pitchFamily="18" charset="0"/>
+                          </a:rPr>
+                          <m:t>(1−</m:t>
+                        </m:r>
+                        <m:r>
+                          <a:rPr lang="en-US" sz="2400" b="0" i="1" smtClean="0">
+                            <a:latin typeface="Cambria Math" panose="02040503050406030204" pitchFamily="18" charset="0"/>
+                          </a:rPr>
+                          <m:t>𝑥</m:t>
+                        </m:r>
+                        <m:r>
+                          <a:rPr lang="en-US" sz="2400" b="0" i="1" smtClean="0">
+                            <a:latin typeface="Cambria Math" panose="02040503050406030204" pitchFamily="18" charset="0"/>
+                          </a:rPr>
+                          <m:t>)(</m:t>
+                        </m:r>
+                        <m:r>
+                          <a:rPr lang="en-US" sz="2400" b="0" i="1" smtClean="0">
+                            <a:solidFill>
+                              <a:srgbClr val="FF0000"/>
+                            </a:solidFill>
+                            <a:latin typeface="Cambria Math" panose="02040503050406030204" pitchFamily="18" charset="0"/>
+                            <a:ea typeface="Cambria Math" panose="02040503050406030204" pitchFamily="18" charset="0"/>
+                          </a:rPr>
+                          <m:t>𝜔</m:t>
+                        </m:r>
+                        <m:r>
+                          <a:rPr lang="en-US" sz="2400" b="0" i="1" smtClean="0">
+                            <a:latin typeface="Cambria Math" panose="02040503050406030204" pitchFamily="18" charset="0"/>
+                          </a:rPr>
+                          <m:t>+</m:t>
+                        </m:r>
+                        <m:r>
+                          <a:rPr lang="en-US" sz="2400" b="0" i="1" smtClean="0">
+                            <a:latin typeface="Cambria Math" panose="02040503050406030204" pitchFamily="18" charset="0"/>
+                          </a:rPr>
+                          <m:t>𝐼</m:t>
+                        </m:r>
+                        <m:r>
+                          <a:rPr lang="en-US" sz="2400" b="0" i="1" smtClean="0">
+                            <a:latin typeface="Cambria Math" panose="02040503050406030204" pitchFamily="18" charset="0"/>
+                          </a:rPr>
+                          <m:t>+</m:t>
+                        </m:r>
+                        <m:r>
+                          <a:rPr lang="en-US" sz="2400" b="0" i="1" smtClean="0">
+                            <a:solidFill>
+                              <a:srgbClr val="FF0000"/>
+                            </a:solidFill>
+                            <a:latin typeface="Cambria Math" panose="02040503050406030204" pitchFamily="18" charset="0"/>
+                            <a:ea typeface="Cambria Math" panose="02040503050406030204" pitchFamily="18" charset="0"/>
+                          </a:rPr>
+                          <m:t>𝛿</m:t>
+                        </m:r>
+                        <m:d>
+                          <m:dPr>
+                            <m:ctrlPr>
+                              <a:rPr lang="en-US" sz="2400" b="0" i="1" smtClean="0">
+                                <a:latin typeface="Cambria Math" panose="02040503050406030204" pitchFamily="18" charset="0"/>
+                                <a:ea typeface="Cambria Math" panose="02040503050406030204" pitchFamily="18" charset="0"/>
+                              </a:rPr>
+                            </m:ctrlPr>
+                          </m:dPr>
+                          <m:e>
+                            <m:r>
+                              <a:rPr lang="en-US" sz="2400" b="0" i="1" smtClean="0">
+                                <a:latin typeface="Cambria Math" panose="02040503050406030204" pitchFamily="18" charset="0"/>
+                                <a:ea typeface="Cambria Math" panose="02040503050406030204" pitchFamily="18" charset="0"/>
+                              </a:rPr>
+                              <m:t>2</m:t>
+                            </m:r>
+                            <m:r>
+                              <a:rPr lang="en-US" sz="2400" b="0" i="1" smtClean="0">
+                                <a:latin typeface="Cambria Math" panose="02040503050406030204" pitchFamily="18" charset="0"/>
+                                <a:ea typeface="Cambria Math" panose="02040503050406030204" pitchFamily="18" charset="0"/>
+                              </a:rPr>
+                              <m:t>𝑥</m:t>
+                            </m:r>
+                            <m:r>
+                              <a:rPr lang="en-US" sz="2400" b="0" i="1" smtClean="0">
+                                <a:latin typeface="Cambria Math" panose="02040503050406030204" pitchFamily="18" charset="0"/>
+                                <a:ea typeface="Cambria Math" panose="02040503050406030204" pitchFamily="18" charset="0"/>
+                              </a:rPr>
+                              <m:t>−1</m:t>
+                            </m:r>
+                          </m:e>
+                        </m:d>
+                        <m:r>
+                          <a:rPr lang="en-US" sz="2400" b="0" i="1" smtClean="0">
+                            <a:latin typeface="Cambria Math" panose="02040503050406030204" pitchFamily="18" charset="0"/>
+                            <a:ea typeface="Cambria Math" panose="02040503050406030204" pitchFamily="18" charset="0"/>
+                          </a:rPr>
+                          <m:t>)</m:t>
+                        </m:r>
+                      </m:oMath>
+                    </m:oMathPara>
+                  </a14:m>
+                  <a:endParaRPr lang="en-CA" sz="2400" dirty="0"/>
+                </a:p>
+              </p:txBody>
+            </p:sp>
+          </mc:Choice>
+          <mc:Fallback xmlns="">
+            <p:sp>
+              <p:nvSpPr>
+                <p:cNvPr id="5" name="TextBox 4"/>
+                <p:cNvSpPr txBox="1">
+                  <a:spLocks noRot="1" noChangeAspect="1" noMove="1" noResize="1" noEditPoints="1" noAdjustHandles="1" noChangeArrowheads="1" noChangeShapeType="1" noTextEdit="1"/>
+                </p:cNvSpPr>
+                <p:nvPr/>
+              </p:nvSpPr>
+              <p:spPr>
+                <a:xfrm>
+                  <a:off x="429986" y="2107474"/>
+                  <a:ext cx="5257800" cy="2103653"/>
+                </a:xfrm>
+                <a:prstGeom prst="rect">
+                  <a:avLst/>
+                </a:prstGeom>
+                <a:blipFill rotWithShape="0">
+                  <a:blip r:embed="rId3"/>
+                  <a:stretch>
+                    <a:fillRect/>
+                  </a:stretch>
+                </a:blipFill>
+              </p:spPr>
+              <p:txBody>
+                <a:bodyPr/>
+                <a:lstStyle/>
+                <a:p>
+                  <a:r>
+                    <a:rPr lang="en-CA">
+                      <a:noFill/>
+                    </a:rPr>
+                    <a:t> </a:t>
+                  </a:r>
+                </a:p>
+              </p:txBody>
+            </p:sp>
+          </mc:Fallback>
+        </mc:AlternateContent>
+        <p:sp>
+          <p:nvSpPr>
+            <p:cNvPr id="9" name="TextBox 8"/>
+            <p:cNvSpPr txBox="1"/>
+            <p:nvPr/>
+          </p:nvSpPr>
+          <p:spPr>
+            <a:xfrm>
+              <a:off x="619750" y="4396174"/>
+              <a:ext cx="3977640" cy="261610"/>
+            </a:xfrm>
+            <a:prstGeom prst="rect">
+              <a:avLst/>
+            </a:prstGeom>
+            <a:noFill/>
+          </p:spPr>
+          <p:txBody>
+            <a:bodyPr wrap="square" rtlCol="0">
+              <a:spAutoFit/>
+            </a:bodyPr>
+            <a:lstStyle/>
+            <a:p>
+              <a:r>
+                <a:rPr lang="en-US" sz="1100" dirty="0" err="1" smtClean="0"/>
+                <a:t>Oraby</a:t>
+              </a:r>
+              <a:r>
+                <a:rPr lang="en-US" sz="1100" dirty="0" smtClean="0"/>
+                <a:t>, </a:t>
+              </a:r>
+              <a:r>
+                <a:rPr lang="en-US" sz="1100" dirty="0" err="1" smtClean="0"/>
+                <a:t>Thampi</a:t>
+              </a:r>
+              <a:r>
+                <a:rPr lang="en-US" sz="1100" dirty="0" smtClean="0"/>
+                <a:t> &amp; </a:t>
+              </a:r>
+              <a:r>
+                <a:rPr lang="en-US" sz="1100" dirty="0" err="1" smtClean="0"/>
+                <a:t>Bauch</a:t>
+              </a:r>
+              <a:r>
+                <a:rPr lang="en-US" sz="1100" dirty="0" smtClean="0"/>
+                <a:t> (2014)</a:t>
+              </a:r>
+              <a:endParaRPr lang="en-CA" sz="1100" dirty="0"/>
+            </a:p>
+          </p:txBody>
+        </p:sp>
+      </p:grpSp>
+      <p:sp>
+        <p:nvSpPr>
+          <p:cNvPr id="10" name="TextBox 9"/>
+          <p:cNvSpPr txBox="1"/>
+          <p:nvPr/>
+        </p:nvSpPr>
+        <p:spPr>
+          <a:xfrm>
+            <a:off x="637168" y="5077003"/>
+            <a:ext cx="11380661" cy="707886"/>
+          </a:xfrm>
+          <a:prstGeom prst="rect">
+            <a:avLst/>
+          </a:prstGeom>
+          <a:noFill/>
+        </p:spPr>
+        <p:txBody>
+          <a:bodyPr wrap="square" rtlCol="0">
+            <a:spAutoFit/>
+          </a:bodyPr>
           <a:lstStyle/>
           <a:p>
-            <a:endParaRPr lang="en-CA"/>
+            <a:r>
+              <a:rPr lang="en-US" sz="2000" b="1" dirty="0" smtClean="0"/>
+              <a:t>Problem:</a:t>
+            </a:r>
+          </a:p>
+          <a:p>
+            <a:r>
+              <a:rPr lang="en-US" sz="2000" b="1" dirty="0" smtClean="0"/>
+              <a:t>How do we measure perceived risk of vaccine compared to infection or the strength of social norms?</a:t>
+            </a:r>
+            <a:endParaRPr lang="en-CA" sz="2000" b="1" dirty="0"/>
           </a:p>
         </p:txBody>
       </p:sp>
@@ -13112,6 +16304,129 @@
   <p:clrMapOvr>
     <a:overrideClrMapping bg1="dk1" tx1="lt1" bg2="dk2" tx2="lt2" accent1="accent1" accent2="accent2" accent3="accent3" accent4="accent4" accent5="accent5" accent6="accent6" hlink="hlink" folHlink="folHlink"/>
   </p:clrMapOvr>
+  <p:timing>
+    <p:tnLst>
+      <p:par>
+        <p:cTn id="1" dur="indefinite" restart="never" nodeType="tmRoot">
+          <p:childTnLst>
+            <p:seq concurrent="1" nextAc="seek">
+              <p:cTn id="2" dur="indefinite" nodeType="mainSeq">
+                <p:childTnLst>
+                  <p:par>
+                    <p:cTn id="3" fill="hold">
+                      <p:stCondLst>
+                        <p:cond delay="indefinite"/>
+                      </p:stCondLst>
+                      <p:childTnLst>
+                        <p:par>
+                          <p:cTn id="4" fill="hold">
+                            <p:stCondLst>
+                              <p:cond delay="0"/>
+                            </p:stCondLst>
+                            <p:childTnLst>
+                              <p:par>
+                                <p:cTn id="5" presetID="1" presetClass="entr" presetSubtype="0" fill="hold" nodeType="clickEffect">
+                                  <p:stCondLst>
+                                    <p:cond delay="0"/>
+                                  </p:stCondLst>
+                                  <p:childTnLst>
+                                    <p:set>
+                                      <p:cBhvr>
+                                        <p:cTn id="6" dur="1" fill="hold">
+                                          <p:stCondLst>
+                                            <p:cond delay="0"/>
+                                          </p:stCondLst>
+                                        </p:cTn>
+                                        <p:tgtEl>
+                                          <p:spTgt spid="7"/>
+                                        </p:tgtEl>
+                                        <p:attrNameLst>
+                                          <p:attrName>style.visibility</p:attrName>
+                                        </p:attrNameLst>
+                                      </p:cBhvr>
+                                      <p:to>
+                                        <p:strVal val="visible"/>
+                                      </p:to>
+                                    </p:set>
+                                  </p:childTnLst>
+                                </p:cTn>
+                              </p:par>
+                            </p:childTnLst>
+                          </p:cTn>
+                        </p:par>
+                      </p:childTnLst>
+                    </p:cTn>
+                  </p:par>
+                  <p:par>
+                    <p:cTn id="7" fill="hold">
+                      <p:stCondLst>
+                        <p:cond delay="indefinite"/>
+                      </p:stCondLst>
+                      <p:childTnLst>
+                        <p:par>
+                          <p:cTn id="8" fill="hold">
+                            <p:stCondLst>
+                              <p:cond delay="0"/>
+                            </p:stCondLst>
+                            <p:childTnLst>
+                              <p:par>
+                                <p:cTn id="9" presetID="1" presetClass="entr" presetSubtype="0" fill="hold" grpId="0" nodeType="clickEffect">
+                                  <p:stCondLst>
+                                    <p:cond delay="0"/>
+                                  </p:stCondLst>
+                                  <p:childTnLst>
+                                    <p:set>
+                                      <p:cBhvr>
+                                        <p:cTn id="10" dur="1" fill="hold">
+                                          <p:stCondLst>
+                                            <p:cond delay="0"/>
+                                          </p:stCondLst>
+                                        </p:cTn>
+                                        <p:tgtEl>
+                                          <p:spTgt spid="10"/>
+                                        </p:tgtEl>
+                                        <p:attrNameLst>
+                                          <p:attrName>style.visibility</p:attrName>
+                                        </p:attrNameLst>
+                                      </p:cBhvr>
+                                      <p:to>
+                                        <p:strVal val="visible"/>
+                                      </p:to>
+                                    </p:set>
+                                  </p:childTnLst>
+                                </p:cTn>
+                              </p:par>
+                            </p:childTnLst>
+                          </p:cTn>
+                        </p:par>
+                      </p:childTnLst>
+                    </p:cTn>
+                  </p:par>
+                </p:childTnLst>
+              </p:cTn>
+              <p:prevCondLst>
+                <p:cond evt="onPrev" delay="0">
+                  <p:tgtEl>
+                    <p:sldTgt/>
+                  </p:tgtEl>
+                </p:cond>
+              </p:prevCondLst>
+              <p:nextCondLst>
+                <p:cond evt="onNext" delay="0">
+                  <p:tgtEl>
+                    <p:sldTgt/>
+                  </p:tgtEl>
+                </p:cond>
+              </p:nextCondLst>
+            </p:seq>
+          </p:childTnLst>
+        </p:cTn>
+      </p:par>
+    </p:tnLst>
+    <p:bldLst>
+      <p:bldP spid="10" grpId="0"/>
+    </p:bldLst>
+  </p:timing>
 </p:sld>
 </file>
 
@@ -13311,7 +16626,7 @@
           <a:bodyPr/>
           <a:lstStyle/>
           <a:p>
-            <a:endParaRPr lang="en-CA"/>
+            <a:endParaRPr lang="en-CA" dirty="0"/>
           </a:p>
         </p:txBody>
       </p:sp>
@@ -17397,7 +20712,7 @@
       </p:sp>
       <p:sp>
         <p:nvSpPr>
-          <p:cNvPr id="6" name="Flowchart: Data 5"/>
+          <p:cNvPr id="6" name="Flowchart: Alternate Process 5"/>
           <p:cNvSpPr/>
           <p:nvPr/>
         </p:nvSpPr>
@@ -17406,7 +20721,7 @@
             <a:off x="1129935" y="2643334"/>
             <a:ext cx="3910149" cy="751315"/>
           </a:xfrm>
-          <a:prstGeom prst="flowChartInputOutput">
+          <a:prstGeom prst="flowChartAlternateProcess">
             <a:avLst/>
           </a:prstGeom>
           <a:noFill/>
@@ -17447,7 +20762,7 @@
       </p:sp>
       <p:sp>
         <p:nvSpPr>
-          <p:cNvPr id="12" name="Flowchart: Data 11"/>
+          <p:cNvPr id="12" name="Flowchart: Alternate Process 11"/>
           <p:cNvSpPr/>
           <p:nvPr/>
         </p:nvSpPr>
@@ -17456,7 +20771,7 @@
             <a:off x="1129936" y="3961683"/>
             <a:ext cx="3910149" cy="751315"/>
           </a:xfrm>
-          <a:prstGeom prst="flowChartInputOutput">
+          <a:prstGeom prst="flowChartAlternateProcess">
             <a:avLst/>
           </a:prstGeom>
           <a:noFill/>
@@ -17486,6 +20801,7 @@
           <a:bodyPr rtlCol="0" anchor="ctr"/>
           <a:lstStyle/>
           <a:p>
+            <a:pPr algn="ctr"/>
             <a:r>
               <a:rPr lang="el-GR" dirty="0">
                 <a:latin typeface="Calibri" panose="020F0502020204030204" pitchFamily="34" charset="0"/>
@@ -17506,16 +20822,16 @@
       </p:sp>
       <p:sp>
         <p:nvSpPr>
-          <p:cNvPr id="14" name="Flowchart: Data 13"/>
+          <p:cNvPr id="14" name="Flowchart: Alternate Process 13"/>
           <p:cNvSpPr/>
           <p:nvPr/>
         </p:nvSpPr>
         <p:spPr>
           <a:xfrm>
-            <a:off x="1021079" y="5280032"/>
+            <a:off x="1129935" y="5280032"/>
             <a:ext cx="3910149" cy="751315"/>
           </a:xfrm>
-          <a:prstGeom prst="flowChartInputOutput">
+          <a:prstGeom prst="flowChartAlternateProcess">
             <a:avLst/>
           </a:prstGeom>
           <a:noFill/>
@@ -17545,6 +20861,7 @@
           <a:bodyPr rtlCol="0" anchor="ctr"/>
           <a:lstStyle/>
           <a:p>
+            <a:pPr algn="ctr"/>
             <a:r>
               <a:rPr lang="en-US" dirty="0" smtClean="0">
                 <a:latin typeface="Calibri" panose="020F0502020204030204" pitchFamily="34" charset="0"/>
@@ -17565,16 +20882,16 @@
       </p:sp>
       <p:sp>
         <p:nvSpPr>
-          <p:cNvPr id="15" name="Flowchart: Data 14"/>
+          <p:cNvPr id="15" name="Flowchart: Alternate Process 14"/>
           <p:cNvSpPr/>
           <p:nvPr/>
         </p:nvSpPr>
         <p:spPr>
           <a:xfrm>
-            <a:off x="7979230" y="4017663"/>
+            <a:off x="8719458" y="3980288"/>
             <a:ext cx="3037114" cy="695332"/>
           </a:xfrm>
-          <a:prstGeom prst="flowChartInputOutput">
+          <a:prstGeom prst="flowChartAlternateProcess">
             <a:avLst/>
           </a:prstGeom>
           <a:noFill/>
@@ -17604,6 +20921,7 @@
           <a:bodyPr rtlCol="0" anchor="ctr"/>
           <a:lstStyle/>
           <a:p>
+            <a:pPr algn="ctr"/>
             <a:r>
               <a:rPr lang="en-US" dirty="0" smtClean="0">
                 <a:latin typeface="Calibri" panose="020F0502020204030204" pitchFamily="34" charset="0"/>
@@ -17623,7 +20941,7 @@
         </p:nvSpPr>
         <p:spPr>
           <a:xfrm>
-            <a:off x="5559333" y="4017663"/>
+            <a:off x="5921828" y="3980288"/>
             <a:ext cx="2037806" cy="714103"/>
           </a:xfrm>
           <a:prstGeom prst="flowChartAlternateProcess">
@@ -17665,6 +20983,160 @@
           </a:p>
         </p:txBody>
       </p:sp>
+      <p:cxnSp>
+        <p:nvCxnSpPr>
+          <p:cNvPr id="17" name="Straight Arrow Connector 16"/>
+          <p:cNvCxnSpPr>
+            <a:stCxn id="6" idx="3"/>
+            <a:endCxn id="13" idx="1"/>
+          </p:cNvCxnSpPr>
+          <p:nvPr/>
+        </p:nvCxnSpPr>
+        <p:spPr>
+          <a:xfrm>
+            <a:off x="5040084" y="3018992"/>
+            <a:ext cx="881744" cy="1318348"/>
+          </a:xfrm>
+          <a:prstGeom prst="straightConnector1">
+            <a:avLst/>
+          </a:prstGeom>
+          <a:ln>
+            <a:solidFill>
+              <a:schemeClr val="tx1"/>
+            </a:solidFill>
+            <a:tailEnd type="triangle"/>
+          </a:ln>
+        </p:spPr>
+        <p:style>
+          <a:lnRef idx="1">
+            <a:schemeClr val="accent1"/>
+          </a:lnRef>
+          <a:fillRef idx="0">
+            <a:schemeClr val="accent1"/>
+          </a:fillRef>
+          <a:effectRef idx="0">
+            <a:schemeClr val="accent1"/>
+          </a:effectRef>
+          <a:fontRef idx="minor">
+            <a:schemeClr val="tx1"/>
+          </a:fontRef>
+        </p:style>
+      </p:cxnSp>
+      <p:cxnSp>
+        <p:nvCxnSpPr>
+          <p:cNvPr id="20" name="Straight Arrow Connector 19"/>
+          <p:cNvCxnSpPr>
+            <a:stCxn id="12" idx="3"/>
+          </p:cNvCxnSpPr>
+          <p:nvPr/>
+        </p:nvCxnSpPr>
+        <p:spPr>
+          <a:xfrm flipV="1">
+            <a:off x="5040085" y="4337340"/>
+            <a:ext cx="881743" cy="1"/>
+          </a:xfrm>
+          <a:prstGeom prst="straightConnector1">
+            <a:avLst/>
+          </a:prstGeom>
+          <a:ln>
+            <a:solidFill>
+              <a:schemeClr val="tx1"/>
+            </a:solidFill>
+            <a:tailEnd type="triangle"/>
+          </a:ln>
+        </p:spPr>
+        <p:style>
+          <a:lnRef idx="1">
+            <a:schemeClr val="accent1"/>
+          </a:lnRef>
+          <a:fillRef idx="0">
+            <a:schemeClr val="accent1"/>
+          </a:fillRef>
+          <a:effectRef idx="0">
+            <a:schemeClr val="accent1"/>
+          </a:effectRef>
+          <a:fontRef idx="minor">
+            <a:schemeClr val="tx1"/>
+          </a:fontRef>
+        </p:style>
+      </p:cxnSp>
+      <p:cxnSp>
+        <p:nvCxnSpPr>
+          <p:cNvPr id="23" name="Straight Arrow Connector 22"/>
+          <p:cNvCxnSpPr>
+            <a:stCxn id="14" idx="3"/>
+            <a:endCxn id="13" idx="1"/>
+          </p:cNvCxnSpPr>
+          <p:nvPr/>
+        </p:nvCxnSpPr>
+        <p:spPr>
+          <a:xfrm flipV="1">
+            <a:off x="5040084" y="4337340"/>
+            <a:ext cx="881744" cy="1318350"/>
+          </a:xfrm>
+          <a:prstGeom prst="straightConnector1">
+            <a:avLst/>
+          </a:prstGeom>
+          <a:ln>
+            <a:solidFill>
+              <a:schemeClr val="tx1"/>
+            </a:solidFill>
+            <a:tailEnd type="triangle"/>
+          </a:ln>
+        </p:spPr>
+        <p:style>
+          <a:lnRef idx="1">
+            <a:schemeClr val="accent1"/>
+          </a:lnRef>
+          <a:fillRef idx="0">
+            <a:schemeClr val="accent1"/>
+          </a:fillRef>
+          <a:effectRef idx="0">
+            <a:schemeClr val="accent1"/>
+          </a:effectRef>
+          <a:fontRef idx="minor">
+            <a:schemeClr val="tx1"/>
+          </a:fontRef>
+        </p:style>
+      </p:cxnSp>
+      <p:cxnSp>
+        <p:nvCxnSpPr>
+          <p:cNvPr id="25" name="Straight Arrow Connector 24"/>
+          <p:cNvCxnSpPr>
+            <a:stCxn id="13" idx="3"/>
+          </p:cNvCxnSpPr>
+          <p:nvPr/>
+        </p:nvCxnSpPr>
+        <p:spPr>
+          <a:xfrm>
+            <a:off x="7959634" y="4337340"/>
+            <a:ext cx="759824" cy="0"/>
+          </a:xfrm>
+          <a:prstGeom prst="straightConnector1">
+            <a:avLst/>
+          </a:prstGeom>
+          <a:ln>
+            <a:solidFill>
+              <a:schemeClr val="tx1"/>
+            </a:solidFill>
+            <a:tailEnd type="triangle"/>
+          </a:ln>
+        </p:spPr>
+        <p:style>
+          <a:lnRef idx="1">
+            <a:schemeClr val="accent1"/>
+          </a:lnRef>
+          <a:fillRef idx="0">
+            <a:schemeClr val="accent1"/>
+          </a:fillRef>
+          <a:effectRef idx="0">
+            <a:schemeClr val="accent1"/>
+          </a:effectRef>
+          <a:fontRef idx="minor">
+            <a:schemeClr val="tx1"/>
+          </a:fontRef>
+        </p:style>
+      </p:cxnSp>
     </p:spTree>
     <p:extLst>
       <p:ext uri="{BB962C8B-B14F-4D97-AF65-F5344CB8AC3E}">

</xml_diff>

<commit_message>
Generated data for BE, CA-BC, CA-QC, US-PA, US-CA
</commit_message>
<xml_diff>
--- a/papers/seminar.pptx
+++ b/papers/seminar.pptx
@@ -17,11 +17,14 @@
     <p:sldId id="264" r:id="rId11"/>
     <p:sldId id="269" r:id="rId12"/>
     <p:sldId id="271" r:id="rId13"/>
-    <p:sldId id="270" r:id="rId14"/>
-    <p:sldId id="260" r:id="rId15"/>
-    <p:sldId id="268" r:id="rId16"/>
-    <p:sldId id="261" r:id="rId17"/>
-    <p:sldId id="262" r:id="rId18"/>
+    <p:sldId id="272" r:id="rId14"/>
+    <p:sldId id="270" r:id="rId15"/>
+    <p:sldId id="260" r:id="rId16"/>
+    <p:sldId id="268" r:id="rId17"/>
+    <p:sldId id="274" r:id="rId18"/>
+    <p:sldId id="273" r:id="rId19"/>
+    <p:sldId id="261" r:id="rId20"/>
+    <p:sldId id="262" r:id="rId21"/>
   </p:sldIdLst>
   <p:sldSz cx="12192000" cy="6858000"/>
   <p:notesSz cx="6858000" cy="9144000"/>
@@ -122,7 +125,7 @@
   </p:defaultTextStyle>
   <p:extLst>
     <p:ext uri="{EFAFB233-063F-42B5-8137-9DF3F51BA10A}">
-      <p15:sldGuideLst xmlns:p15="http://schemas.microsoft.com/office/powerpoint/2012/main"/>
+      <p15:sldGuideLst xmlns:p15="http://schemas.microsoft.com/office/powerpoint/2012/main" xmlns=""/>
     </p:ext>
   </p:extLst>
 </p:presentation>
@@ -349,7 +352,7 @@
             <a:fld id="{B61BEF0D-F0BB-DE4B-95CE-6DB70DBA9567}" type="datetimeFigureOut">
               <a:rPr lang="en-US" dirty="0"/>
               <a:pPr/>
-              <a:t>8/8/2022</a:t>
+              <a:t>8/15/2022</a:t>
             </a:fld>
             <a:endParaRPr lang="en-US" dirty="0"/>
           </a:p>
@@ -637,7 +640,7 @@
             <a:fld id="{B61BEF0D-F0BB-DE4B-95CE-6DB70DBA9567}" type="datetimeFigureOut">
               <a:rPr lang="en-US" dirty="0"/>
               <a:pPr/>
-              <a:t>8/8/2022</a:t>
+              <a:t>8/15/2022</a:t>
             </a:fld>
             <a:endParaRPr lang="en-US" dirty="0"/>
           </a:p>
@@ -897,7 +900,7 @@
             <a:fld id="{B61BEF0D-F0BB-DE4B-95CE-6DB70DBA9567}" type="datetimeFigureOut">
               <a:rPr lang="en-US" dirty="0"/>
               <a:pPr/>
-              <a:t>8/8/2022</a:t>
+              <a:t>8/15/2022</a:t>
             </a:fld>
             <a:endParaRPr lang="en-US" dirty="0"/>
           </a:p>
@@ -1367,7 +1370,7 @@
             <a:fld id="{B61BEF0D-F0BB-DE4B-95CE-6DB70DBA9567}" type="datetimeFigureOut">
               <a:rPr lang="en-US" dirty="0"/>
               <a:pPr/>
-              <a:t>8/8/2022</a:t>
+              <a:t>8/15/2022</a:t>
             </a:fld>
             <a:endParaRPr lang="en-US" dirty="0"/>
           </a:p>
@@ -1548,7 +1551,7 @@
             <a:fld id="{B61BEF0D-F0BB-DE4B-95CE-6DB70DBA9567}" type="datetimeFigureOut">
               <a:rPr lang="en-US" dirty="0"/>
               <a:pPr/>
-              <a:t>8/8/2022</a:t>
+              <a:t>8/15/2022</a:t>
             </a:fld>
             <a:endParaRPr lang="en-US" dirty="0"/>
           </a:p>
@@ -2125,7 +2128,7 @@
             <a:fld id="{B61BEF0D-F0BB-DE4B-95CE-6DB70DBA9567}" type="datetimeFigureOut">
               <a:rPr lang="en-US" dirty="0"/>
               <a:pPr/>
-              <a:t>8/8/2022</a:t>
+              <a:t>8/15/2022</a:t>
             </a:fld>
             <a:endParaRPr lang="en-US" dirty="0"/>
           </a:p>
@@ -2458,7 +2461,7 @@
             <a:fld id="{B61BEF0D-F0BB-DE4B-95CE-6DB70DBA9567}" type="datetimeFigureOut">
               <a:rPr lang="en-US" dirty="0"/>
               <a:pPr/>
-              <a:t>8/8/2022</a:t>
+              <a:t>8/15/2022</a:t>
             </a:fld>
             <a:endParaRPr lang="en-US" dirty="0"/>
           </a:p>
@@ -2633,7 +2636,7 @@
             <a:fld id="{B61BEF0D-F0BB-DE4B-95CE-6DB70DBA9567}" type="datetimeFigureOut">
               <a:rPr lang="en-US" dirty="0"/>
               <a:pPr/>
-              <a:t>8/8/2022</a:t>
+              <a:t>8/15/2022</a:t>
             </a:fld>
             <a:endParaRPr lang="en-US" dirty="0"/>
           </a:p>
@@ -2813,7 +2816,7 @@
             <a:fld id="{B61BEF0D-F0BB-DE4B-95CE-6DB70DBA9567}" type="datetimeFigureOut">
               <a:rPr lang="en-US" dirty="0"/>
               <a:pPr/>
-              <a:t>8/8/2022</a:t>
+              <a:t>8/15/2022</a:t>
             </a:fld>
             <a:endParaRPr lang="en-US" dirty="0"/>
           </a:p>
@@ -3047,7 +3050,7 @@
             <a:fld id="{B61BEF0D-F0BB-DE4B-95CE-6DB70DBA9567}" type="datetimeFigureOut">
               <a:rPr lang="en-US" smtClean="0"/>
               <a:pPr/>
-              <a:t>8/8/2022</a:t>
+              <a:t>8/15/2022</a:t>
             </a:fld>
             <a:endParaRPr lang="en-US" dirty="0"/>
           </a:p>
@@ -3254,7 +3257,7 @@
             <a:fld id="{B61BEF0D-F0BB-DE4B-95CE-6DB70DBA9567}" type="datetimeFigureOut">
               <a:rPr lang="en-US" smtClean="0"/>
               <a:pPr/>
-              <a:t>8/8/2022</a:t>
+              <a:t>8/15/2022</a:t>
             </a:fld>
             <a:endParaRPr lang="en-US" dirty="0"/>
           </a:p>
@@ -3424,7 +3427,7 @@
             <a:fld id="{B61BEF0D-F0BB-DE4B-95CE-6DB70DBA9567}" type="datetimeFigureOut">
               <a:rPr lang="en-US" dirty="0"/>
               <a:pPr/>
-              <a:t>8/8/2022</a:t>
+              <a:t>8/15/2022</a:t>
             </a:fld>
             <a:endParaRPr lang="en-US" dirty="0"/>
           </a:p>
@@ -3706,7 +3709,7 @@
             <a:fld id="{B61BEF0D-F0BB-DE4B-95CE-6DB70DBA9567}" type="datetimeFigureOut">
               <a:rPr lang="en-US" smtClean="0"/>
               <a:pPr/>
-              <a:t>8/8/2022</a:t>
+              <a:t>8/15/2022</a:t>
             </a:fld>
             <a:endParaRPr lang="en-US" dirty="0"/>
           </a:p>
@@ -3975,7 +3978,7 @@
             <a:fld id="{B61BEF0D-F0BB-DE4B-95CE-6DB70DBA9567}" type="datetimeFigureOut">
               <a:rPr lang="en-US" smtClean="0"/>
               <a:pPr/>
-              <a:t>8/8/2022</a:t>
+              <a:t>8/15/2022</a:t>
             </a:fld>
             <a:endParaRPr lang="en-US" dirty="0"/>
           </a:p>
@@ -4392,7 +4395,7 @@
             <a:fld id="{B61BEF0D-F0BB-DE4B-95CE-6DB70DBA9567}" type="datetimeFigureOut">
               <a:rPr lang="en-US" smtClean="0"/>
               <a:pPr/>
-              <a:t>8/8/2022</a:t>
+              <a:t>8/15/2022</a:t>
             </a:fld>
             <a:endParaRPr lang="en-US" dirty="0"/>
           </a:p>
@@ -4542,7 +4545,7 @@
             <a:fld id="{B61BEF0D-F0BB-DE4B-95CE-6DB70DBA9567}" type="datetimeFigureOut">
               <a:rPr lang="en-US" smtClean="0"/>
               <a:pPr/>
-              <a:t>8/8/2022</a:t>
+              <a:t>8/15/2022</a:t>
             </a:fld>
             <a:endParaRPr lang="en-US" dirty="0"/>
           </a:p>
@@ -4669,7 +4672,7 @@
             <a:fld id="{B61BEF0D-F0BB-DE4B-95CE-6DB70DBA9567}" type="datetimeFigureOut">
               <a:rPr lang="en-US" smtClean="0"/>
               <a:pPr/>
-              <a:t>8/8/2022</a:t>
+              <a:t>8/15/2022</a:t>
             </a:fld>
             <a:endParaRPr lang="en-US" dirty="0"/>
           </a:p>
@@ -4950,7 +4953,7 @@
             <a:fld id="{B61BEF0D-F0BB-DE4B-95CE-6DB70DBA9567}" type="datetimeFigureOut">
               <a:rPr lang="en-US" smtClean="0"/>
               <a:pPr/>
-              <a:t>8/8/2022</a:t>
+              <a:t>8/15/2022</a:t>
             </a:fld>
             <a:endParaRPr lang="en-US" dirty="0"/>
           </a:p>
@@ -5267,7 +5270,7 @@
             <a:fld id="{B61BEF0D-F0BB-DE4B-95CE-6DB70DBA9567}" type="datetimeFigureOut">
               <a:rPr lang="en-US" smtClean="0"/>
               <a:pPr/>
-              <a:t>8/8/2022</a:t>
+              <a:t>8/15/2022</a:t>
             </a:fld>
             <a:endParaRPr lang="en-US" dirty="0"/>
           </a:p>
@@ -5584,7 +5587,7 @@
             <a:fld id="{B61BEF0D-F0BB-DE4B-95CE-6DB70DBA9567}" type="datetimeFigureOut">
               <a:rPr lang="en-US" smtClean="0"/>
               <a:pPr/>
-              <a:t>8/8/2022</a:t>
+              <a:t>8/15/2022</a:t>
             </a:fld>
             <a:endParaRPr lang="en-US" dirty="0"/>
           </a:p>
@@ -5808,7 +5811,7 @@
             <a:fld id="{B61BEF0D-F0BB-DE4B-95CE-6DB70DBA9567}" type="datetimeFigureOut">
               <a:rPr lang="en-US" smtClean="0"/>
               <a:pPr/>
-              <a:t>8/8/2022</a:t>
+              <a:t>8/15/2022</a:t>
             </a:fld>
             <a:endParaRPr lang="en-US" dirty="0"/>
           </a:p>
@@ -6101,7 +6104,7 @@
             <a:fld id="{B61BEF0D-F0BB-DE4B-95CE-6DB70DBA9567}" type="datetimeFigureOut">
               <a:rPr lang="en-US" smtClean="0"/>
               <a:pPr/>
-              <a:t>8/8/2022</a:t>
+              <a:t>8/15/2022</a:t>
             </a:fld>
             <a:endParaRPr lang="en-US" dirty="0"/>
           </a:p>
@@ -6591,7 +6594,7 @@
             <a:fld id="{B61BEF0D-F0BB-DE4B-95CE-6DB70DBA9567}" type="datetimeFigureOut">
               <a:rPr lang="en-US" dirty="0"/>
               <a:pPr/>
-              <a:t>8/8/2022</a:t>
+              <a:t>8/15/2022</a:t>
             </a:fld>
             <a:endParaRPr lang="en-US" dirty="0"/>
           </a:p>
@@ -6815,7 +6818,7 @@
             <a:fld id="{B61BEF0D-F0BB-DE4B-95CE-6DB70DBA9567}" type="datetimeFigureOut">
               <a:rPr lang="en-US" smtClean="0"/>
               <a:pPr/>
-              <a:t>8/8/2022</a:t>
+              <a:t>8/15/2022</a:t>
             </a:fld>
             <a:endParaRPr lang="en-US" dirty="0"/>
           </a:p>
@@ -7393,7 +7396,7 @@
             <a:fld id="{B61BEF0D-F0BB-DE4B-95CE-6DB70DBA9567}" type="datetimeFigureOut">
               <a:rPr lang="en-US" smtClean="0"/>
               <a:pPr/>
-              <a:t>8/8/2022</a:t>
+              <a:t>8/15/2022</a:t>
             </a:fld>
             <a:endParaRPr lang="en-US" dirty="0"/>
           </a:p>
@@ -8256,7 +8259,7 @@
             <a:fld id="{B61BEF0D-F0BB-DE4B-95CE-6DB70DBA9567}" type="datetimeFigureOut">
               <a:rPr lang="en-US" smtClean="0"/>
               <a:pPr/>
-              <a:t>8/8/2022</a:t>
+              <a:t>8/15/2022</a:t>
             </a:fld>
             <a:endParaRPr lang="en-US" dirty="0"/>
           </a:p>
@@ -8463,7 +8466,7 @@
             <a:fld id="{B61BEF0D-F0BB-DE4B-95CE-6DB70DBA9567}" type="datetimeFigureOut">
               <a:rPr lang="en-US" smtClean="0"/>
               <a:pPr/>
-              <a:t>8/8/2022</a:t>
+              <a:t>8/15/2022</a:t>
             </a:fld>
             <a:endParaRPr lang="en-US" dirty="0"/>
           </a:p>
@@ -8679,7 +8682,7 @@
             <a:fld id="{B61BEF0D-F0BB-DE4B-95CE-6DB70DBA9567}" type="datetimeFigureOut">
               <a:rPr lang="en-US" smtClean="0"/>
               <a:pPr/>
-              <a:t>8/8/2022</a:t>
+              <a:t>8/15/2022</a:t>
             </a:fld>
             <a:endParaRPr lang="en-US" dirty="0"/>
           </a:p>
@@ -8970,7 +8973,7 @@
             <a:fld id="{B61BEF0D-F0BB-DE4B-95CE-6DB70DBA9567}" type="datetimeFigureOut">
               <a:rPr lang="en-US" dirty="0"/>
               <a:pPr/>
-              <a:t>8/8/2022</a:t>
+              <a:t>8/15/2022</a:t>
             </a:fld>
             <a:endParaRPr lang="en-US" dirty="0"/>
           </a:p>
@@ -9399,7 +9402,7 @@
             <a:fld id="{B61BEF0D-F0BB-DE4B-95CE-6DB70DBA9567}" type="datetimeFigureOut">
               <a:rPr lang="en-US" dirty="0"/>
               <a:pPr/>
-              <a:t>8/8/2022</a:t>
+              <a:t>8/15/2022</a:t>
             </a:fld>
             <a:endParaRPr lang="en-US" dirty="0"/>
           </a:p>
@@ -9518,7 +9521,7 @@
             <a:fld id="{B61BEF0D-F0BB-DE4B-95CE-6DB70DBA9567}" type="datetimeFigureOut">
               <a:rPr lang="en-US" dirty="0"/>
               <a:pPr/>
-              <a:t>8/8/2022</a:t>
+              <a:t>8/15/2022</a:t>
             </a:fld>
             <a:endParaRPr lang="en-US" dirty="0"/>
           </a:p>
@@ -9615,7 +9618,7 @@
             <a:fld id="{B61BEF0D-F0BB-DE4B-95CE-6DB70DBA9567}" type="datetimeFigureOut">
               <a:rPr lang="en-US" dirty="0"/>
               <a:pPr/>
-              <a:t>8/8/2022</a:t>
+              <a:t>8/15/2022</a:t>
             </a:fld>
             <a:endParaRPr lang="en-US" dirty="0"/>
           </a:p>
@@ -9898,7 +9901,7 @@
             <a:fld id="{B61BEF0D-F0BB-DE4B-95CE-6DB70DBA9567}" type="datetimeFigureOut">
               <a:rPr lang="en-US" dirty="0"/>
               <a:pPr/>
-              <a:t>8/8/2022</a:t>
+              <a:t>8/15/2022</a:t>
             </a:fld>
             <a:endParaRPr lang="en-US" dirty="0"/>
           </a:p>
@@ -10186,7 +10189,7 @@
             <a:fld id="{B61BEF0D-F0BB-DE4B-95CE-6DB70DBA9567}" type="datetimeFigureOut">
               <a:rPr lang="en-US" dirty="0"/>
               <a:pPr/>
-              <a:t>8/8/2022</a:t>
+              <a:t>8/15/2022</a:t>
             </a:fld>
             <a:endParaRPr lang="en-US" dirty="0"/>
           </a:p>
@@ -10445,7 +10448,7 @@
             <a:fld id="{B61BEF0D-F0BB-DE4B-95CE-6DB70DBA9567}" type="datetimeFigureOut">
               <a:rPr lang="en-US" dirty="0"/>
               <a:pPr/>
-              <a:t>8/8/2022</a:t>
+              <a:t>8/15/2022</a:t>
             </a:fld>
             <a:endParaRPr lang="en-US" dirty="0"/>
           </a:p>
@@ -11391,7 +11394,7 @@
             <a:fld id="{B61BEF0D-F0BB-DE4B-95CE-6DB70DBA9567}" type="datetimeFigureOut">
               <a:rPr lang="en-US" smtClean="0"/>
               <a:pPr/>
-              <a:t>8/8/2022</a:t>
+              <a:t>8/15/2022</a:t>
             </a:fld>
             <a:endParaRPr lang="en-US" dirty="0"/>
           </a:p>
@@ -11909,7 +11912,7 @@
           <p:cNvPr id="4" name="Picture 3">
             <a:extLst>
               <a:ext uri="{FF2B5EF4-FFF2-40B4-BE49-F238E27FC236}">
-                <a16:creationId xmlns:a16="http://schemas.microsoft.com/office/drawing/2014/main" xmlns="" id="{CFA71507-49A3-429A-661C-9A76A085059A}"/>
+                <a16:creationId xmlns="" xmlns:a16="http://schemas.microsoft.com/office/drawing/2014/main" id="{CFA71507-49A3-429A-661C-9A76A085059A}"/>
               </a:ext>
             </a:extLst>
           </p:cNvPr>
@@ -12078,10 +12081,10 @@
           <p:cNvPr id="36" name="Rectangle 35">
             <a:extLst>
               <a:ext uri="{FF2B5EF4-FFF2-40B4-BE49-F238E27FC236}">
-                <a16:creationId xmlns:a16="http://schemas.microsoft.com/office/drawing/2014/main" xmlns="" id="{8BCFA5F4-1A8E-48F5-9209-7F24485B1D78}"/>
+                <a16:creationId xmlns="" xmlns:a16="http://schemas.microsoft.com/office/drawing/2014/main" id="{8BCFA5F4-1A8E-48F5-9209-7F24485B1D78}"/>
               </a:ext>
               <a:ext uri="{C183D7F6-B498-43B3-948B-1728B52AA6E4}">
-                <adec:decorative xmlns:adec="http://schemas.microsoft.com/office/drawing/2017/decorative" xmlns="" val="1"/>
+                <adec:decorative xmlns="" xmlns:adec="http://schemas.microsoft.com/office/drawing/2017/decorative" val="1"/>
               </a:ext>
             </a:extLst>
           </p:cNvPr>
@@ -12091,7 +12094,7 @@
           <p:nvPr>
             <p:extLst>
               <p:ext uri="{386F3935-93C4-4BCD-93E2-E3B085C9AB24}">
-                <p16:designElem xmlns:p16="http://schemas.microsoft.com/office/powerpoint/2015/main" xmlns="" val="1"/>
+                <p16:designElem xmlns="" xmlns:p16="http://schemas.microsoft.com/office/powerpoint/2015/main" val="1"/>
               </p:ext>
             </p:extLst>
           </p:nvPr>
@@ -12138,10 +12141,10 @@
           <p:cNvPr id="38" name="Rectangle 37">
             <a:extLst>
               <a:ext uri="{FF2B5EF4-FFF2-40B4-BE49-F238E27FC236}">
-                <a16:creationId xmlns:a16="http://schemas.microsoft.com/office/drawing/2014/main" xmlns="" id="{A8074621-AE44-40C4-8323-DF5185BC954E}"/>
+                <a16:creationId xmlns="" xmlns:a16="http://schemas.microsoft.com/office/drawing/2014/main" id="{A8074621-AE44-40C4-8323-DF5185BC954E}"/>
               </a:ext>
               <a:ext uri="{C183D7F6-B498-43B3-948B-1728B52AA6E4}">
-                <adec:decorative xmlns:adec="http://schemas.microsoft.com/office/drawing/2017/decorative" xmlns="" val="1"/>
+                <adec:decorative xmlns="" xmlns:adec="http://schemas.microsoft.com/office/drawing/2017/decorative" val="1"/>
               </a:ext>
             </a:extLst>
           </p:cNvPr>
@@ -12151,7 +12154,7 @@
           <p:nvPr>
             <p:extLst>
               <p:ext uri="{386F3935-93C4-4BCD-93E2-E3B085C9AB24}">
-                <p16:designElem xmlns:p16="http://schemas.microsoft.com/office/powerpoint/2015/main" xmlns="" val="1"/>
+                <p16:designElem xmlns="" xmlns:p16="http://schemas.microsoft.com/office/powerpoint/2015/main" val="1"/>
               </p:ext>
             </p:extLst>
           </p:nvPr>
@@ -12203,7 +12206,7 @@
           <p:cNvPr id="2" name="Title 1">
             <a:extLst>
               <a:ext uri="{FF2B5EF4-FFF2-40B4-BE49-F238E27FC236}">
-                <a16:creationId xmlns:a16="http://schemas.microsoft.com/office/drawing/2014/main" xmlns="" id="{98665829-B67C-1898-629C-AC1781FAF9BD}"/>
+                <a16:creationId xmlns="" xmlns:a16="http://schemas.microsoft.com/office/drawing/2014/main" id="{98665829-B67C-1898-629C-AC1781FAF9BD}"/>
               </a:ext>
             </a:extLst>
           </p:cNvPr>
@@ -12229,8 +12232,8 @@
           </a:p>
         </p:txBody>
       </p:sp>
-      <mc:AlternateContent xmlns:mc="http://schemas.openxmlformats.org/markup-compatibility/2006">
-        <mc:Choice xmlns:a14="http://schemas.microsoft.com/office/drawing/2010/main" Requires="a14">
+      <mc:AlternateContent xmlns:mc="http://schemas.openxmlformats.org/markup-compatibility/2006" xmlns:a14="http://schemas.microsoft.com/office/drawing/2010/main">
+        <mc:Choice Requires="a14">
           <p:sp>
             <p:nvSpPr>
               <p:cNvPr id="4" name="TextBox 3"/>
@@ -12253,6 +12256,7 @@
               </a:bodyPr>
               <a:lstStyle/>
               <a:p>
+                <a:pPr/>
                 <a14:m>
                   <m:oMathPara xmlns:m="http://schemas.openxmlformats.org/officeDocument/2006/math">
                     <m:oMathParaPr>
@@ -12263,7 +12267,7 @@
                         <m:sSubPr>
                           <m:ctrlPr>
                             <a:rPr lang="en-CA" sz="2400" i="1" smtClean="0">
-                              <a:latin typeface="Cambria Math" panose="02040503050406030204" pitchFamily="18" charset="0"/>
+                              <a:latin typeface="Cambria Math"/>
                             </a:rPr>
                           </m:ctrlPr>
                         </m:sSubPr>
@@ -12294,7 +12298,7 @@
                         <m:fPr>
                           <m:ctrlPr>
                             <a:rPr lang="en-US" sz="2400" b="0" i="1" smtClean="0">
-                              <a:latin typeface="Cambria Math" panose="02040503050406030204" pitchFamily="18" charset="0"/>
+                              <a:latin typeface="Cambria Math"/>
                             </a:rPr>
                           </m:ctrlPr>
                         </m:fPr>
@@ -12321,7 +12325,7 @@
                           <m:supHide m:val="on"/>
                           <m:ctrlPr>
                             <a:rPr lang="en-US" sz="2400" b="0" i="1" smtClean="0">
-                              <a:latin typeface="Cambria Math" panose="02040503050406030204" pitchFamily="18" charset="0"/>
+                              <a:latin typeface="Cambria Math"/>
                             </a:rPr>
                           </m:ctrlPr>
                         </m:naryPr>
@@ -12378,7 +12382,7 @@
                             <m:fPr>
                               <m:ctrlPr>
                                 <a:rPr lang="en-US" sz="2400" i="1">
-                                  <a:latin typeface="Cambria Math" panose="02040503050406030204" pitchFamily="18" charset="0"/>
+                                  <a:latin typeface="Cambria Math"/>
                                 </a:rPr>
                               </m:ctrlPr>
                             </m:fPr>
@@ -12401,7 +12405,7 @@
                                 <m:sSubPr>
                                   <m:ctrlPr>
                                     <a:rPr lang="en-US" sz="2400" i="1">
-                                      <a:latin typeface="Cambria Math" panose="02040503050406030204" pitchFamily="18" charset="0"/>
+                                      <a:latin typeface="Cambria Math"/>
                                     </a:rPr>
                                   </m:ctrlPr>
                                 </m:sSubPr>
@@ -12432,7 +12436,7 @@
                                 <m:sSubPr>
                                   <m:ctrlPr>
                                     <a:rPr lang="en-US" sz="2400" i="1">
-                                      <a:latin typeface="Cambria Math" panose="02040503050406030204" pitchFamily="18" charset="0"/>
+                                      <a:latin typeface="Cambria Math"/>
                                     </a:rPr>
                                   </m:ctrlPr>
                                 </m:sSubPr>
@@ -12466,7 +12470,7 @@
                               <m:chr m:val="∑"/>
                               <m:ctrlPr>
                                 <a:rPr lang="en-US" sz="2400" i="1">
-                                  <a:latin typeface="Cambria Math" panose="02040503050406030204" pitchFamily="18" charset="0"/>
+                                  <a:latin typeface="Cambria Math"/>
                                 </a:rPr>
                               </m:ctrlPr>
                             </m:naryPr>
@@ -12500,7 +12504,7 @@
                                 <m:sSupPr>
                                   <m:ctrlPr>
                                     <a:rPr lang="en-US" sz="2400" i="1">
-                                      <a:latin typeface="Cambria Math" panose="02040503050406030204" pitchFamily="18" charset="0"/>
+                                      <a:latin typeface="Cambria Math"/>
                                     </a:rPr>
                                   </m:ctrlPr>
                                 </m:sSupPr>
@@ -12515,7 +12519,7 @@
                                     <m:sSubPr>
                                       <m:ctrlPr>
                                         <a:rPr lang="en-US" sz="2400" i="1">
-                                          <a:latin typeface="Cambria Math" panose="02040503050406030204" pitchFamily="18" charset="0"/>
+                                          <a:latin typeface="Cambria Math"/>
                                         </a:rPr>
                                       </m:ctrlPr>
                                     </m:sSubPr>
@@ -12546,7 +12550,7 @@
                                     <m:sSubPr>
                                       <m:ctrlPr>
                                         <a:rPr lang="en-US" sz="2400" i="1">
-                                          <a:latin typeface="Cambria Math" panose="02040503050406030204" pitchFamily="18" charset="0"/>
+                                          <a:latin typeface="Cambria Math"/>
                                         </a:rPr>
                                       </m:ctrlPr>
                                     </m:sSubPr>
@@ -12556,7 +12560,7 @@
                                           <m:chr m:val="̅"/>
                                           <m:ctrlPr>
                                             <a:rPr lang="en-US" sz="2400" i="1">
-                                              <a:latin typeface="Cambria Math" panose="02040503050406030204" pitchFamily="18" charset="0"/>
+                                              <a:latin typeface="Cambria Math"/>
                                             </a:rPr>
                                           </m:ctrlPr>
                                         </m:accPr>
@@ -12607,7 +12611,7 @@
             </p:txBody>
           </p:sp>
         </mc:Choice>
-        <mc:Fallback>
+        <mc:Fallback xmlns="">
           <p:sp>
             <p:nvSpPr>
               <p:cNvPr id="4" name="TextBox 3"/>
@@ -12646,8 +12650,8 @@
           </p:sp>
         </mc:Fallback>
       </mc:AlternateContent>
-      <mc:AlternateContent xmlns:mc="http://schemas.openxmlformats.org/markup-compatibility/2006">
-        <mc:Choice xmlns:a14="http://schemas.microsoft.com/office/drawing/2010/main" Requires="a14">
+      <mc:AlternateContent xmlns:mc="http://schemas.openxmlformats.org/markup-compatibility/2006" xmlns:a14="http://schemas.microsoft.com/office/drawing/2010/main">
+        <mc:Choice Requires="a14">
           <p:sp>
             <p:nvSpPr>
               <p:cNvPr id="5" name="TextBox 4"/>
@@ -12698,7 +12702,7 @@
                       <m:sSubPr>
                         <m:ctrlPr>
                           <a:rPr lang="en-US" sz="2400" i="1">
-                            <a:latin typeface="Cambria Math" panose="02040503050406030204" pitchFamily="18" charset="0"/>
+                            <a:latin typeface="Cambria Math"/>
                           </a:rPr>
                         </m:ctrlPr>
                       </m:sSubPr>
@@ -12771,7 +12775,7 @@
                       <m:sSubPr>
                         <m:ctrlPr>
                           <a:rPr lang="en-US" sz="2400" i="1">
-                            <a:latin typeface="Cambria Math" panose="02040503050406030204" pitchFamily="18" charset="0"/>
+                            <a:latin typeface="Cambria Math"/>
                           </a:rPr>
                         </m:ctrlPr>
                       </m:sSubPr>
@@ -12781,7 +12785,7 @@
                             <m:chr m:val="̅"/>
                             <m:ctrlPr>
                               <a:rPr lang="en-US" sz="2400" i="1">
-                                <a:latin typeface="Cambria Math" panose="02040503050406030204" pitchFamily="18" charset="0"/>
+                                <a:latin typeface="Cambria Math"/>
                               </a:rPr>
                             </m:ctrlPr>
                           </m:accPr>
@@ -12846,7 +12850,7 @@
             </p:txBody>
           </p:sp>
         </mc:Choice>
-        <mc:Fallback>
+        <mc:Fallback xmlns="">
           <p:sp>
             <p:nvSpPr>
               <p:cNvPr id="5" name="TextBox 4"/>
@@ -12928,10 +12932,10 @@
           <p:cNvPr id="36" name="Rectangle 35">
             <a:extLst>
               <a:ext uri="{FF2B5EF4-FFF2-40B4-BE49-F238E27FC236}">
-                <a16:creationId xmlns:a16="http://schemas.microsoft.com/office/drawing/2014/main" xmlns="" id="{8BCFA5F4-1A8E-48F5-9209-7F24485B1D78}"/>
+                <a16:creationId xmlns="" xmlns:a16="http://schemas.microsoft.com/office/drawing/2014/main" id="{8BCFA5F4-1A8E-48F5-9209-7F24485B1D78}"/>
               </a:ext>
               <a:ext uri="{C183D7F6-B498-43B3-948B-1728B52AA6E4}">
-                <adec:decorative xmlns:adec="http://schemas.microsoft.com/office/drawing/2017/decorative" xmlns="" val="1"/>
+                <adec:decorative xmlns="" xmlns:adec="http://schemas.microsoft.com/office/drawing/2017/decorative" val="1"/>
               </a:ext>
             </a:extLst>
           </p:cNvPr>
@@ -12941,7 +12945,7 @@
           <p:nvPr>
             <p:extLst>
               <p:ext uri="{386F3935-93C4-4BCD-93E2-E3B085C9AB24}">
-                <p16:designElem xmlns:p16="http://schemas.microsoft.com/office/powerpoint/2015/main" xmlns="" val="1"/>
+                <p16:designElem xmlns="" xmlns:p16="http://schemas.microsoft.com/office/powerpoint/2015/main" val="1"/>
               </p:ext>
             </p:extLst>
           </p:nvPr>
@@ -12988,10 +12992,10 @@
           <p:cNvPr id="38" name="Rectangle 37">
             <a:extLst>
               <a:ext uri="{FF2B5EF4-FFF2-40B4-BE49-F238E27FC236}">
-                <a16:creationId xmlns:a16="http://schemas.microsoft.com/office/drawing/2014/main" xmlns="" id="{A8074621-AE44-40C4-8323-DF5185BC954E}"/>
+                <a16:creationId xmlns="" xmlns:a16="http://schemas.microsoft.com/office/drawing/2014/main" id="{A8074621-AE44-40C4-8323-DF5185BC954E}"/>
               </a:ext>
               <a:ext uri="{C183D7F6-B498-43B3-948B-1728B52AA6E4}">
-                <adec:decorative xmlns:adec="http://schemas.microsoft.com/office/drawing/2017/decorative" xmlns="" val="1"/>
+                <adec:decorative xmlns="" xmlns:adec="http://schemas.microsoft.com/office/drawing/2017/decorative" val="1"/>
               </a:ext>
             </a:extLst>
           </p:cNvPr>
@@ -13001,7 +13005,7 @@
           <p:nvPr>
             <p:extLst>
               <p:ext uri="{386F3935-93C4-4BCD-93E2-E3B085C9AB24}">
-                <p16:designElem xmlns:p16="http://schemas.microsoft.com/office/powerpoint/2015/main" xmlns="" val="1"/>
+                <p16:designElem xmlns="" xmlns:p16="http://schemas.microsoft.com/office/powerpoint/2015/main" val="1"/>
               </p:ext>
             </p:extLst>
           </p:nvPr>
@@ -13053,7 +13057,7 @@
           <p:cNvPr id="2" name="Title 1">
             <a:extLst>
               <a:ext uri="{FF2B5EF4-FFF2-40B4-BE49-F238E27FC236}">
-                <a16:creationId xmlns:a16="http://schemas.microsoft.com/office/drawing/2014/main" xmlns="" id="{98665829-B67C-1898-629C-AC1781FAF9BD}"/>
+                <a16:creationId xmlns="" xmlns:a16="http://schemas.microsoft.com/office/drawing/2014/main" id="{98665829-B67C-1898-629C-AC1781FAF9BD}"/>
               </a:ext>
             </a:extLst>
           </p:cNvPr>
@@ -13079,8 +13083,8 @@
           </a:p>
         </p:txBody>
       </p:sp>
-      <mc:AlternateContent xmlns:mc="http://schemas.openxmlformats.org/markup-compatibility/2006">
-        <mc:Choice xmlns:a14="http://schemas.microsoft.com/office/drawing/2010/main" Requires="a14">
+      <mc:AlternateContent xmlns:mc="http://schemas.openxmlformats.org/markup-compatibility/2006" xmlns:a14="http://schemas.microsoft.com/office/drawing/2010/main">
+        <mc:Choice Requires="a14">
           <p:sp>
             <p:nvSpPr>
               <p:cNvPr id="4" name="TextBox 3"/>
@@ -13103,6 +13107,7 @@
               </a:bodyPr>
               <a:lstStyle/>
               <a:p>
+                <a:pPr/>
                 <a14:m>
                   <m:oMathPara xmlns:m="http://schemas.openxmlformats.org/officeDocument/2006/math">
                     <m:oMathParaPr>
@@ -13113,7 +13118,7 @@
                         <m:sSubPr>
                           <m:ctrlPr>
                             <a:rPr lang="en-CA" sz="2400" i="1" smtClean="0">
-                              <a:latin typeface="Cambria Math" panose="02040503050406030204" pitchFamily="18" charset="0"/>
+                              <a:latin typeface="Cambria Math"/>
                             </a:rPr>
                           </m:ctrlPr>
                         </m:sSubPr>
@@ -13146,7 +13151,7 @@
                           <m:chr m:val="∑"/>
                           <m:ctrlPr>
                             <a:rPr lang="en-US" sz="2400" b="0" i="1" smtClean="0">
-                              <a:latin typeface="Cambria Math" panose="02040503050406030204" pitchFamily="18" charset="0"/>
+                              <a:latin typeface="Cambria Math"/>
                             </a:rPr>
                           </m:ctrlPr>
                         </m:naryPr>
@@ -13192,7 +13197,7 @@
                             <m:dPr>
                               <m:ctrlPr>
                                 <a:rPr lang="en-US" sz="2400" b="0" i="1" smtClean="0">
-                                  <a:latin typeface="Cambria Math" panose="02040503050406030204" pitchFamily="18" charset="0"/>
+                                  <a:latin typeface="Cambria Math"/>
                                 </a:rPr>
                               </m:ctrlPr>
                             </m:dPr>
@@ -13208,7 +13213,7 @@
                                 <m:dPr>
                                   <m:ctrlPr>
                                     <a:rPr lang="en-US" sz="2400" b="0" i="1" smtClean="0">
-                                      <a:latin typeface="Cambria Math" panose="02040503050406030204" pitchFamily="18" charset="0"/>
+                                      <a:latin typeface="Cambria Math"/>
                                       <a:ea typeface="Cambria Math" panose="02040503050406030204" pitchFamily="18" charset="0"/>
                                     </a:rPr>
                                   </m:ctrlPr>
@@ -13218,7 +13223,7 @@
                                     <m:sSubPr>
                                       <m:ctrlPr>
                                         <a:rPr lang="en-US" sz="2400" b="0" i="1" smtClean="0">
-                                          <a:latin typeface="Cambria Math" panose="02040503050406030204" pitchFamily="18" charset="0"/>
+                                          <a:latin typeface="Cambria Math"/>
                                           <a:ea typeface="Cambria Math" panose="02040503050406030204" pitchFamily="18" charset="0"/>
                                         </a:rPr>
                                       </m:ctrlPr>
@@ -13261,7 +13266,7 @@
                                 <m:dPr>
                                   <m:ctrlPr>
                                     <a:rPr lang="en-US" sz="2400" b="0" i="1" smtClean="0">
-                                      <a:latin typeface="Cambria Math" panose="02040503050406030204" pitchFamily="18" charset="0"/>
+                                      <a:latin typeface="Cambria Math"/>
                                       <a:ea typeface="Cambria Math" panose="02040503050406030204" pitchFamily="18" charset="0"/>
                                     </a:rPr>
                                   </m:ctrlPr>
@@ -13271,7 +13276,7 @@
                                     <m:sSubPr>
                                       <m:ctrlPr>
                                         <a:rPr lang="en-US" sz="2400" b="0" i="1" smtClean="0">
-                                          <a:latin typeface="Cambria Math" panose="02040503050406030204" pitchFamily="18" charset="0"/>
+                                          <a:latin typeface="Cambria Math"/>
                                           <a:ea typeface="Cambria Math" panose="02040503050406030204" pitchFamily="18" charset="0"/>
                                         </a:rPr>
                                       </m:ctrlPr>
@@ -13347,7 +13352,7 @@
                         <m:dPr>
                           <m:ctrlPr>
                             <a:rPr lang="en-US" sz="2400" i="1">
-                              <a:latin typeface="Cambria Math" panose="02040503050406030204" pitchFamily="18" charset="0"/>
+                              <a:latin typeface="Cambria Math"/>
                               <a:ea typeface="Cambria Math" panose="02040503050406030204" pitchFamily="18" charset="0"/>
                             </a:rPr>
                           </m:ctrlPr>
@@ -13357,7 +13362,7 @@
                             <m:sSubPr>
                               <m:ctrlPr>
                                 <a:rPr lang="en-US" sz="2400" i="1">
-                                  <a:latin typeface="Cambria Math" panose="02040503050406030204" pitchFamily="18" charset="0"/>
+                                  <a:latin typeface="Cambria Math"/>
                                   <a:ea typeface="Cambria Math" panose="02040503050406030204" pitchFamily="18" charset="0"/>
                                 </a:rPr>
                               </m:ctrlPr>
@@ -13398,7 +13403,7 @@
             </p:txBody>
           </p:sp>
         </mc:Choice>
-        <mc:Fallback>
+        <mc:Fallback xmlns="">
           <p:sp>
             <p:nvSpPr>
               <p:cNvPr id="4" name="TextBox 3"/>
@@ -13437,8 +13442,8 @@
           </p:sp>
         </mc:Fallback>
       </mc:AlternateContent>
-      <mc:AlternateContent xmlns:mc="http://schemas.openxmlformats.org/markup-compatibility/2006">
-        <mc:Choice xmlns:a14="http://schemas.microsoft.com/office/drawing/2010/main" Requires="a14">
+      <mc:AlternateContent xmlns:mc="http://schemas.openxmlformats.org/markup-compatibility/2006" xmlns:a14="http://schemas.microsoft.com/office/drawing/2010/main">
+        <mc:Choice Requires="a14">
           <p:sp>
             <p:nvSpPr>
               <p:cNvPr id="5" name="TextBox 4"/>
@@ -13489,7 +13494,7 @@
                       <m:sSubPr>
                         <m:ctrlPr>
                           <a:rPr lang="en-US" sz="2400" i="1" smtClean="0">
-                            <a:latin typeface="Cambria Math" panose="02040503050406030204" pitchFamily="18" charset="0"/>
+                            <a:latin typeface="Cambria Math"/>
                           </a:rPr>
                         </m:ctrlPr>
                       </m:sSubPr>
@@ -13558,7 +13563,7 @@
             </p:txBody>
           </p:sp>
         </mc:Choice>
-        <mc:Fallback>
+        <mc:Fallback xmlns="">
           <p:sp>
             <p:nvSpPr>
               <p:cNvPr id="5" name="TextBox 4"/>
@@ -13640,10 +13645,10 @@
           <p:cNvPr id="36" name="Rectangle 35">
             <a:extLst>
               <a:ext uri="{FF2B5EF4-FFF2-40B4-BE49-F238E27FC236}">
-                <a16:creationId xmlns:a16="http://schemas.microsoft.com/office/drawing/2014/main" xmlns="" id="{8BCFA5F4-1A8E-48F5-9209-7F24485B1D78}"/>
+                <a16:creationId xmlns="" xmlns:a16="http://schemas.microsoft.com/office/drawing/2014/main" id="{8BCFA5F4-1A8E-48F5-9209-7F24485B1D78}"/>
               </a:ext>
               <a:ext uri="{C183D7F6-B498-43B3-948B-1728B52AA6E4}">
-                <adec:decorative xmlns:adec="http://schemas.microsoft.com/office/drawing/2017/decorative" xmlns="" val="1"/>
+                <adec:decorative xmlns="" xmlns:adec="http://schemas.microsoft.com/office/drawing/2017/decorative" val="1"/>
               </a:ext>
             </a:extLst>
           </p:cNvPr>
@@ -13653,7 +13658,7 @@
           <p:nvPr>
             <p:extLst>
               <p:ext uri="{386F3935-93C4-4BCD-93E2-E3B085C9AB24}">
-                <p16:designElem xmlns:p16="http://schemas.microsoft.com/office/powerpoint/2015/main" xmlns="" val="1"/>
+                <p16:designElem xmlns="" xmlns:p16="http://schemas.microsoft.com/office/powerpoint/2015/main" val="1"/>
               </p:ext>
             </p:extLst>
           </p:nvPr>
@@ -13700,10 +13705,10 @@
           <p:cNvPr id="38" name="Rectangle 37">
             <a:extLst>
               <a:ext uri="{FF2B5EF4-FFF2-40B4-BE49-F238E27FC236}">
-                <a16:creationId xmlns:a16="http://schemas.microsoft.com/office/drawing/2014/main" xmlns="" id="{A8074621-AE44-40C4-8323-DF5185BC954E}"/>
+                <a16:creationId xmlns="" xmlns:a16="http://schemas.microsoft.com/office/drawing/2014/main" id="{A8074621-AE44-40C4-8323-DF5185BC954E}"/>
               </a:ext>
               <a:ext uri="{C183D7F6-B498-43B3-948B-1728B52AA6E4}">
-                <adec:decorative xmlns:adec="http://schemas.microsoft.com/office/drawing/2017/decorative" xmlns="" val="1"/>
+                <adec:decorative xmlns="" xmlns:adec="http://schemas.microsoft.com/office/drawing/2017/decorative" val="1"/>
               </a:ext>
             </a:extLst>
           </p:cNvPr>
@@ -13713,7 +13718,7 @@
           <p:nvPr>
             <p:extLst>
               <p:ext uri="{386F3935-93C4-4BCD-93E2-E3B085C9AB24}">
-                <p16:designElem xmlns:p16="http://schemas.microsoft.com/office/powerpoint/2015/main" xmlns="" val="1"/>
+                <p16:designElem xmlns="" xmlns:p16="http://schemas.microsoft.com/office/powerpoint/2015/main" val="1"/>
               </p:ext>
             </p:extLst>
           </p:nvPr>
@@ -13765,7 +13770,720 @@
           <p:cNvPr id="2" name="Title 1">
             <a:extLst>
               <a:ext uri="{FF2B5EF4-FFF2-40B4-BE49-F238E27FC236}">
-                <a16:creationId xmlns:a16="http://schemas.microsoft.com/office/drawing/2014/main" xmlns="" id="{98665829-B67C-1898-629C-AC1781FAF9BD}"/>
+                <a16:creationId xmlns="" xmlns:a16="http://schemas.microsoft.com/office/drawing/2014/main" id="{98665829-B67C-1898-629C-AC1781FAF9BD}"/>
+              </a:ext>
+            </a:extLst>
+          </p:cNvPr>
+          <p:cNvSpPr>
+            <a:spLocks noGrp="1"/>
+          </p:cNvSpPr>
+          <p:nvPr>
+            <p:ph type="title"/>
+          </p:nvPr>
+        </p:nvSpPr>
+        <p:spPr/>
+        <p:txBody>
+          <a:bodyPr>
+            <a:normAutofit/>
+          </a:bodyPr>
+          <a:lstStyle/>
+          <a:p>
+            <a:r>
+              <a:rPr lang="en-US" dirty="0" smtClean="0"/>
+              <a:t>Loss Function</a:t>
+            </a:r>
+            <a:endParaRPr lang="en-US" sz="3600" dirty="0"/>
+          </a:p>
+        </p:txBody>
+      </p:sp>
+      <mc:AlternateContent xmlns:mc="http://schemas.openxmlformats.org/markup-compatibility/2006" xmlns:a14="http://schemas.microsoft.com/office/drawing/2010/main">
+        <mc:Choice Requires="a14">
+          <p:sp>
+            <p:nvSpPr>
+              <p:cNvPr id="4" name="TextBox 3"/>
+              <p:cNvSpPr txBox="1"/>
+              <p:nvPr/>
+            </p:nvSpPr>
+            <p:spPr>
+              <a:xfrm>
+                <a:off x="500743" y="2451467"/>
+                <a:ext cx="6997493" cy="1008225"/>
+              </a:xfrm>
+              <a:prstGeom prst="rect">
+                <a:avLst/>
+              </a:prstGeom>
+              <a:noFill/>
+            </p:spPr>
+            <p:txBody>
+              <a:bodyPr wrap="none" lIns="0" tIns="0" rIns="0" bIns="0" rtlCol="0">
+                <a:spAutoFit/>
+              </a:bodyPr>
+              <a:lstStyle/>
+              <a:p>
+                <a:pPr/>
+                <a14:m>
+                  <m:oMathPara xmlns:m="http://schemas.openxmlformats.org/officeDocument/2006/math">
+                    <m:oMathParaPr>
+                      <m:jc m:val="centerGroup"/>
+                    </m:oMathParaPr>
+                    <m:oMath xmlns:m="http://schemas.openxmlformats.org/officeDocument/2006/math">
+                      <m:sSub>
+                        <m:sSubPr>
+                          <m:ctrlPr>
+                            <a:rPr lang="en-CA" sz="2400" i="1" smtClean="0">
+                              <a:latin typeface="Cambria Math"/>
+                            </a:rPr>
+                          </m:ctrlPr>
+                        </m:sSubPr>
+                        <m:e>
+                          <m:r>
+                            <a:rPr lang="en-US" sz="2400" b="0" i="1" smtClean="0">
+                              <a:latin typeface="Cambria Math" panose="02040503050406030204" pitchFamily="18" charset="0"/>
+                            </a:rPr>
+                            <m:t>𝐿</m:t>
+                          </m:r>
+                        </m:e>
+                        <m:sub>
+                          <m:r>
+                            <a:rPr lang="en-CA" sz="2400" i="1" smtClean="0">
+                              <a:latin typeface="Cambria Math" panose="02040503050406030204" pitchFamily="18" charset="0"/>
+                              <a:ea typeface="Cambria Math" panose="02040503050406030204" pitchFamily="18" charset="0"/>
+                            </a:rPr>
+                            <m:t>𝛽</m:t>
+                          </m:r>
+                        </m:sub>
+                      </m:sSub>
+                      <m:r>
+                        <a:rPr lang="en-US" sz="2400" b="0" i="1" smtClean="0">
+                          <a:latin typeface="Cambria Math" panose="02040503050406030204" pitchFamily="18" charset="0"/>
+                        </a:rPr>
+                        <m:t>=</m:t>
+                      </m:r>
+                      <m:nary>
+                        <m:naryPr>
+                          <m:chr m:val="∑"/>
+                          <m:ctrlPr>
+                            <a:rPr lang="en-US" sz="2400" b="0" i="1" smtClean="0">
+                              <a:latin typeface="Cambria Math"/>
+                            </a:rPr>
+                          </m:ctrlPr>
+                        </m:naryPr>
+                        <m:sub>
+                          <m:r>
+                            <m:rPr>
+                              <m:brk m:alnAt="23"/>
+                            </m:rPr>
+                            <a:rPr lang="en-US" sz="2400" b="0" i="1" smtClean="0">
+                              <a:latin typeface="Cambria Math" panose="02040503050406030204" pitchFamily="18" charset="0"/>
+                            </a:rPr>
+                            <m:t>𝑖</m:t>
+                          </m:r>
+                          <m:r>
+                            <a:rPr lang="en-US" sz="2400" b="0" i="1" smtClean="0">
+                              <a:latin typeface="Cambria Math" panose="02040503050406030204" pitchFamily="18" charset="0"/>
+                            </a:rPr>
+                            <m:t>=1</m:t>
+                          </m:r>
+                        </m:sub>
+                        <m:sup>
+                          <m:r>
+                            <a:rPr lang="en-US" sz="2400" b="0" i="1" smtClean="0">
+                              <a:latin typeface="Cambria Math" panose="02040503050406030204" pitchFamily="18" charset="0"/>
+                            </a:rPr>
+                            <m:t>𝑚</m:t>
+                          </m:r>
+                        </m:sup>
+                        <m:e>
+                          <m:r>
+                            <a:rPr lang="en-US" sz="2400" b="0" i="1" smtClean="0">
+                              <a:latin typeface="Cambria Math" panose="02040503050406030204" pitchFamily="18" charset="0"/>
+                            </a:rPr>
+                            <m:t>𝑟𝑒𝑙𝑢</m:t>
+                          </m:r>
+                          <m:r>
+                            <a:rPr lang="en-US" sz="2400" b="0" i="1" smtClean="0">
+                              <a:latin typeface="Cambria Math" panose="02040503050406030204" pitchFamily="18" charset="0"/>
+                            </a:rPr>
+                            <m:t>(</m:t>
+                          </m:r>
+                          <m:d>
+                            <m:dPr>
+                              <m:ctrlPr>
+                                <a:rPr lang="en-US" sz="2400" b="0" i="1" smtClean="0">
+                                  <a:latin typeface="Cambria Math"/>
+                                </a:rPr>
+                              </m:ctrlPr>
+                            </m:dPr>
+                            <m:e>
+                              <m:r>
+                                <a:rPr lang="en-US" sz="2400" b="0" i="1" smtClean="0">
+                                  <a:latin typeface="Cambria Math" panose="02040503050406030204" pitchFamily="18" charset="0"/>
+                                  <a:ea typeface="Cambria Math" panose="02040503050406030204" pitchFamily="18" charset="0"/>
+                                </a:rPr>
+                                <m:t>𝛽</m:t>
+                              </m:r>
+                              <m:d>
+                                <m:dPr>
+                                  <m:ctrlPr>
+                                    <a:rPr lang="en-US" sz="2400" b="0" i="1" smtClean="0">
+                                      <a:latin typeface="Cambria Math"/>
+                                      <a:ea typeface="Cambria Math" panose="02040503050406030204" pitchFamily="18" charset="0"/>
+                                    </a:rPr>
+                                  </m:ctrlPr>
+                                </m:dPr>
+                                <m:e>
+                                  <m:sSub>
+                                    <m:sSubPr>
+                                      <m:ctrlPr>
+                                        <a:rPr lang="en-US" sz="2400" b="0" i="1" smtClean="0">
+                                          <a:latin typeface="Cambria Math"/>
+                                          <a:ea typeface="Cambria Math" panose="02040503050406030204" pitchFamily="18" charset="0"/>
+                                        </a:rPr>
+                                      </m:ctrlPr>
+                                    </m:sSubPr>
+                                    <m:e>
+                                      <m:r>
+                                        <a:rPr lang="en-US" sz="2400" b="0" i="1" smtClean="0">
+                                          <a:latin typeface="Cambria Math" panose="02040503050406030204" pitchFamily="18" charset="0"/>
+                                          <a:ea typeface="Cambria Math" panose="02040503050406030204" pitchFamily="18" charset="0"/>
+                                        </a:rPr>
+                                        <m:t>𝑀</m:t>
+                                      </m:r>
+                                    </m:e>
+                                    <m:sub>
+                                      <m:r>
+                                        <a:rPr lang="en-US" sz="2400" b="0" i="1" smtClean="0">
+                                          <a:latin typeface="Cambria Math" panose="02040503050406030204" pitchFamily="18" charset="0"/>
+                                          <a:ea typeface="Cambria Math" panose="02040503050406030204" pitchFamily="18" charset="0"/>
+                                        </a:rPr>
+                                        <m:t>𝑖</m:t>
+                                      </m:r>
+                                    </m:sub>
+                                  </m:sSub>
+                                </m:e>
+                              </m:d>
+                              <m:r>
+                                <a:rPr lang="en-US" sz="2400" b="0" i="1" smtClean="0">
+                                  <a:latin typeface="Cambria Math" panose="02040503050406030204" pitchFamily="18" charset="0"/>
+                                </a:rPr>
+                                <m:t>−</m:t>
+                              </m:r>
+                              <m:r>
+                                <a:rPr lang="en-US" sz="2400" b="0" i="1" smtClean="0">
+                                  <a:latin typeface="Cambria Math" panose="02040503050406030204" pitchFamily="18" charset="0"/>
+                                  <a:ea typeface="Cambria Math" panose="02040503050406030204" pitchFamily="18" charset="0"/>
+                                </a:rPr>
+                                <m:t>𝛽</m:t>
+                              </m:r>
+                              <m:d>
+                                <m:dPr>
+                                  <m:ctrlPr>
+                                    <a:rPr lang="en-US" sz="2400" b="0" i="1" smtClean="0">
+                                      <a:latin typeface="Cambria Math"/>
+                                      <a:ea typeface="Cambria Math" panose="02040503050406030204" pitchFamily="18" charset="0"/>
+                                    </a:rPr>
+                                  </m:ctrlPr>
+                                </m:dPr>
+                                <m:e>
+                                  <m:sSub>
+                                    <m:sSubPr>
+                                      <m:ctrlPr>
+                                        <a:rPr lang="en-US" sz="2400" b="0" i="1" smtClean="0">
+                                          <a:latin typeface="Cambria Math"/>
+                                          <a:ea typeface="Cambria Math" panose="02040503050406030204" pitchFamily="18" charset="0"/>
+                                        </a:rPr>
+                                      </m:ctrlPr>
+                                    </m:sSubPr>
+                                    <m:e>
+                                      <m:r>
+                                        <a:rPr lang="en-US" sz="2400" b="0" i="1" smtClean="0">
+                                          <a:latin typeface="Cambria Math" panose="02040503050406030204" pitchFamily="18" charset="0"/>
+                                          <a:ea typeface="Cambria Math" panose="02040503050406030204" pitchFamily="18" charset="0"/>
+                                        </a:rPr>
+                                        <m:t>𝑀</m:t>
+                                      </m:r>
+                                    </m:e>
+                                    <m:sub>
+                                      <m:r>
+                                        <a:rPr lang="en-US" sz="2400" b="0" i="1" smtClean="0">
+                                          <a:latin typeface="Cambria Math" panose="02040503050406030204" pitchFamily="18" charset="0"/>
+                                          <a:ea typeface="Cambria Math" panose="02040503050406030204" pitchFamily="18" charset="0"/>
+                                        </a:rPr>
+                                        <m:t>𝑖</m:t>
+                                      </m:r>
+                                    </m:sub>
+                                  </m:sSub>
+                                  <m:r>
+                                    <a:rPr lang="en-US" sz="2400" b="0" i="1" smtClean="0">
+                                      <a:latin typeface="Cambria Math" panose="02040503050406030204" pitchFamily="18" charset="0"/>
+                                      <a:ea typeface="Cambria Math" panose="02040503050406030204" pitchFamily="18" charset="0"/>
+                                    </a:rPr>
+                                    <m:t>+</m:t>
+                                  </m:r>
+                                  <m:r>
+                                    <a:rPr lang="en-US" sz="2400" b="0" i="1" smtClean="0">
+                                      <a:latin typeface="Cambria Math" panose="02040503050406030204" pitchFamily="18" charset="0"/>
+                                      <a:ea typeface="Cambria Math" panose="02040503050406030204" pitchFamily="18" charset="0"/>
+                                    </a:rPr>
+                                    <m:t>𝜖</m:t>
+                                  </m:r>
+                                </m:e>
+                              </m:d>
+                            </m:e>
+                          </m:d>
+                          <m:r>
+                            <a:rPr lang="en-US" sz="2400" b="0" i="1" smtClean="0">
+                              <a:latin typeface="Cambria Math" panose="02040503050406030204" pitchFamily="18" charset="0"/>
+                              <a:ea typeface="Cambria Math" panose="02040503050406030204" pitchFamily="18" charset="0"/>
+                            </a:rPr>
+                            <m:t>+</m:t>
+                          </m:r>
+                          <m:r>
+                            <a:rPr lang="en-US" sz="2400" b="0" i="1" smtClean="0">
+                              <a:latin typeface="Cambria Math" panose="02040503050406030204" pitchFamily="18" charset="0"/>
+                              <a:ea typeface="Cambria Math" panose="02040503050406030204" pitchFamily="18" charset="0"/>
+                            </a:rPr>
+                            <m:t>𝑟𝑒𝑙𝑢</m:t>
+                          </m:r>
+                          <m:r>
+                            <a:rPr lang="en-US" sz="2400" b="0" i="1" smtClean="0">
+                              <a:latin typeface="Cambria Math" panose="02040503050406030204" pitchFamily="18" charset="0"/>
+                              <a:ea typeface="Cambria Math" panose="02040503050406030204" pitchFamily="18" charset="0"/>
+                            </a:rPr>
+                            <m:t>(−</m:t>
+                          </m:r>
+                        </m:e>
+                      </m:nary>
+                      <m:r>
+                        <a:rPr lang="en-US" sz="2400" i="1">
+                          <a:latin typeface="Cambria Math" panose="02040503050406030204" pitchFamily="18" charset="0"/>
+                          <a:ea typeface="Cambria Math" panose="02040503050406030204" pitchFamily="18" charset="0"/>
+                        </a:rPr>
+                        <m:t>𝛽</m:t>
+                      </m:r>
+                      <m:d>
+                        <m:dPr>
+                          <m:ctrlPr>
+                            <a:rPr lang="en-US" sz="2400" i="1">
+                              <a:latin typeface="Cambria Math"/>
+                              <a:ea typeface="Cambria Math" panose="02040503050406030204" pitchFamily="18" charset="0"/>
+                            </a:rPr>
+                          </m:ctrlPr>
+                        </m:dPr>
+                        <m:e>
+                          <m:sSub>
+                            <m:sSubPr>
+                              <m:ctrlPr>
+                                <a:rPr lang="en-US" sz="2400" i="1">
+                                  <a:latin typeface="Cambria Math"/>
+                                  <a:ea typeface="Cambria Math" panose="02040503050406030204" pitchFamily="18" charset="0"/>
+                                </a:rPr>
+                              </m:ctrlPr>
+                            </m:sSubPr>
+                            <m:e>
+                              <m:r>
+                                <a:rPr lang="en-US" sz="2400" i="1">
+                                  <a:latin typeface="Cambria Math" panose="02040503050406030204" pitchFamily="18" charset="0"/>
+                                  <a:ea typeface="Cambria Math" panose="02040503050406030204" pitchFamily="18" charset="0"/>
+                                </a:rPr>
+                                <m:t>𝑀</m:t>
+                              </m:r>
+                            </m:e>
+                            <m:sub>
+                              <m:r>
+                                <a:rPr lang="en-US" sz="2400" i="1">
+                                  <a:latin typeface="Cambria Math" panose="02040503050406030204" pitchFamily="18" charset="0"/>
+                                  <a:ea typeface="Cambria Math" panose="02040503050406030204" pitchFamily="18" charset="0"/>
+                                </a:rPr>
+                                <m:t>𝑖</m:t>
+                              </m:r>
+                            </m:sub>
+                          </m:sSub>
+                        </m:e>
+                      </m:d>
+                      <m:r>
+                        <a:rPr lang="en-US" sz="2400" b="0" i="1" smtClean="0">
+                          <a:latin typeface="Cambria Math" panose="02040503050406030204" pitchFamily="18" charset="0"/>
+                          <a:ea typeface="Cambria Math" panose="02040503050406030204" pitchFamily="18" charset="0"/>
+                        </a:rPr>
+                        <m:t>)</m:t>
+                      </m:r>
+                    </m:oMath>
+                  </m:oMathPara>
+                </a14:m>
+                <a:endParaRPr lang="en-CA" sz="2400" dirty="0"/>
+              </a:p>
+            </p:txBody>
+          </p:sp>
+        </mc:Choice>
+        <mc:Fallback xmlns="">
+          <p:sp>
+            <p:nvSpPr>
+              <p:cNvPr id="4" name="TextBox 3"/>
+              <p:cNvSpPr txBox="1">
+                <a:spLocks noRot="1" noChangeAspect="1" noMove="1" noResize="1" noEditPoints="1" noAdjustHandles="1" noChangeArrowheads="1" noChangeShapeType="1" noTextEdit="1"/>
+              </p:cNvSpPr>
+              <p:nvPr/>
+            </p:nvSpPr>
+            <p:spPr>
+              <a:xfrm>
+                <a:off x="500743" y="2451467"/>
+                <a:ext cx="6997493" cy="1008225"/>
+              </a:xfrm>
+              <a:prstGeom prst="rect">
+                <a:avLst/>
+              </a:prstGeom>
+              <a:blipFill rotWithShape="0">
+                <a:blip r:embed="rId2"/>
+                <a:stretch>
+                  <a:fillRect/>
+                </a:stretch>
+              </a:blipFill>
+            </p:spPr>
+            <p:txBody>
+              <a:bodyPr/>
+              <a:lstStyle/>
+              <a:p>
+                <a:r>
+                  <a:rPr lang="en-CA">
+                    <a:noFill/>
+                  </a:rPr>
+                  <a:t> </a:t>
+                </a:r>
+              </a:p>
+            </p:txBody>
+          </p:sp>
+        </mc:Fallback>
+      </mc:AlternateContent>
+      <mc:AlternateContent xmlns:mc="http://schemas.openxmlformats.org/markup-compatibility/2006" xmlns:a14="http://schemas.microsoft.com/office/drawing/2010/main">
+        <mc:Choice Requires="a14">
+          <p:sp>
+            <p:nvSpPr>
+              <p:cNvPr id="5" name="TextBox 4"/>
+              <p:cNvSpPr txBox="1"/>
+              <p:nvPr/>
+            </p:nvSpPr>
+            <p:spPr>
+              <a:xfrm>
+                <a:off x="500743" y="4093029"/>
+                <a:ext cx="5730240" cy="830997"/>
+              </a:xfrm>
+              <a:prstGeom prst="rect">
+                <a:avLst/>
+              </a:prstGeom>
+              <a:noFill/>
+            </p:spPr>
+            <p:txBody>
+              <a:bodyPr wrap="square" rtlCol="0">
+                <a:spAutoFit/>
+              </a:bodyPr>
+              <a:lstStyle/>
+              <a:p>
+                <a14:m>
+                  <m:oMath xmlns:m="http://schemas.openxmlformats.org/officeDocument/2006/math">
+                    <m:r>
+                      <a:rPr lang="en-US" sz="2400" b="0" i="1" smtClean="0">
+                        <a:latin typeface="Cambria Math" panose="02040503050406030204" pitchFamily="18" charset="0"/>
+                      </a:rPr>
+                      <m:t>𝑚</m:t>
+                    </m:r>
+                    <m:r>
+                      <a:rPr lang="en-US" sz="2400" i="1" smtClean="0">
+                        <a:latin typeface="Cambria Math" panose="02040503050406030204" pitchFamily="18" charset="0"/>
+                      </a:rPr>
+                      <m:t> </m:t>
+                    </m:r>
+                  </m:oMath>
+                </a14:m>
+                <a:r>
+                  <a:rPr lang="en-US" sz="2400" dirty="0" smtClean="0"/>
+                  <a:t>: Number of points sampled</a:t>
+                </a:r>
+              </a:p>
+              <a:p>
+                <a14:m>
+                  <m:oMath xmlns:m="http://schemas.openxmlformats.org/officeDocument/2006/math">
+                    <m:sSub>
+                      <m:sSubPr>
+                        <m:ctrlPr>
+                          <a:rPr lang="en-US" sz="2400" i="1" smtClean="0">
+                            <a:latin typeface="Cambria Math"/>
+                          </a:rPr>
+                        </m:ctrlPr>
+                      </m:sSubPr>
+                      <m:e>
+                        <m:r>
+                          <a:rPr lang="en-US" sz="2400" b="0" i="1" smtClean="0">
+                            <a:latin typeface="Cambria Math" panose="02040503050406030204" pitchFamily="18" charset="0"/>
+                          </a:rPr>
+                          <m:t>𝑀</m:t>
+                        </m:r>
+                      </m:e>
+                      <m:sub>
+                        <m:r>
+                          <a:rPr lang="en-US" sz="2400" i="1">
+                            <a:latin typeface="Cambria Math" panose="02040503050406030204" pitchFamily="18" charset="0"/>
+                          </a:rPr>
+                          <m:t>𝑖</m:t>
+                        </m:r>
+                      </m:sub>
+                    </m:sSub>
+                  </m:oMath>
+                </a14:m>
+                <a:r>
+                  <a:rPr lang="en-US" sz="2400" dirty="0" smtClean="0"/>
+                  <a:t>: </a:t>
+                </a:r>
+                <a14:m>
+                  <m:oMath xmlns:m="http://schemas.openxmlformats.org/officeDocument/2006/math">
+                    <m:r>
+                      <m:rPr>
+                        <m:brk m:alnAt="23"/>
+                      </m:rPr>
+                      <a:rPr lang="en-US" sz="2400" i="1">
+                        <a:latin typeface="Cambria Math" panose="02040503050406030204" pitchFamily="18" charset="0"/>
+                      </a:rPr>
+                      <m:t>𝑖</m:t>
+                    </m:r>
+                  </m:oMath>
+                </a14:m>
+                <a:r>
+                  <a:rPr lang="en-US" sz="2400" dirty="0" err="1" smtClean="0"/>
+                  <a:t>th</a:t>
+                </a:r>
+                <a:r>
+                  <a:rPr lang="en-US" sz="2400" dirty="0" smtClean="0"/>
+                  <a:t> sampled value of state</a:t>
+                </a:r>
+                <a14:m>
+                  <m:oMath xmlns:m="http://schemas.openxmlformats.org/officeDocument/2006/math">
+                    <m:r>
+                      <a:rPr lang="en-US" sz="2400" b="0" i="0" smtClean="0">
+                        <a:latin typeface="Cambria Math" panose="02040503050406030204" pitchFamily="18" charset="0"/>
+                      </a:rPr>
+                      <m:t> </m:t>
+                    </m:r>
+                    <m:r>
+                      <a:rPr lang="en-US" sz="2400" b="0" i="1" smtClean="0">
+                        <a:latin typeface="Cambria Math" panose="02040503050406030204" pitchFamily="18" charset="0"/>
+                      </a:rPr>
+                      <m:t>𝑀</m:t>
+                    </m:r>
+                  </m:oMath>
+                </a14:m>
+                <a:endParaRPr lang="en-US" sz="2400" dirty="0" smtClean="0"/>
+              </a:p>
+            </p:txBody>
+          </p:sp>
+        </mc:Choice>
+        <mc:Fallback xmlns="">
+          <p:sp>
+            <p:nvSpPr>
+              <p:cNvPr id="5" name="TextBox 4"/>
+              <p:cNvSpPr txBox="1">
+                <a:spLocks noRot="1" noChangeAspect="1" noMove="1" noResize="1" noEditPoints="1" noAdjustHandles="1" noChangeArrowheads="1" noChangeShapeType="1" noTextEdit="1"/>
+              </p:cNvSpPr>
+              <p:nvPr/>
+            </p:nvSpPr>
+            <p:spPr>
+              <a:xfrm>
+                <a:off x="500743" y="4093029"/>
+                <a:ext cx="5730240" cy="830997"/>
+              </a:xfrm>
+              <a:prstGeom prst="rect">
+                <a:avLst/>
+              </a:prstGeom>
+              <a:blipFill rotWithShape="0">
+                <a:blip r:embed="rId3"/>
+                <a:stretch>
+                  <a:fillRect l="-213" t="-5839" b="-15328"/>
+                </a:stretch>
+              </a:blipFill>
+            </p:spPr>
+            <p:txBody>
+              <a:bodyPr/>
+              <a:lstStyle/>
+              <a:p>
+                <a:r>
+                  <a:rPr lang="en-CA">
+                    <a:noFill/>
+                  </a:rPr>
+                  <a:t> </a:t>
+                </a:r>
+              </a:p>
+            </p:txBody>
+          </p:sp>
+        </mc:Fallback>
+      </mc:AlternateContent>
+    </p:spTree>
+    <p:extLst>
+      <p:ext uri="{BB962C8B-B14F-4D97-AF65-F5344CB8AC3E}">
+        <p14:creationId xmlns:p14="http://schemas.microsoft.com/office/powerpoint/2010/main" val="279563902"/>
+      </p:ext>
+    </p:extLst>
+  </p:cSld>
+  <p:clrMapOvr>
+    <a:overrideClrMapping bg1="dk1" tx1="lt1" bg2="dk2" tx2="lt2" accent1="accent1" accent2="accent2" accent3="accent3" accent4="accent4" accent5="accent5" accent6="accent6" hlink="hlink" folHlink="folHlink"/>
+  </p:clrMapOvr>
+</p:sld>
+</file>
+
+<file path=ppt/slides/slide13.xml><?xml version="1.0" encoding="utf-8"?>
+<p:sld xmlns:a="http://schemas.openxmlformats.org/drawingml/2006/main" xmlns:r="http://schemas.openxmlformats.org/officeDocument/2006/relationships" xmlns:p="http://schemas.openxmlformats.org/presentationml/2006/main">
+  <p:cSld>
+    <p:bg>
+      <p:bgPr>
+        <a:solidFill>
+          <a:schemeClr val="bg2"/>
+        </a:solidFill>
+        <a:effectLst/>
+      </p:bgPr>
+    </p:bg>
+    <p:spTree>
+      <p:nvGrpSpPr>
+        <p:cNvPr id="1" name=""/>
+        <p:cNvGrpSpPr/>
+        <p:nvPr/>
+      </p:nvGrpSpPr>
+      <p:grpSpPr>
+        <a:xfrm>
+          <a:off x="0" y="0"/>
+          <a:ext cx="0" cy="0"/>
+          <a:chOff x="0" y="0"/>
+          <a:chExt cx="0" cy="0"/>
+        </a:xfrm>
+      </p:grpSpPr>
+      <p:sp useBgFill="1">
+        <p:nvSpPr>
+          <p:cNvPr id="36" name="Rectangle 35">
+            <a:extLst>
+              <a:ext uri="{FF2B5EF4-FFF2-40B4-BE49-F238E27FC236}">
+                <a16:creationId xmlns="" xmlns:a16="http://schemas.microsoft.com/office/drawing/2014/main" id="{8BCFA5F4-1A8E-48F5-9209-7F24485B1D78}"/>
+              </a:ext>
+              <a:ext uri="{C183D7F6-B498-43B3-948B-1728B52AA6E4}">
+                <adec:decorative xmlns="" xmlns:adec="http://schemas.microsoft.com/office/drawing/2017/decorative" val="1"/>
+              </a:ext>
+            </a:extLst>
+          </p:cNvPr>
+          <p:cNvSpPr>
+            <a:spLocks noGrp="1" noRot="1" noChangeAspect="1" noMove="1" noResize="1" noEditPoints="1" noAdjustHandles="1" noChangeArrowheads="1" noChangeShapeType="1" noTextEdit="1"/>
+          </p:cNvSpPr>
+          <p:nvPr>
+            <p:extLst>
+              <p:ext uri="{386F3935-93C4-4BCD-93E2-E3B085C9AB24}">
+                <p16:designElem xmlns="" xmlns:p16="http://schemas.microsoft.com/office/powerpoint/2015/main" val="1"/>
+              </p:ext>
+            </p:extLst>
+          </p:nvPr>
+        </p:nvSpPr>
+        <p:spPr>
+          <a:xfrm>
+            <a:off x="0" y="0"/>
+            <a:ext cx="12192000" cy="6858000"/>
+          </a:xfrm>
+          <a:prstGeom prst="rect">
+            <a:avLst/>
+          </a:prstGeom>
+          <a:ln>
+            <a:noFill/>
+          </a:ln>
+        </p:spPr>
+        <p:style>
+          <a:lnRef idx="2">
+            <a:schemeClr val="accent1">
+              <a:shade val="50000"/>
+            </a:schemeClr>
+          </a:lnRef>
+          <a:fillRef idx="1">
+            <a:schemeClr val="accent1"/>
+          </a:fillRef>
+          <a:effectRef idx="0">
+            <a:schemeClr val="accent1"/>
+          </a:effectRef>
+          <a:fontRef idx="minor">
+            <a:schemeClr val="lt1"/>
+          </a:fontRef>
+        </p:style>
+        <p:txBody>
+          <a:bodyPr rtlCol="0" anchor="ctr"/>
+          <a:lstStyle/>
+          <a:p>
+            <a:pPr algn="ctr"/>
+            <a:endParaRPr lang="en-US" dirty="0"/>
+          </a:p>
+        </p:txBody>
+      </p:sp>
+      <p:sp>
+        <p:nvSpPr>
+          <p:cNvPr id="38" name="Rectangle 37">
+            <a:extLst>
+              <a:ext uri="{FF2B5EF4-FFF2-40B4-BE49-F238E27FC236}">
+                <a16:creationId xmlns="" xmlns:a16="http://schemas.microsoft.com/office/drawing/2014/main" id="{A8074621-AE44-40C4-8323-DF5185BC954E}"/>
+              </a:ext>
+              <a:ext uri="{C183D7F6-B498-43B3-948B-1728B52AA6E4}">
+                <adec:decorative xmlns="" xmlns:adec="http://schemas.microsoft.com/office/drawing/2017/decorative" val="1"/>
+              </a:ext>
+            </a:extLst>
+          </p:cNvPr>
+          <p:cNvSpPr>
+            <a:spLocks noGrp="1" noRot="1" noChangeAspect="1" noMove="1" noResize="1" noEditPoints="1" noAdjustHandles="1" noChangeArrowheads="1" noChangeShapeType="1" noTextEdit="1"/>
+          </p:cNvSpPr>
+          <p:nvPr>
+            <p:extLst>
+              <p:ext uri="{386F3935-93C4-4BCD-93E2-E3B085C9AB24}">
+                <p16:designElem xmlns="" xmlns:p16="http://schemas.microsoft.com/office/powerpoint/2015/main" val="1"/>
+              </p:ext>
+            </p:extLst>
+          </p:nvPr>
+        </p:nvSpPr>
+        <p:spPr>
+          <a:xfrm>
+            <a:off x="0" y="0"/>
+            <a:ext cx="12192000" cy="2053062"/>
+          </a:xfrm>
+          <a:prstGeom prst="rect">
+            <a:avLst/>
+          </a:prstGeom>
+          <a:solidFill>
+            <a:schemeClr val="bg2">
+              <a:lumMod val="75000"/>
+            </a:schemeClr>
+          </a:solidFill>
+          <a:ln>
+            <a:noFill/>
+          </a:ln>
+        </p:spPr>
+        <p:style>
+          <a:lnRef idx="2">
+            <a:schemeClr val="accent1">
+              <a:shade val="50000"/>
+            </a:schemeClr>
+          </a:lnRef>
+          <a:fillRef idx="1">
+            <a:schemeClr val="accent1"/>
+          </a:fillRef>
+          <a:effectRef idx="0">
+            <a:schemeClr val="accent1"/>
+          </a:effectRef>
+          <a:fontRef idx="minor">
+            <a:schemeClr val="lt1"/>
+          </a:fontRef>
+        </p:style>
+        <p:txBody>
+          <a:bodyPr rtlCol="0" anchor="ctr"/>
+          <a:lstStyle/>
+          <a:p>
+            <a:pPr algn="ctr"/>
+            <a:endParaRPr lang="en-US"/>
+          </a:p>
+        </p:txBody>
+      </p:sp>
+      <p:sp>
+        <p:nvSpPr>
+          <p:cNvPr id="2" name="Title 1">
+            <a:extLst>
+              <a:ext uri="{FF2B5EF4-FFF2-40B4-BE49-F238E27FC236}">
+                <a16:creationId xmlns="" xmlns:a16="http://schemas.microsoft.com/office/drawing/2014/main" id="{98665829-B67C-1898-629C-AC1781FAF9BD}"/>
               </a:ext>
             </a:extLst>
           </p:cNvPr>
@@ -13791,8 +14509,8 @@
           </a:p>
         </p:txBody>
       </p:sp>
-      <mc:AlternateContent xmlns:mc="http://schemas.openxmlformats.org/markup-compatibility/2006">
-        <mc:Choice xmlns:a14="http://schemas.microsoft.com/office/drawing/2010/main" Requires="a14">
+      <mc:AlternateContent xmlns:mc="http://schemas.openxmlformats.org/markup-compatibility/2006" xmlns:a14="http://schemas.microsoft.com/office/drawing/2010/main">
+        <mc:Choice Requires="a14">
           <p:sp>
             <p:nvSpPr>
               <p:cNvPr id="4" name="TextBox 3"/>
@@ -13815,6 +14533,7 @@
               </a:bodyPr>
               <a:lstStyle/>
               <a:p>
+                <a:pPr/>
                 <a14:m>
                   <m:oMathPara xmlns:m="http://schemas.openxmlformats.org/officeDocument/2006/math">
                     <m:oMathParaPr>
@@ -13825,7 +14544,7 @@
                         <m:sSubPr>
                           <m:ctrlPr>
                             <a:rPr lang="en-CA" sz="2400" i="1" smtClean="0">
-                              <a:latin typeface="Cambria Math" panose="02040503050406030204" pitchFamily="18" charset="0"/>
+                              <a:latin typeface="Cambria Math"/>
                             </a:rPr>
                           </m:ctrlPr>
                         </m:sSubPr>
@@ -13856,7 +14575,7 @@
                         <m:fPr>
                           <m:ctrlPr>
                             <a:rPr lang="en-US" sz="2400" b="0" i="1" smtClean="0">
-                              <a:latin typeface="Cambria Math" panose="02040503050406030204" pitchFamily="18" charset="0"/>
+                              <a:latin typeface="Cambria Math"/>
                             </a:rPr>
                           </m:ctrlPr>
                         </m:fPr>
@@ -13883,7 +14602,7 @@
                           <m:supHide m:val="on"/>
                           <m:ctrlPr>
                             <a:rPr lang="en-US" sz="2400" b="0" i="1" smtClean="0">
-                              <a:latin typeface="Cambria Math" panose="02040503050406030204" pitchFamily="18" charset="0"/>
+                              <a:latin typeface="Cambria Math"/>
                             </a:rPr>
                           </m:ctrlPr>
                         </m:naryPr>
@@ -13940,7 +14659,7 @@
                             <m:fPr>
                               <m:ctrlPr>
                                 <a:rPr lang="en-US" sz="2400" i="1">
-                                  <a:latin typeface="Cambria Math" panose="02040503050406030204" pitchFamily="18" charset="0"/>
+                                  <a:latin typeface="Cambria Math"/>
                                 </a:rPr>
                               </m:ctrlPr>
                             </m:fPr>
@@ -13963,7 +14682,7 @@
                                 <m:sSubPr>
                                   <m:ctrlPr>
                                     <a:rPr lang="en-US" sz="2400" i="1">
-                                      <a:latin typeface="Cambria Math" panose="02040503050406030204" pitchFamily="18" charset="0"/>
+                                      <a:latin typeface="Cambria Math"/>
                                     </a:rPr>
                                   </m:ctrlPr>
                                 </m:sSubPr>
@@ -13994,7 +14713,7 @@
                                 <m:sSubPr>
                                   <m:ctrlPr>
                                     <a:rPr lang="en-US" sz="2400" i="1">
-                                      <a:latin typeface="Cambria Math" panose="02040503050406030204" pitchFamily="18" charset="0"/>
+                                      <a:latin typeface="Cambria Math"/>
                                     </a:rPr>
                                   </m:ctrlPr>
                                 </m:sSubPr>
@@ -14028,7 +14747,7 @@
                               <m:chr m:val="∑"/>
                               <m:ctrlPr>
                                 <a:rPr lang="en-US" sz="2400" i="1">
-                                  <a:latin typeface="Cambria Math" panose="02040503050406030204" pitchFamily="18" charset="0"/>
+                                  <a:latin typeface="Cambria Math"/>
                                 </a:rPr>
                               </m:ctrlPr>
                             </m:naryPr>
@@ -14046,13 +14765,7 @@
                                 <a:rPr lang="en-US" sz="2400" i="1">
                                   <a:latin typeface="Cambria Math" panose="02040503050406030204" pitchFamily="18" charset="0"/>
                                 </a:rPr>
-                                <m:t>=</m:t>
-                              </m:r>
-                              <m:r>
-                                <a:rPr lang="en-US" sz="2400" i="1">
-                                  <a:latin typeface="Cambria Math" panose="02040503050406030204" pitchFamily="18" charset="0"/>
-                                </a:rPr>
-                                <m:t>1</m:t>
+                                <m:t>=1</m:t>
                               </m:r>
                             </m:sub>
                             <m:sup>
@@ -14068,7 +14781,7 @@
                                 <m:sSupPr>
                                   <m:ctrlPr>
                                     <a:rPr lang="en-US" sz="2400" i="1">
-                                      <a:latin typeface="Cambria Math" panose="02040503050406030204" pitchFamily="18" charset="0"/>
+                                      <a:latin typeface="Cambria Math"/>
                                     </a:rPr>
                                   </m:ctrlPr>
                                 </m:sSupPr>
@@ -14083,7 +14796,7 @@
                                     <m:sSubPr>
                                       <m:ctrlPr>
                                         <a:rPr lang="en-US" sz="2400" i="1">
-                                          <a:latin typeface="Cambria Math" panose="02040503050406030204" pitchFamily="18" charset="0"/>
+                                          <a:latin typeface="Cambria Math"/>
                                         </a:rPr>
                                       </m:ctrlPr>
                                     </m:sSubPr>
@@ -14114,7 +14827,7 @@
                                     <m:sSubPr>
                                       <m:ctrlPr>
                                         <a:rPr lang="en-US" sz="2400" i="1">
-                                          <a:latin typeface="Cambria Math" panose="02040503050406030204" pitchFamily="18" charset="0"/>
+                                          <a:latin typeface="Cambria Math"/>
                                         </a:rPr>
                                       </m:ctrlPr>
                                     </m:sSubPr>
@@ -14124,7 +14837,7 @@
                                           <m:chr m:val="̅"/>
                                           <m:ctrlPr>
                                             <a:rPr lang="en-US" sz="2400" i="1">
-                                              <a:latin typeface="Cambria Math" panose="02040503050406030204" pitchFamily="18" charset="0"/>
+                                              <a:latin typeface="Cambria Math"/>
                                             </a:rPr>
                                           </m:ctrlPr>
                                         </m:accPr>
@@ -14175,7 +14888,7 @@
             </p:txBody>
           </p:sp>
         </mc:Choice>
-        <mc:Fallback>
+        <mc:Fallback xmlns="">
           <p:sp>
             <p:nvSpPr>
               <p:cNvPr id="4" name="TextBox 3"/>
@@ -14225,7 +14938,7 @@
             <p:spPr>
               <a:xfrm>
                 <a:off x="500743" y="4093029"/>
-                <a:ext cx="5730240" cy="1200329"/>
+                <a:ext cx="5730240" cy="1569660"/>
               </a:xfrm>
               <a:prstGeom prst="rect">
                 <a:avLst/>
@@ -14266,7 +14979,7 @@
                       <m:sSubPr>
                         <m:ctrlPr>
                           <a:rPr lang="en-US" sz="2400" i="1">
-                            <a:latin typeface="Cambria Math" panose="02040503050406030204" pitchFamily="18" charset="0"/>
+                            <a:latin typeface="Cambria Math"/>
                           </a:rPr>
                         </m:ctrlPr>
                       </m:sSubPr>
@@ -14339,7 +15052,7 @@
                       <m:sSubPr>
                         <m:ctrlPr>
                           <a:rPr lang="en-US" sz="2400" i="1">
-                            <a:latin typeface="Cambria Math" panose="02040503050406030204" pitchFamily="18" charset="0"/>
+                            <a:latin typeface="Cambria Math"/>
                           </a:rPr>
                         </m:ctrlPr>
                       </m:sSubPr>
@@ -14349,7 +15062,7 @@
                             <m:chr m:val="̅"/>
                             <m:ctrlPr>
                               <a:rPr lang="en-US" sz="2400" i="1">
-                                <a:latin typeface="Cambria Math" panose="02040503050406030204" pitchFamily="18" charset="0"/>
+                                <a:latin typeface="Cambria Math"/>
                               </a:rPr>
                             </m:ctrlPr>
                           </m:accPr>
@@ -14409,6 +15122,9 @@
                     </m:r>
                   </m:oMath>
                 </a14:m>
+                <a:endParaRPr lang="en-US" sz="2400" dirty="0" smtClean="0"/>
+              </a:p>
+              <a:p>
                 <a:endParaRPr lang="en-US" sz="2400" dirty="0"/>
               </a:p>
             </p:txBody>
@@ -14426,15 +15142,15 @@
             <p:spPr>
               <a:xfrm>
                 <a:off x="500743" y="4093029"/>
-                <a:ext cx="5730240" cy="1200329"/>
+                <a:ext cx="5730240" cy="1569660"/>
               </a:xfrm>
               <a:prstGeom prst="rect">
                 <a:avLst/>
               </a:prstGeom>
-              <a:blipFill rotWithShape="0">
+              <a:blipFill rotWithShape="1">
                 <a:blip r:embed="rId3"/>
                 <a:stretch>
-                  <a:fillRect l="-213" t="-4061" b="-10660"/>
+                  <a:fillRect l="-213" t="-2713"/>
                 </a:stretch>
               </a:blipFill>
             </p:spPr>
@@ -14457,219 +15173,6 @@
     <p:extLst>
       <p:ext uri="{BB962C8B-B14F-4D97-AF65-F5344CB8AC3E}">
         <p14:creationId xmlns:p14="http://schemas.microsoft.com/office/powerpoint/2010/main" val="2254017749"/>
-      </p:ext>
-    </p:extLst>
-  </p:cSld>
-  <p:clrMapOvr>
-    <a:overrideClrMapping bg1="dk1" tx1="lt1" bg2="dk2" tx2="lt2" accent1="accent1" accent2="accent2" accent3="accent3" accent4="accent4" accent5="accent5" accent6="accent6" hlink="hlink" folHlink="folHlink"/>
-  </p:clrMapOvr>
-</p:sld>
-</file>
-
-<file path=ppt/slides/slide13.xml><?xml version="1.0" encoding="utf-8"?>
-<p:sld xmlns:a="http://schemas.openxmlformats.org/drawingml/2006/main" xmlns:r="http://schemas.openxmlformats.org/officeDocument/2006/relationships" xmlns:p="http://schemas.openxmlformats.org/presentationml/2006/main">
-  <p:cSld>
-    <p:bg>
-      <p:bgPr>
-        <a:solidFill>
-          <a:schemeClr val="bg2"/>
-        </a:solidFill>
-        <a:effectLst/>
-      </p:bgPr>
-    </p:bg>
-    <p:spTree>
-      <p:nvGrpSpPr>
-        <p:cNvPr id="1" name=""/>
-        <p:cNvGrpSpPr/>
-        <p:nvPr/>
-      </p:nvGrpSpPr>
-      <p:grpSpPr>
-        <a:xfrm>
-          <a:off x="0" y="0"/>
-          <a:ext cx="0" cy="0"/>
-          <a:chOff x="0" y="0"/>
-          <a:chExt cx="0" cy="0"/>
-        </a:xfrm>
-      </p:grpSpPr>
-      <p:sp useBgFill="1">
-        <p:nvSpPr>
-          <p:cNvPr id="36" name="Rectangle 35">
-            <a:extLst>
-              <a:ext uri="{FF2B5EF4-FFF2-40B4-BE49-F238E27FC236}">
-                <a16:creationId xmlns:a16="http://schemas.microsoft.com/office/drawing/2014/main" xmlns="" id="{8BCFA5F4-1A8E-48F5-9209-7F24485B1D78}"/>
-              </a:ext>
-              <a:ext uri="{C183D7F6-B498-43B3-948B-1728B52AA6E4}">
-                <adec:decorative xmlns:adec="http://schemas.microsoft.com/office/drawing/2017/decorative" xmlns="" val="1"/>
-              </a:ext>
-            </a:extLst>
-          </p:cNvPr>
-          <p:cNvSpPr>
-            <a:spLocks noGrp="1" noRot="1" noChangeAspect="1" noMove="1" noResize="1" noEditPoints="1" noAdjustHandles="1" noChangeArrowheads="1" noChangeShapeType="1" noTextEdit="1"/>
-          </p:cNvSpPr>
-          <p:nvPr>
-            <p:extLst>
-              <p:ext uri="{386F3935-93C4-4BCD-93E2-E3B085C9AB24}">
-                <p16:designElem xmlns:p16="http://schemas.microsoft.com/office/powerpoint/2015/main" xmlns="" val="1"/>
-              </p:ext>
-            </p:extLst>
-          </p:nvPr>
-        </p:nvSpPr>
-        <p:spPr>
-          <a:xfrm>
-            <a:off x="0" y="0"/>
-            <a:ext cx="12192000" cy="6858000"/>
-          </a:xfrm>
-          <a:prstGeom prst="rect">
-            <a:avLst/>
-          </a:prstGeom>
-          <a:ln>
-            <a:noFill/>
-          </a:ln>
-        </p:spPr>
-        <p:style>
-          <a:lnRef idx="2">
-            <a:schemeClr val="accent1">
-              <a:shade val="50000"/>
-            </a:schemeClr>
-          </a:lnRef>
-          <a:fillRef idx="1">
-            <a:schemeClr val="accent1"/>
-          </a:fillRef>
-          <a:effectRef idx="0">
-            <a:schemeClr val="accent1"/>
-          </a:effectRef>
-          <a:fontRef idx="minor">
-            <a:schemeClr val="lt1"/>
-          </a:fontRef>
-        </p:style>
-        <p:txBody>
-          <a:bodyPr rtlCol="0" anchor="ctr"/>
-          <a:lstStyle/>
-          <a:p>
-            <a:pPr algn="ctr"/>
-            <a:endParaRPr lang="en-US"/>
-          </a:p>
-        </p:txBody>
-      </p:sp>
-      <p:sp>
-        <p:nvSpPr>
-          <p:cNvPr id="38" name="Rectangle 37">
-            <a:extLst>
-              <a:ext uri="{FF2B5EF4-FFF2-40B4-BE49-F238E27FC236}">
-                <a16:creationId xmlns:a16="http://schemas.microsoft.com/office/drawing/2014/main" xmlns="" id="{A8074621-AE44-40C4-8323-DF5185BC954E}"/>
-              </a:ext>
-              <a:ext uri="{C183D7F6-B498-43B3-948B-1728B52AA6E4}">
-                <adec:decorative xmlns:adec="http://schemas.microsoft.com/office/drawing/2017/decorative" xmlns="" val="1"/>
-              </a:ext>
-            </a:extLst>
-          </p:cNvPr>
-          <p:cNvSpPr>
-            <a:spLocks noGrp="1" noRot="1" noChangeAspect="1" noMove="1" noResize="1" noEditPoints="1" noAdjustHandles="1" noChangeArrowheads="1" noChangeShapeType="1" noTextEdit="1"/>
-          </p:cNvSpPr>
-          <p:nvPr>
-            <p:extLst>
-              <p:ext uri="{386F3935-93C4-4BCD-93E2-E3B085C9AB24}">
-                <p16:designElem xmlns:p16="http://schemas.microsoft.com/office/powerpoint/2015/main" xmlns="" val="1"/>
-              </p:ext>
-            </p:extLst>
-          </p:nvPr>
-        </p:nvSpPr>
-        <p:spPr>
-          <a:xfrm>
-            <a:off x="0" y="0"/>
-            <a:ext cx="12192000" cy="2053062"/>
-          </a:xfrm>
-          <a:prstGeom prst="rect">
-            <a:avLst/>
-          </a:prstGeom>
-          <a:solidFill>
-            <a:schemeClr val="bg2">
-              <a:lumMod val="75000"/>
-            </a:schemeClr>
-          </a:solidFill>
-          <a:ln>
-            <a:noFill/>
-          </a:ln>
-        </p:spPr>
-        <p:style>
-          <a:lnRef idx="2">
-            <a:schemeClr val="accent1">
-              <a:shade val="50000"/>
-            </a:schemeClr>
-          </a:lnRef>
-          <a:fillRef idx="1">
-            <a:schemeClr val="accent1"/>
-          </a:fillRef>
-          <a:effectRef idx="0">
-            <a:schemeClr val="accent1"/>
-          </a:effectRef>
-          <a:fontRef idx="minor">
-            <a:schemeClr val="lt1"/>
-          </a:fontRef>
-        </p:style>
-        <p:txBody>
-          <a:bodyPr rtlCol="0" anchor="ctr"/>
-          <a:lstStyle/>
-          <a:p>
-            <a:pPr algn="ctr"/>
-            <a:endParaRPr lang="en-US"/>
-          </a:p>
-        </p:txBody>
-      </p:sp>
-      <p:sp>
-        <p:nvSpPr>
-          <p:cNvPr id="2" name="Title 1">
-            <a:extLst>
-              <a:ext uri="{FF2B5EF4-FFF2-40B4-BE49-F238E27FC236}">
-                <a16:creationId xmlns:a16="http://schemas.microsoft.com/office/drawing/2014/main" xmlns="" id="{98665829-B67C-1898-629C-AC1781FAF9BD}"/>
-              </a:ext>
-            </a:extLst>
-          </p:cNvPr>
-          <p:cNvSpPr>
-            <a:spLocks noGrp="1"/>
-          </p:cNvSpPr>
-          <p:nvPr>
-            <p:ph type="title"/>
-          </p:nvPr>
-        </p:nvSpPr>
-        <p:spPr/>
-        <p:txBody>
-          <a:bodyPr>
-            <a:normAutofit/>
-          </a:bodyPr>
-          <a:lstStyle/>
-          <a:p>
-            <a:r>
-              <a:rPr lang="en-US" sz="3600" dirty="0" smtClean="0"/>
-              <a:t>Results</a:t>
-            </a:r>
-            <a:endParaRPr lang="en-US" sz="3600" dirty="0"/>
-          </a:p>
-        </p:txBody>
-      </p:sp>
-      <p:sp>
-        <p:nvSpPr>
-          <p:cNvPr id="3" name="Text Placeholder 2"/>
-          <p:cNvSpPr>
-            <a:spLocks noGrp="1"/>
-          </p:cNvSpPr>
-          <p:nvPr>
-            <p:ph type="body" idx="1"/>
-          </p:nvPr>
-        </p:nvSpPr>
-        <p:spPr/>
-        <p:txBody>
-          <a:bodyPr/>
-          <a:lstStyle/>
-          <a:p>
-            <a:endParaRPr lang="en-CA" dirty="0"/>
-          </a:p>
-        </p:txBody>
-      </p:sp>
-    </p:spTree>
-    <p:extLst>
-      <p:ext uri="{BB962C8B-B14F-4D97-AF65-F5344CB8AC3E}">
-        <p14:creationId xmlns:p14="http://schemas.microsoft.com/office/powerpoint/2010/main" val="246905136"/>
       </p:ext>
     </p:extLst>
   </p:cSld>
@@ -14709,10 +15212,10 @@
           <p:cNvPr id="36" name="Rectangle 35">
             <a:extLst>
               <a:ext uri="{FF2B5EF4-FFF2-40B4-BE49-F238E27FC236}">
-                <a16:creationId xmlns:a16="http://schemas.microsoft.com/office/drawing/2014/main" xmlns="" id="{8BCFA5F4-1A8E-48F5-9209-7F24485B1D78}"/>
+                <a16:creationId xmlns="" xmlns:a16="http://schemas.microsoft.com/office/drawing/2014/main" id="{8BCFA5F4-1A8E-48F5-9209-7F24485B1D78}"/>
               </a:ext>
               <a:ext uri="{C183D7F6-B498-43B3-948B-1728B52AA6E4}">
-                <adec:decorative xmlns:adec="http://schemas.microsoft.com/office/drawing/2017/decorative" xmlns="" val="1"/>
+                <adec:decorative xmlns="" xmlns:adec="http://schemas.microsoft.com/office/drawing/2017/decorative" val="1"/>
               </a:ext>
             </a:extLst>
           </p:cNvPr>
@@ -14722,7 +15225,7 @@
           <p:nvPr>
             <p:extLst>
               <p:ext uri="{386F3935-93C4-4BCD-93E2-E3B085C9AB24}">
-                <p16:designElem xmlns:p16="http://schemas.microsoft.com/office/powerpoint/2015/main" xmlns="" val="1"/>
+                <p16:designElem xmlns="" xmlns:p16="http://schemas.microsoft.com/office/powerpoint/2015/main" val="1"/>
               </p:ext>
             </p:extLst>
           </p:nvPr>
@@ -14769,10 +15272,10 @@
           <p:cNvPr id="38" name="Rectangle 37">
             <a:extLst>
               <a:ext uri="{FF2B5EF4-FFF2-40B4-BE49-F238E27FC236}">
-                <a16:creationId xmlns:a16="http://schemas.microsoft.com/office/drawing/2014/main" xmlns="" id="{A8074621-AE44-40C4-8323-DF5185BC954E}"/>
+                <a16:creationId xmlns="" xmlns:a16="http://schemas.microsoft.com/office/drawing/2014/main" id="{A8074621-AE44-40C4-8323-DF5185BC954E}"/>
               </a:ext>
               <a:ext uri="{C183D7F6-B498-43B3-948B-1728B52AA6E4}">
-                <adec:decorative xmlns:adec="http://schemas.microsoft.com/office/drawing/2017/decorative" xmlns="" val="1"/>
+                <adec:decorative xmlns="" xmlns:adec="http://schemas.microsoft.com/office/drawing/2017/decorative" val="1"/>
               </a:ext>
             </a:extLst>
           </p:cNvPr>
@@ -14782,7 +15285,7 @@
           <p:nvPr>
             <p:extLst>
               <p:ext uri="{386F3935-93C4-4BCD-93E2-E3B085C9AB24}">
-                <p16:designElem xmlns:p16="http://schemas.microsoft.com/office/powerpoint/2015/main" xmlns="" val="1"/>
+                <p16:designElem xmlns="" xmlns:p16="http://schemas.microsoft.com/office/powerpoint/2015/main" val="1"/>
               </p:ext>
             </p:extLst>
           </p:nvPr>
@@ -14834,7 +15337,7 @@
           <p:cNvPr id="2" name="Title 1">
             <a:extLst>
               <a:ext uri="{FF2B5EF4-FFF2-40B4-BE49-F238E27FC236}">
-                <a16:creationId xmlns:a16="http://schemas.microsoft.com/office/drawing/2014/main" xmlns="" id="{98665829-B67C-1898-629C-AC1781FAF9BD}"/>
+                <a16:creationId xmlns="" xmlns:a16="http://schemas.microsoft.com/office/drawing/2014/main" id="{98665829-B67C-1898-629C-AC1781FAF9BD}"/>
               </a:ext>
             </a:extLst>
           </p:cNvPr>
@@ -14853,8 +15356,8 @@
           <a:lstStyle/>
           <a:p>
             <a:r>
-              <a:rPr lang="en-US" dirty="0" smtClean="0"/>
-              <a:t>Who cares?</a:t>
+              <a:rPr lang="en-US" sz="3600" dirty="0" smtClean="0"/>
+              <a:t>Results</a:t>
             </a:r>
             <a:endParaRPr lang="en-US" sz="3600" dirty="0"/>
           </a:p>
@@ -14862,12 +15365,12 @@
       </p:sp>
       <p:sp>
         <p:nvSpPr>
-          <p:cNvPr id="4" name="Content Placeholder 3"/>
+          <p:cNvPr id="3" name="Text Placeholder 2"/>
           <p:cNvSpPr>
             <a:spLocks noGrp="1"/>
           </p:cNvSpPr>
           <p:nvPr>
-            <p:ph sz="quarter" idx="13"/>
+            <p:ph type="body" idx="1"/>
           </p:nvPr>
         </p:nvSpPr>
         <p:spPr/>
@@ -14875,27 +15378,14 @@
           <a:bodyPr/>
           <a:lstStyle/>
           <a:p>
-            <a:r>
-              <a:rPr lang="en-US" cap="none" dirty="0" smtClean="0"/>
-              <a:t>Frees us from choosing among possible candidate functions</a:t>
-            </a:r>
-            <a:endParaRPr lang="en-CA" cap="none" dirty="0" smtClean="0"/>
-          </a:p>
-          <a:p>
-            <a:r>
-              <a:rPr lang="en-US" cap="none" dirty="0" smtClean="0"/>
-              <a:t>Ensemble simulations capture variety of possible responses</a:t>
-            </a:r>
-          </a:p>
-          <a:p>
-            <a:endParaRPr lang="en-US" cap="none" dirty="0" smtClean="0"/>
+            <a:endParaRPr lang="en-CA" dirty="0"/>
           </a:p>
         </p:txBody>
       </p:sp>
     </p:spTree>
     <p:extLst>
       <p:ext uri="{BB962C8B-B14F-4D97-AF65-F5344CB8AC3E}">
-        <p14:creationId xmlns:p14="http://schemas.microsoft.com/office/powerpoint/2010/main" val="3003051711"/>
+        <p14:creationId xmlns:p14="http://schemas.microsoft.com/office/powerpoint/2010/main" val="246905136"/>
       </p:ext>
     </p:extLst>
   </p:cSld>
@@ -14935,10 +15425,10 @@
           <p:cNvPr id="36" name="Rectangle 35">
             <a:extLst>
               <a:ext uri="{FF2B5EF4-FFF2-40B4-BE49-F238E27FC236}">
-                <a16:creationId xmlns:a16="http://schemas.microsoft.com/office/drawing/2014/main" xmlns="" id="{8BCFA5F4-1A8E-48F5-9209-7F24485B1D78}"/>
+                <a16:creationId xmlns="" xmlns:a16="http://schemas.microsoft.com/office/drawing/2014/main" id="{8BCFA5F4-1A8E-48F5-9209-7F24485B1D78}"/>
               </a:ext>
               <a:ext uri="{C183D7F6-B498-43B3-948B-1728B52AA6E4}">
-                <adec:decorative xmlns:adec="http://schemas.microsoft.com/office/drawing/2017/decorative" xmlns="" val="1"/>
+                <adec:decorative xmlns="" xmlns:adec="http://schemas.microsoft.com/office/drawing/2017/decorative" val="1"/>
               </a:ext>
             </a:extLst>
           </p:cNvPr>
@@ -14948,7 +15438,7 @@
           <p:nvPr>
             <p:extLst>
               <p:ext uri="{386F3935-93C4-4BCD-93E2-E3B085C9AB24}">
-                <p16:designElem xmlns:p16="http://schemas.microsoft.com/office/powerpoint/2015/main" xmlns="" val="1"/>
+                <p16:designElem xmlns="" xmlns:p16="http://schemas.microsoft.com/office/powerpoint/2015/main" val="1"/>
               </p:ext>
             </p:extLst>
           </p:nvPr>
@@ -14995,10 +15485,10 @@
           <p:cNvPr id="38" name="Rectangle 37">
             <a:extLst>
               <a:ext uri="{FF2B5EF4-FFF2-40B4-BE49-F238E27FC236}">
-                <a16:creationId xmlns:a16="http://schemas.microsoft.com/office/drawing/2014/main" xmlns="" id="{A8074621-AE44-40C4-8323-DF5185BC954E}"/>
+                <a16:creationId xmlns="" xmlns:a16="http://schemas.microsoft.com/office/drawing/2014/main" id="{A8074621-AE44-40C4-8323-DF5185BC954E}"/>
               </a:ext>
               <a:ext uri="{C183D7F6-B498-43B3-948B-1728B52AA6E4}">
-                <adec:decorative xmlns:adec="http://schemas.microsoft.com/office/drawing/2017/decorative" xmlns="" val="1"/>
+                <adec:decorative xmlns="" xmlns:adec="http://schemas.microsoft.com/office/drawing/2017/decorative" val="1"/>
               </a:ext>
             </a:extLst>
           </p:cNvPr>
@@ -15008,7 +15498,7 @@
           <p:nvPr>
             <p:extLst>
               <p:ext uri="{386F3935-93C4-4BCD-93E2-E3B085C9AB24}">
-                <p16:designElem xmlns:p16="http://schemas.microsoft.com/office/powerpoint/2015/main" xmlns="" val="1"/>
+                <p16:designElem xmlns="" xmlns:p16="http://schemas.microsoft.com/office/powerpoint/2015/main" val="1"/>
               </p:ext>
             </p:extLst>
           </p:nvPr>
@@ -15060,7 +15550,7 @@
           <p:cNvPr id="2" name="Title 1">
             <a:extLst>
               <a:ext uri="{FF2B5EF4-FFF2-40B4-BE49-F238E27FC236}">
-                <a16:creationId xmlns:a16="http://schemas.microsoft.com/office/drawing/2014/main" xmlns="" id="{98665829-B67C-1898-629C-AC1781FAF9BD}"/>
+                <a16:creationId xmlns="" xmlns:a16="http://schemas.microsoft.com/office/drawing/2014/main" id="{98665829-B67C-1898-629C-AC1781FAF9BD}"/>
               </a:ext>
             </a:extLst>
           </p:cNvPr>
@@ -15079,36 +15569,76 @@
           <a:lstStyle/>
           <a:p>
             <a:r>
-              <a:rPr lang="en-US" sz="3600" dirty="0" smtClean="0"/>
-              <a:t>Future Directions</a:t>
+              <a:rPr lang="en-US" dirty="0" smtClean="0"/>
+              <a:t>Individual simulations</a:t>
             </a:r>
             <a:endParaRPr lang="en-US" sz="3600" dirty="0"/>
           </a:p>
         </p:txBody>
       </p:sp>
-      <p:sp>
-        <p:nvSpPr>
-          <p:cNvPr id="3" name="Text Placeholder 2"/>
-          <p:cNvSpPr>
-            <a:spLocks noGrp="1"/>
-          </p:cNvSpPr>
-          <p:nvPr>
-            <p:ph type="body" idx="1"/>
-          </p:nvPr>
-        </p:nvSpPr>
-        <p:spPr/>
-        <p:txBody>
-          <a:bodyPr/>
-          <a:lstStyle/>
-          <a:p>
-            <a:endParaRPr lang="en-CA" dirty="0"/>
-          </a:p>
-        </p:txBody>
-      </p:sp>
+      <p:pic>
+        <p:nvPicPr>
+          <p:cNvPr id="5" name="Content Placeholder 4"/>
+          <p:cNvPicPr>
+            <a:picLocks noGrp="1" noChangeAspect="1"/>
+          </p:cNvPicPr>
+          <p:nvPr>
+            <p:ph sz="quarter" idx="13"/>
+          </p:nvPr>
+        </p:nvPicPr>
+        <p:blipFill>
+          <a:blip r:embed="rId2">
+            <a:extLst>
+              <a:ext uri="{28A0092B-C50C-407E-A947-70E740481C1C}">
+                <a14:useLocalDpi xmlns:a14="http://schemas.microsoft.com/office/drawing/2010/main" val="0"/>
+              </a:ext>
+            </a:extLst>
+          </a:blip>
+          <a:stretch>
+            <a:fillRect/>
+          </a:stretch>
+        </p:blipFill>
+        <p:spPr>
+          <a:xfrm>
+            <a:off x="147809" y="2053063"/>
+            <a:ext cx="4253886" cy="2835924"/>
+          </a:xfrm>
+        </p:spPr>
+      </p:pic>
+      <p:pic>
+        <p:nvPicPr>
+          <p:cNvPr id="6" name="Picture 5"/>
+          <p:cNvPicPr>
+            <a:picLocks noChangeAspect="1"/>
+          </p:cNvPicPr>
+          <p:nvPr/>
+        </p:nvPicPr>
+        <p:blipFill>
+          <a:blip r:embed="rId3">
+            <a:extLst>
+              <a:ext uri="{28A0092B-C50C-407E-A947-70E740481C1C}">
+                <a14:useLocalDpi xmlns:a14="http://schemas.microsoft.com/office/drawing/2010/main" val="0"/>
+              </a:ext>
+            </a:extLst>
+          </a:blip>
+          <a:stretch>
+            <a:fillRect/>
+          </a:stretch>
+        </p:blipFill>
+        <p:spPr>
+          <a:xfrm>
+            <a:off x="4463143" y="2053062"/>
+            <a:ext cx="4253886" cy="2835924"/>
+          </a:xfrm>
+          <a:prstGeom prst="rect">
+            <a:avLst/>
+          </a:prstGeom>
+        </p:spPr>
+      </p:pic>
     </p:spTree>
     <p:extLst>
       <p:ext uri="{BB962C8B-B14F-4D97-AF65-F5344CB8AC3E}">
-        <p14:creationId xmlns:p14="http://schemas.microsoft.com/office/powerpoint/2010/main" val="323233018"/>
+        <p14:creationId xmlns:p14="http://schemas.microsoft.com/office/powerpoint/2010/main" val="3003051711"/>
       </p:ext>
     </p:extLst>
   </p:cSld>
@@ -15148,10 +15678,10 @@
           <p:cNvPr id="36" name="Rectangle 35">
             <a:extLst>
               <a:ext uri="{FF2B5EF4-FFF2-40B4-BE49-F238E27FC236}">
-                <a16:creationId xmlns:a16="http://schemas.microsoft.com/office/drawing/2014/main" xmlns="" id="{8BCFA5F4-1A8E-48F5-9209-7F24485B1D78}"/>
+                <a16:creationId xmlns="" xmlns:a16="http://schemas.microsoft.com/office/drawing/2014/main" id="{8BCFA5F4-1A8E-48F5-9209-7F24485B1D78}"/>
               </a:ext>
               <a:ext uri="{C183D7F6-B498-43B3-948B-1728B52AA6E4}">
-                <adec:decorative xmlns:adec="http://schemas.microsoft.com/office/drawing/2017/decorative" xmlns="" val="1"/>
+                <adec:decorative xmlns="" xmlns:adec="http://schemas.microsoft.com/office/drawing/2017/decorative" val="1"/>
               </a:ext>
             </a:extLst>
           </p:cNvPr>
@@ -15161,7 +15691,7 @@
           <p:nvPr>
             <p:extLst>
               <p:ext uri="{386F3935-93C4-4BCD-93E2-E3B085C9AB24}">
-                <p16:designElem xmlns:p16="http://schemas.microsoft.com/office/powerpoint/2015/main" xmlns="" val="1"/>
+                <p16:designElem xmlns="" xmlns:p16="http://schemas.microsoft.com/office/powerpoint/2015/main" val="1"/>
               </p:ext>
             </p:extLst>
           </p:nvPr>
@@ -15208,10 +15738,10 @@
           <p:cNvPr id="38" name="Rectangle 37">
             <a:extLst>
               <a:ext uri="{FF2B5EF4-FFF2-40B4-BE49-F238E27FC236}">
-                <a16:creationId xmlns:a16="http://schemas.microsoft.com/office/drawing/2014/main" xmlns="" id="{A8074621-AE44-40C4-8323-DF5185BC954E}"/>
+                <a16:creationId xmlns="" xmlns:a16="http://schemas.microsoft.com/office/drawing/2014/main" id="{A8074621-AE44-40C4-8323-DF5185BC954E}"/>
               </a:ext>
               <a:ext uri="{C183D7F6-B498-43B3-948B-1728B52AA6E4}">
-                <adec:decorative xmlns:adec="http://schemas.microsoft.com/office/drawing/2017/decorative" xmlns="" val="1"/>
+                <adec:decorative xmlns="" xmlns:adec="http://schemas.microsoft.com/office/drawing/2017/decorative" val="1"/>
               </a:ext>
             </a:extLst>
           </p:cNvPr>
@@ -15221,7 +15751,7 @@
           <p:nvPr>
             <p:extLst>
               <p:ext uri="{386F3935-93C4-4BCD-93E2-E3B085C9AB24}">
-                <p16:designElem xmlns:p16="http://schemas.microsoft.com/office/powerpoint/2015/main" xmlns="" val="1"/>
+                <p16:designElem xmlns="" xmlns:p16="http://schemas.microsoft.com/office/powerpoint/2015/main" val="1"/>
               </p:ext>
             </p:extLst>
           </p:nvPr>
@@ -15273,7 +15803,699 @@
           <p:cNvPr id="2" name="Title 1">
             <a:extLst>
               <a:ext uri="{FF2B5EF4-FFF2-40B4-BE49-F238E27FC236}">
-                <a16:creationId xmlns:a16="http://schemas.microsoft.com/office/drawing/2014/main" xmlns="" id="{98665829-B67C-1898-629C-AC1781FAF9BD}"/>
+                <a16:creationId xmlns="" xmlns:a16="http://schemas.microsoft.com/office/drawing/2014/main" id="{98665829-B67C-1898-629C-AC1781FAF9BD}"/>
+              </a:ext>
+            </a:extLst>
+          </p:cNvPr>
+          <p:cNvSpPr>
+            <a:spLocks noGrp="1"/>
+          </p:cNvSpPr>
+          <p:nvPr>
+            <p:ph type="title"/>
+          </p:nvPr>
+        </p:nvSpPr>
+        <p:spPr/>
+        <p:txBody>
+          <a:bodyPr>
+            <a:normAutofit/>
+          </a:bodyPr>
+          <a:lstStyle/>
+          <a:p>
+            <a:r>
+              <a:rPr lang="en-US" dirty="0" smtClean="0"/>
+              <a:t>Ensembles</a:t>
+            </a:r>
+            <a:endParaRPr lang="en-US" sz="3600" dirty="0"/>
+          </a:p>
+        </p:txBody>
+      </p:sp>
+      <p:pic>
+        <p:nvPicPr>
+          <p:cNvPr id="4" name="Content Placeholder 3"/>
+          <p:cNvPicPr>
+            <a:picLocks noGrp="1" noChangeAspect="1"/>
+          </p:cNvPicPr>
+          <p:nvPr>
+            <p:ph sz="quarter" idx="13"/>
+          </p:nvPr>
+        </p:nvPicPr>
+        <p:blipFill>
+          <a:blip r:embed="rId2">
+            <a:extLst>
+              <a:ext uri="{28A0092B-C50C-407E-A947-70E740481C1C}">
+                <a14:useLocalDpi xmlns:a14="http://schemas.microsoft.com/office/drawing/2010/main" val="0"/>
+              </a:ext>
+            </a:extLst>
+          </a:blip>
+          <a:stretch>
+            <a:fillRect/>
+          </a:stretch>
+        </p:blipFill>
+        <p:spPr>
+          <a:xfrm>
+            <a:off x="86067" y="2053062"/>
+            <a:ext cx="4804341" cy="3202894"/>
+          </a:xfrm>
+        </p:spPr>
+      </p:pic>
+      <p:pic>
+        <p:nvPicPr>
+          <p:cNvPr id="7" name="Picture 6"/>
+          <p:cNvPicPr>
+            <a:picLocks noChangeAspect="1"/>
+          </p:cNvPicPr>
+          <p:nvPr/>
+        </p:nvPicPr>
+        <p:blipFill>
+          <a:blip r:embed="rId3">
+            <a:extLst>
+              <a:ext uri="{28A0092B-C50C-407E-A947-70E740481C1C}">
+                <a14:useLocalDpi xmlns:a14="http://schemas.microsoft.com/office/drawing/2010/main" val="0"/>
+              </a:ext>
+            </a:extLst>
+          </a:blip>
+          <a:stretch>
+            <a:fillRect/>
+          </a:stretch>
+        </p:blipFill>
+        <p:spPr>
+          <a:xfrm>
+            <a:off x="4953000" y="2053062"/>
+            <a:ext cx="4827814" cy="3218543"/>
+          </a:xfrm>
+          <a:prstGeom prst="rect">
+            <a:avLst/>
+          </a:prstGeom>
+        </p:spPr>
+      </p:pic>
+    </p:spTree>
+    <p:extLst>
+      <p:ext uri="{BB962C8B-B14F-4D97-AF65-F5344CB8AC3E}">
+        <p14:creationId xmlns:p14="http://schemas.microsoft.com/office/powerpoint/2010/main" val="3118433515"/>
+      </p:ext>
+    </p:extLst>
+  </p:cSld>
+  <p:clrMapOvr>
+    <a:overrideClrMapping bg1="dk1" tx1="lt1" bg2="dk2" tx2="lt2" accent1="accent1" accent2="accent2" accent3="accent3" accent4="accent4" accent5="accent5" accent6="accent6" hlink="hlink" folHlink="folHlink"/>
+  </p:clrMapOvr>
+</p:sld>
+</file>
+
+<file path=ppt/slides/slide17.xml><?xml version="1.0" encoding="utf-8"?>
+<p:sld xmlns:a="http://schemas.openxmlformats.org/drawingml/2006/main" xmlns:r="http://schemas.openxmlformats.org/officeDocument/2006/relationships" xmlns:p="http://schemas.openxmlformats.org/presentationml/2006/main">
+  <p:cSld>
+    <p:bg>
+      <p:bgPr>
+        <a:solidFill>
+          <a:schemeClr val="bg2"/>
+        </a:solidFill>
+        <a:effectLst/>
+      </p:bgPr>
+    </p:bg>
+    <p:spTree>
+      <p:nvGrpSpPr>
+        <p:cNvPr id="1" name=""/>
+        <p:cNvGrpSpPr/>
+        <p:nvPr/>
+      </p:nvGrpSpPr>
+      <p:grpSpPr>
+        <a:xfrm>
+          <a:off x="0" y="0"/>
+          <a:ext cx="0" cy="0"/>
+          <a:chOff x="0" y="0"/>
+          <a:chExt cx="0" cy="0"/>
+        </a:xfrm>
+      </p:grpSpPr>
+      <p:sp useBgFill="1">
+        <p:nvSpPr>
+          <p:cNvPr id="36" name="Rectangle 35">
+            <a:extLst>
+              <a:ext uri="{FF2B5EF4-FFF2-40B4-BE49-F238E27FC236}">
+                <a16:creationId xmlns="" xmlns:a16="http://schemas.microsoft.com/office/drawing/2014/main" id="{8BCFA5F4-1A8E-48F5-9209-7F24485B1D78}"/>
+              </a:ext>
+              <a:ext uri="{C183D7F6-B498-43B3-948B-1728B52AA6E4}">
+                <adec:decorative xmlns="" xmlns:adec="http://schemas.microsoft.com/office/drawing/2017/decorative" val="1"/>
+              </a:ext>
+            </a:extLst>
+          </p:cNvPr>
+          <p:cNvSpPr>
+            <a:spLocks noGrp="1" noRot="1" noChangeAspect="1" noMove="1" noResize="1" noEditPoints="1" noAdjustHandles="1" noChangeArrowheads="1" noChangeShapeType="1" noTextEdit="1"/>
+          </p:cNvSpPr>
+          <p:nvPr>
+            <p:extLst>
+              <p:ext uri="{386F3935-93C4-4BCD-93E2-E3B085C9AB24}">
+                <p16:designElem xmlns="" xmlns:p16="http://schemas.microsoft.com/office/powerpoint/2015/main" val="1"/>
+              </p:ext>
+            </p:extLst>
+          </p:nvPr>
+        </p:nvSpPr>
+        <p:spPr>
+          <a:xfrm>
+            <a:off x="0" y="0"/>
+            <a:ext cx="12192000" cy="6858000"/>
+          </a:xfrm>
+          <a:prstGeom prst="rect">
+            <a:avLst/>
+          </a:prstGeom>
+          <a:ln>
+            <a:noFill/>
+          </a:ln>
+        </p:spPr>
+        <p:style>
+          <a:lnRef idx="2">
+            <a:schemeClr val="accent1">
+              <a:shade val="50000"/>
+            </a:schemeClr>
+          </a:lnRef>
+          <a:fillRef idx="1">
+            <a:schemeClr val="accent1"/>
+          </a:fillRef>
+          <a:effectRef idx="0">
+            <a:schemeClr val="accent1"/>
+          </a:effectRef>
+          <a:fontRef idx="minor">
+            <a:schemeClr val="lt1"/>
+          </a:fontRef>
+        </p:style>
+        <p:txBody>
+          <a:bodyPr rtlCol="0" anchor="ctr"/>
+          <a:lstStyle/>
+          <a:p>
+            <a:pPr algn="ctr"/>
+            <a:endParaRPr lang="en-US"/>
+          </a:p>
+        </p:txBody>
+      </p:sp>
+      <p:sp>
+        <p:nvSpPr>
+          <p:cNvPr id="38" name="Rectangle 37">
+            <a:extLst>
+              <a:ext uri="{FF2B5EF4-FFF2-40B4-BE49-F238E27FC236}">
+                <a16:creationId xmlns="" xmlns:a16="http://schemas.microsoft.com/office/drawing/2014/main" id="{A8074621-AE44-40C4-8323-DF5185BC954E}"/>
+              </a:ext>
+              <a:ext uri="{C183D7F6-B498-43B3-948B-1728B52AA6E4}">
+                <adec:decorative xmlns="" xmlns:adec="http://schemas.microsoft.com/office/drawing/2017/decorative" val="1"/>
+              </a:ext>
+            </a:extLst>
+          </p:cNvPr>
+          <p:cNvSpPr>
+            <a:spLocks noGrp="1" noRot="1" noChangeAspect="1" noMove="1" noResize="1" noEditPoints="1" noAdjustHandles="1" noChangeArrowheads="1" noChangeShapeType="1" noTextEdit="1"/>
+          </p:cNvSpPr>
+          <p:nvPr>
+            <p:extLst>
+              <p:ext uri="{386F3935-93C4-4BCD-93E2-E3B085C9AB24}">
+                <p16:designElem xmlns="" xmlns:p16="http://schemas.microsoft.com/office/powerpoint/2015/main" val="1"/>
+              </p:ext>
+            </p:extLst>
+          </p:nvPr>
+        </p:nvSpPr>
+        <p:spPr>
+          <a:xfrm>
+            <a:off x="0" y="0"/>
+            <a:ext cx="12192000" cy="2053062"/>
+          </a:xfrm>
+          <a:prstGeom prst="rect">
+            <a:avLst/>
+          </a:prstGeom>
+          <a:solidFill>
+            <a:schemeClr val="bg2">
+              <a:lumMod val="75000"/>
+            </a:schemeClr>
+          </a:solidFill>
+          <a:ln>
+            <a:noFill/>
+          </a:ln>
+        </p:spPr>
+        <p:style>
+          <a:lnRef idx="2">
+            <a:schemeClr val="accent1">
+              <a:shade val="50000"/>
+            </a:schemeClr>
+          </a:lnRef>
+          <a:fillRef idx="1">
+            <a:schemeClr val="accent1"/>
+          </a:fillRef>
+          <a:effectRef idx="0">
+            <a:schemeClr val="accent1"/>
+          </a:effectRef>
+          <a:fontRef idx="minor">
+            <a:schemeClr val="lt1"/>
+          </a:fontRef>
+        </p:style>
+        <p:txBody>
+          <a:bodyPr rtlCol="0" anchor="ctr"/>
+          <a:lstStyle/>
+          <a:p>
+            <a:pPr algn="ctr"/>
+            <a:endParaRPr lang="en-US"/>
+          </a:p>
+        </p:txBody>
+      </p:sp>
+      <p:sp>
+        <p:nvSpPr>
+          <p:cNvPr id="2" name="Title 1">
+            <a:extLst>
+              <a:ext uri="{FF2B5EF4-FFF2-40B4-BE49-F238E27FC236}">
+                <a16:creationId xmlns="" xmlns:a16="http://schemas.microsoft.com/office/drawing/2014/main" id="{98665829-B67C-1898-629C-AC1781FAF9BD}"/>
+              </a:ext>
+            </a:extLst>
+          </p:cNvPr>
+          <p:cNvSpPr>
+            <a:spLocks noGrp="1"/>
+          </p:cNvSpPr>
+          <p:nvPr>
+            <p:ph type="title"/>
+          </p:nvPr>
+        </p:nvSpPr>
+        <p:spPr/>
+        <p:txBody>
+          <a:bodyPr>
+            <a:normAutofit/>
+          </a:bodyPr>
+          <a:lstStyle/>
+          <a:p>
+            <a:r>
+              <a:rPr lang="en-US" dirty="0" smtClean="0"/>
+              <a:t>Who cares?</a:t>
+            </a:r>
+            <a:endParaRPr lang="en-US" sz="3600" dirty="0"/>
+          </a:p>
+        </p:txBody>
+      </p:sp>
+      <p:sp>
+        <p:nvSpPr>
+          <p:cNvPr id="4" name="Content Placeholder 3"/>
+          <p:cNvSpPr>
+            <a:spLocks noGrp="1"/>
+          </p:cNvSpPr>
+          <p:nvPr>
+            <p:ph sz="quarter" idx="13"/>
+          </p:nvPr>
+        </p:nvSpPr>
+        <p:spPr/>
+        <p:txBody>
+          <a:bodyPr/>
+          <a:lstStyle/>
+          <a:p>
+            <a:r>
+              <a:rPr lang="en-US" cap="none" dirty="0" smtClean="0"/>
+              <a:t>Frees us from choosing among possible candidate functions</a:t>
+            </a:r>
+            <a:endParaRPr lang="en-CA" cap="none" dirty="0" smtClean="0"/>
+          </a:p>
+          <a:p>
+            <a:r>
+              <a:rPr lang="en-US" cap="none" dirty="0" smtClean="0"/>
+              <a:t>Ensemble simulations capture variety of possible responses</a:t>
+            </a:r>
+          </a:p>
+          <a:p>
+            <a:endParaRPr lang="en-US" cap="none" dirty="0" smtClean="0"/>
+          </a:p>
+        </p:txBody>
+      </p:sp>
+    </p:spTree>
+    <p:extLst>
+      <p:ext uri="{BB962C8B-B14F-4D97-AF65-F5344CB8AC3E}">
+        <p14:creationId xmlns:p14="http://schemas.microsoft.com/office/powerpoint/2010/main" val="1581641451"/>
+      </p:ext>
+    </p:extLst>
+  </p:cSld>
+  <p:clrMapOvr>
+    <a:overrideClrMapping bg1="dk1" tx1="lt1" bg2="dk2" tx2="lt2" accent1="accent1" accent2="accent2" accent3="accent3" accent4="accent4" accent5="accent5" accent6="accent6" hlink="hlink" folHlink="folHlink"/>
+  </p:clrMapOvr>
+</p:sld>
+</file>
+
+<file path=ppt/slides/slide18.xml><?xml version="1.0" encoding="utf-8"?>
+<p:sld xmlns:a="http://schemas.openxmlformats.org/drawingml/2006/main" xmlns:r="http://schemas.openxmlformats.org/officeDocument/2006/relationships" xmlns:p="http://schemas.openxmlformats.org/presentationml/2006/main">
+  <p:cSld>
+    <p:bg>
+      <p:bgPr>
+        <a:solidFill>
+          <a:schemeClr val="bg2"/>
+        </a:solidFill>
+        <a:effectLst/>
+      </p:bgPr>
+    </p:bg>
+    <p:spTree>
+      <p:nvGrpSpPr>
+        <p:cNvPr id="1" name=""/>
+        <p:cNvGrpSpPr/>
+        <p:nvPr/>
+      </p:nvGrpSpPr>
+      <p:grpSpPr>
+        <a:xfrm>
+          <a:off x="0" y="0"/>
+          <a:ext cx="0" cy="0"/>
+          <a:chOff x="0" y="0"/>
+          <a:chExt cx="0" cy="0"/>
+        </a:xfrm>
+      </p:grpSpPr>
+      <p:sp useBgFill="1">
+        <p:nvSpPr>
+          <p:cNvPr id="36" name="Rectangle 35">
+            <a:extLst>
+              <a:ext uri="{FF2B5EF4-FFF2-40B4-BE49-F238E27FC236}">
+                <a16:creationId xmlns="" xmlns:a16="http://schemas.microsoft.com/office/drawing/2014/main" id="{8BCFA5F4-1A8E-48F5-9209-7F24485B1D78}"/>
+              </a:ext>
+              <a:ext uri="{C183D7F6-B498-43B3-948B-1728B52AA6E4}">
+                <adec:decorative xmlns="" xmlns:adec="http://schemas.microsoft.com/office/drawing/2017/decorative" val="1"/>
+              </a:ext>
+            </a:extLst>
+          </p:cNvPr>
+          <p:cNvSpPr>
+            <a:spLocks noGrp="1" noRot="1" noChangeAspect="1" noMove="1" noResize="1" noEditPoints="1" noAdjustHandles="1" noChangeArrowheads="1" noChangeShapeType="1" noTextEdit="1"/>
+          </p:cNvSpPr>
+          <p:nvPr>
+            <p:extLst>
+              <p:ext uri="{386F3935-93C4-4BCD-93E2-E3B085C9AB24}">
+                <p16:designElem xmlns="" xmlns:p16="http://schemas.microsoft.com/office/powerpoint/2015/main" val="1"/>
+              </p:ext>
+            </p:extLst>
+          </p:nvPr>
+        </p:nvSpPr>
+        <p:spPr>
+          <a:xfrm>
+            <a:off x="0" y="0"/>
+            <a:ext cx="12192000" cy="6858000"/>
+          </a:xfrm>
+          <a:prstGeom prst="rect">
+            <a:avLst/>
+          </a:prstGeom>
+          <a:ln>
+            <a:noFill/>
+          </a:ln>
+        </p:spPr>
+        <p:style>
+          <a:lnRef idx="2">
+            <a:schemeClr val="accent1">
+              <a:shade val="50000"/>
+            </a:schemeClr>
+          </a:lnRef>
+          <a:fillRef idx="1">
+            <a:schemeClr val="accent1"/>
+          </a:fillRef>
+          <a:effectRef idx="0">
+            <a:schemeClr val="accent1"/>
+          </a:effectRef>
+          <a:fontRef idx="minor">
+            <a:schemeClr val="lt1"/>
+          </a:fontRef>
+        </p:style>
+        <p:txBody>
+          <a:bodyPr rtlCol="0" anchor="ctr"/>
+          <a:lstStyle/>
+          <a:p>
+            <a:pPr algn="ctr"/>
+            <a:endParaRPr lang="en-US"/>
+          </a:p>
+        </p:txBody>
+      </p:sp>
+      <p:sp>
+        <p:nvSpPr>
+          <p:cNvPr id="38" name="Rectangle 37">
+            <a:extLst>
+              <a:ext uri="{FF2B5EF4-FFF2-40B4-BE49-F238E27FC236}">
+                <a16:creationId xmlns="" xmlns:a16="http://schemas.microsoft.com/office/drawing/2014/main" id="{A8074621-AE44-40C4-8323-DF5185BC954E}"/>
+              </a:ext>
+              <a:ext uri="{C183D7F6-B498-43B3-948B-1728B52AA6E4}">
+                <adec:decorative xmlns="" xmlns:adec="http://schemas.microsoft.com/office/drawing/2017/decorative" val="1"/>
+              </a:ext>
+            </a:extLst>
+          </p:cNvPr>
+          <p:cNvSpPr>
+            <a:spLocks noGrp="1" noRot="1" noChangeAspect="1" noMove="1" noResize="1" noEditPoints="1" noAdjustHandles="1" noChangeArrowheads="1" noChangeShapeType="1" noTextEdit="1"/>
+          </p:cNvSpPr>
+          <p:nvPr>
+            <p:extLst>
+              <p:ext uri="{386F3935-93C4-4BCD-93E2-E3B085C9AB24}">
+                <p16:designElem xmlns="" xmlns:p16="http://schemas.microsoft.com/office/powerpoint/2015/main" val="1"/>
+              </p:ext>
+            </p:extLst>
+          </p:nvPr>
+        </p:nvSpPr>
+        <p:spPr>
+          <a:xfrm>
+            <a:off x="0" y="0"/>
+            <a:ext cx="12192000" cy="2053062"/>
+          </a:xfrm>
+          <a:prstGeom prst="rect">
+            <a:avLst/>
+          </a:prstGeom>
+          <a:solidFill>
+            <a:schemeClr val="bg2">
+              <a:lumMod val="75000"/>
+            </a:schemeClr>
+          </a:solidFill>
+          <a:ln>
+            <a:noFill/>
+          </a:ln>
+        </p:spPr>
+        <p:style>
+          <a:lnRef idx="2">
+            <a:schemeClr val="accent1">
+              <a:shade val="50000"/>
+            </a:schemeClr>
+          </a:lnRef>
+          <a:fillRef idx="1">
+            <a:schemeClr val="accent1"/>
+          </a:fillRef>
+          <a:effectRef idx="0">
+            <a:schemeClr val="accent1"/>
+          </a:effectRef>
+          <a:fontRef idx="minor">
+            <a:schemeClr val="lt1"/>
+          </a:fontRef>
+        </p:style>
+        <p:txBody>
+          <a:bodyPr rtlCol="0" anchor="ctr"/>
+          <a:lstStyle/>
+          <a:p>
+            <a:pPr algn="ctr"/>
+            <a:endParaRPr lang="en-US"/>
+          </a:p>
+        </p:txBody>
+      </p:sp>
+      <p:sp>
+        <p:nvSpPr>
+          <p:cNvPr id="2" name="Title 1">
+            <a:extLst>
+              <a:ext uri="{FF2B5EF4-FFF2-40B4-BE49-F238E27FC236}">
+                <a16:creationId xmlns="" xmlns:a16="http://schemas.microsoft.com/office/drawing/2014/main" id="{98665829-B67C-1898-629C-AC1781FAF9BD}"/>
+              </a:ext>
+            </a:extLst>
+          </p:cNvPr>
+          <p:cNvSpPr>
+            <a:spLocks noGrp="1"/>
+          </p:cNvSpPr>
+          <p:nvPr>
+            <p:ph type="title"/>
+          </p:nvPr>
+        </p:nvSpPr>
+        <p:spPr/>
+        <p:txBody>
+          <a:bodyPr>
+            <a:normAutofit/>
+          </a:bodyPr>
+          <a:lstStyle/>
+          <a:p>
+            <a:r>
+              <a:rPr lang="en-US" sz="3600" dirty="0" smtClean="0"/>
+              <a:t>Future Directions</a:t>
+            </a:r>
+            <a:endParaRPr lang="en-US" sz="3600" dirty="0"/>
+          </a:p>
+        </p:txBody>
+      </p:sp>
+      <p:sp>
+        <p:nvSpPr>
+          <p:cNvPr id="3" name="Text Placeholder 2"/>
+          <p:cNvSpPr>
+            <a:spLocks noGrp="1"/>
+          </p:cNvSpPr>
+          <p:nvPr>
+            <p:ph type="body" idx="1"/>
+          </p:nvPr>
+        </p:nvSpPr>
+        <p:spPr/>
+        <p:txBody>
+          <a:bodyPr/>
+          <a:lstStyle/>
+          <a:p>
+            <a:endParaRPr lang="en-CA" dirty="0"/>
+          </a:p>
+        </p:txBody>
+      </p:sp>
+    </p:spTree>
+    <p:extLst>
+      <p:ext uri="{BB962C8B-B14F-4D97-AF65-F5344CB8AC3E}">
+        <p14:creationId xmlns:p14="http://schemas.microsoft.com/office/powerpoint/2010/main" val="323233018"/>
+      </p:ext>
+    </p:extLst>
+  </p:cSld>
+  <p:clrMapOvr>
+    <a:overrideClrMapping bg1="dk1" tx1="lt1" bg2="dk2" tx2="lt2" accent1="accent1" accent2="accent2" accent3="accent3" accent4="accent4" accent5="accent5" accent6="accent6" hlink="hlink" folHlink="folHlink"/>
+  </p:clrMapOvr>
+</p:sld>
+</file>
+
+<file path=ppt/slides/slide19.xml><?xml version="1.0" encoding="utf-8"?>
+<p:sld xmlns:a="http://schemas.openxmlformats.org/drawingml/2006/main" xmlns:r="http://schemas.openxmlformats.org/officeDocument/2006/relationships" xmlns:p="http://schemas.openxmlformats.org/presentationml/2006/main">
+  <p:cSld>
+    <p:bg>
+      <p:bgPr>
+        <a:solidFill>
+          <a:schemeClr val="bg2"/>
+        </a:solidFill>
+        <a:effectLst/>
+      </p:bgPr>
+    </p:bg>
+    <p:spTree>
+      <p:nvGrpSpPr>
+        <p:cNvPr id="1" name=""/>
+        <p:cNvGrpSpPr/>
+        <p:nvPr/>
+      </p:nvGrpSpPr>
+      <p:grpSpPr>
+        <a:xfrm>
+          <a:off x="0" y="0"/>
+          <a:ext cx="0" cy="0"/>
+          <a:chOff x="0" y="0"/>
+          <a:chExt cx="0" cy="0"/>
+        </a:xfrm>
+      </p:grpSpPr>
+      <p:sp useBgFill="1">
+        <p:nvSpPr>
+          <p:cNvPr id="36" name="Rectangle 35">
+            <a:extLst>
+              <a:ext uri="{FF2B5EF4-FFF2-40B4-BE49-F238E27FC236}">
+                <a16:creationId xmlns="" xmlns:a16="http://schemas.microsoft.com/office/drawing/2014/main" id="{8BCFA5F4-1A8E-48F5-9209-7F24485B1D78}"/>
+              </a:ext>
+              <a:ext uri="{C183D7F6-B498-43B3-948B-1728B52AA6E4}">
+                <adec:decorative xmlns="" xmlns:adec="http://schemas.microsoft.com/office/drawing/2017/decorative" val="1"/>
+              </a:ext>
+            </a:extLst>
+          </p:cNvPr>
+          <p:cNvSpPr>
+            <a:spLocks noGrp="1" noRot="1" noChangeAspect="1" noMove="1" noResize="1" noEditPoints="1" noAdjustHandles="1" noChangeArrowheads="1" noChangeShapeType="1" noTextEdit="1"/>
+          </p:cNvSpPr>
+          <p:nvPr>
+            <p:extLst>
+              <p:ext uri="{386F3935-93C4-4BCD-93E2-E3B085C9AB24}">
+                <p16:designElem xmlns="" xmlns:p16="http://schemas.microsoft.com/office/powerpoint/2015/main" val="1"/>
+              </p:ext>
+            </p:extLst>
+          </p:nvPr>
+        </p:nvSpPr>
+        <p:spPr>
+          <a:xfrm>
+            <a:off x="0" y="0"/>
+            <a:ext cx="12192000" cy="6858000"/>
+          </a:xfrm>
+          <a:prstGeom prst="rect">
+            <a:avLst/>
+          </a:prstGeom>
+          <a:ln>
+            <a:noFill/>
+          </a:ln>
+        </p:spPr>
+        <p:style>
+          <a:lnRef idx="2">
+            <a:schemeClr val="accent1">
+              <a:shade val="50000"/>
+            </a:schemeClr>
+          </a:lnRef>
+          <a:fillRef idx="1">
+            <a:schemeClr val="accent1"/>
+          </a:fillRef>
+          <a:effectRef idx="0">
+            <a:schemeClr val="accent1"/>
+          </a:effectRef>
+          <a:fontRef idx="minor">
+            <a:schemeClr val="lt1"/>
+          </a:fontRef>
+        </p:style>
+        <p:txBody>
+          <a:bodyPr rtlCol="0" anchor="ctr"/>
+          <a:lstStyle/>
+          <a:p>
+            <a:pPr algn="ctr"/>
+            <a:endParaRPr lang="en-US"/>
+          </a:p>
+        </p:txBody>
+      </p:sp>
+      <p:sp>
+        <p:nvSpPr>
+          <p:cNvPr id="38" name="Rectangle 37">
+            <a:extLst>
+              <a:ext uri="{FF2B5EF4-FFF2-40B4-BE49-F238E27FC236}">
+                <a16:creationId xmlns="" xmlns:a16="http://schemas.microsoft.com/office/drawing/2014/main" id="{A8074621-AE44-40C4-8323-DF5185BC954E}"/>
+              </a:ext>
+              <a:ext uri="{C183D7F6-B498-43B3-948B-1728B52AA6E4}">
+                <adec:decorative xmlns="" xmlns:adec="http://schemas.microsoft.com/office/drawing/2017/decorative" val="1"/>
+              </a:ext>
+            </a:extLst>
+          </p:cNvPr>
+          <p:cNvSpPr>
+            <a:spLocks noGrp="1" noRot="1" noChangeAspect="1" noMove="1" noResize="1" noEditPoints="1" noAdjustHandles="1" noChangeArrowheads="1" noChangeShapeType="1" noTextEdit="1"/>
+          </p:cNvSpPr>
+          <p:nvPr>
+            <p:extLst>
+              <p:ext uri="{386F3935-93C4-4BCD-93E2-E3B085C9AB24}">
+                <p16:designElem xmlns="" xmlns:p16="http://schemas.microsoft.com/office/powerpoint/2015/main" val="1"/>
+              </p:ext>
+            </p:extLst>
+          </p:nvPr>
+        </p:nvSpPr>
+        <p:spPr>
+          <a:xfrm>
+            <a:off x="0" y="0"/>
+            <a:ext cx="12192000" cy="2053062"/>
+          </a:xfrm>
+          <a:prstGeom prst="rect">
+            <a:avLst/>
+          </a:prstGeom>
+          <a:solidFill>
+            <a:schemeClr val="bg2">
+              <a:lumMod val="75000"/>
+            </a:schemeClr>
+          </a:solidFill>
+          <a:ln>
+            <a:noFill/>
+          </a:ln>
+        </p:spPr>
+        <p:style>
+          <a:lnRef idx="2">
+            <a:schemeClr val="accent1">
+              <a:shade val="50000"/>
+            </a:schemeClr>
+          </a:lnRef>
+          <a:fillRef idx="1">
+            <a:schemeClr val="accent1"/>
+          </a:fillRef>
+          <a:effectRef idx="0">
+            <a:schemeClr val="accent1"/>
+          </a:effectRef>
+          <a:fontRef idx="minor">
+            <a:schemeClr val="lt1"/>
+          </a:fontRef>
+        </p:style>
+        <p:txBody>
+          <a:bodyPr rtlCol="0" anchor="ctr"/>
+          <a:lstStyle/>
+          <a:p>
+            <a:pPr algn="ctr"/>
+            <a:endParaRPr lang="en-US"/>
+          </a:p>
+        </p:txBody>
+      </p:sp>
+      <p:sp>
+        <p:nvSpPr>
+          <p:cNvPr id="2" name="Title 1">
+            <a:extLst>
+              <a:ext uri="{FF2B5EF4-FFF2-40B4-BE49-F238E27FC236}">
+                <a16:creationId xmlns="" xmlns:a16="http://schemas.microsoft.com/office/drawing/2014/main" id="{98665829-B67C-1898-629C-AC1781FAF9BD}"/>
               </a:ext>
             </a:extLst>
           </p:cNvPr>
@@ -15361,10 +16583,10 @@
           <p:cNvPr id="36" name="Rectangle 35">
             <a:extLst>
               <a:ext uri="{FF2B5EF4-FFF2-40B4-BE49-F238E27FC236}">
-                <a16:creationId xmlns:a16="http://schemas.microsoft.com/office/drawing/2014/main" xmlns="" id="{8BCFA5F4-1A8E-48F5-9209-7F24485B1D78}"/>
+                <a16:creationId xmlns="" xmlns:a16="http://schemas.microsoft.com/office/drawing/2014/main" id="{8BCFA5F4-1A8E-48F5-9209-7F24485B1D78}"/>
               </a:ext>
               <a:ext uri="{C183D7F6-B498-43B3-948B-1728B52AA6E4}">
-                <adec:decorative xmlns:adec="http://schemas.microsoft.com/office/drawing/2017/decorative" xmlns="" val="1"/>
+                <adec:decorative xmlns="" xmlns:adec="http://schemas.microsoft.com/office/drawing/2017/decorative" val="1"/>
               </a:ext>
             </a:extLst>
           </p:cNvPr>
@@ -15374,7 +16596,7 @@
           <p:nvPr>
             <p:extLst>
               <p:ext uri="{386F3935-93C4-4BCD-93E2-E3B085C9AB24}">
-                <p16:designElem xmlns:p16="http://schemas.microsoft.com/office/powerpoint/2015/main" xmlns="" val="1"/>
+                <p16:designElem xmlns="" xmlns:p16="http://schemas.microsoft.com/office/powerpoint/2015/main" val="1"/>
               </p:ext>
             </p:extLst>
           </p:nvPr>
@@ -15421,10 +16643,10 @@
           <p:cNvPr id="38" name="Rectangle 37">
             <a:extLst>
               <a:ext uri="{FF2B5EF4-FFF2-40B4-BE49-F238E27FC236}">
-                <a16:creationId xmlns:a16="http://schemas.microsoft.com/office/drawing/2014/main" xmlns="" id="{A8074621-AE44-40C4-8323-DF5185BC954E}"/>
+                <a16:creationId xmlns="" xmlns:a16="http://schemas.microsoft.com/office/drawing/2014/main" id="{A8074621-AE44-40C4-8323-DF5185BC954E}"/>
               </a:ext>
               <a:ext uri="{C183D7F6-B498-43B3-948B-1728B52AA6E4}">
-                <adec:decorative xmlns:adec="http://schemas.microsoft.com/office/drawing/2017/decorative" xmlns="" val="1"/>
+                <adec:decorative xmlns="" xmlns:adec="http://schemas.microsoft.com/office/drawing/2017/decorative" val="1"/>
               </a:ext>
             </a:extLst>
           </p:cNvPr>
@@ -15434,7 +16656,7 @@
           <p:nvPr>
             <p:extLst>
               <p:ext uri="{386F3935-93C4-4BCD-93E2-E3B085C9AB24}">
-                <p16:designElem xmlns:p16="http://schemas.microsoft.com/office/powerpoint/2015/main" xmlns="" val="1"/>
+                <p16:designElem xmlns="" xmlns:p16="http://schemas.microsoft.com/office/powerpoint/2015/main" val="1"/>
               </p:ext>
             </p:extLst>
           </p:nvPr>
@@ -15486,7 +16708,7 @@
           <p:cNvPr id="2" name="Title 1">
             <a:extLst>
               <a:ext uri="{FF2B5EF4-FFF2-40B4-BE49-F238E27FC236}">
-                <a16:creationId xmlns:a16="http://schemas.microsoft.com/office/drawing/2014/main" xmlns="" id="{98665829-B67C-1898-629C-AC1781FAF9BD}"/>
+                <a16:creationId xmlns="" xmlns:a16="http://schemas.microsoft.com/office/drawing/2014/main" id="{98665829-B67C-1898-629C-AC1781FAF9BD}"/>
               </a:ext>
             </a:extLst>
           </p:cNvPr>
@@ -15580,10 +16802,10 @@
           <p:cNvPr id="36" name="Rectangle 35">
             <a:extLst>
               <a:ext uri="{FF2B5EF4-FFF2-40B4-BE49-F238E27FC236}">
-                <a16:creationId xmlns:a16="http://schemas.microsoft.com/office/drawing/2014/main" xmlns="" id="{8BCFA5F4-1A8E-48F5-9209-7F24485B1D78}"/>
+                <a16:creationId xmlns="" xmlns:a16="http://schemas.microsoft.com/office/drawing/2014/main" id="{8BCFA5F4-1A8E-48F5-9209-7F24485B1D78}"/>
               </a:ext>
               <a:ext uri="{C183D7F6-B498-43B3-948B-1728B52AA6E4}">
-                <adec:decorative xmlns:adec="http://schemas.microsoft.com/office/drawing/2017/decorative" xmlns="" val="1"/>
+                <adec:decorative xmlns="" xmlns:adec="http://schemas.microsoft.com/office/drawing/2017/decorative" val="1"/>
               </a:ext>
             </a:extLst>
           </p:cNvPr>
@@ -15593,7 +16815,7 @@
           <p:nvPr>
             <p:extLst>
               <p:ext uri="{386F3935-93C4-4BCD-93E2-E3B085C9AB24}">
-                <p16:designElem xmlns:p16="http://schemas.microsoft.com/office/powerpoint/2015/main" xmlns="" val="1"/>
+                <p16:designElem xmlns="" xmlns:p16="http://schemas.microsoft.com/office/powerpoint/2015/main" val="1"/>
               </p:ext>
             </p:extLst>
           </p:nvPr>
@@ -15640,10 +16862,10 @@
           <p:cNvPr id="38" name="Rectangle 37">
             <a:extLst>
               <a:ext uri="{FF2B5EF4-FFF2-40B4-BE49-F238E27FC236}">
-                <a16:creationId xmlns:a16="http://schemas.microsoft.com/office/drawing/2014/main" xmlns="" id="{A8074621-AE44-40C4-8323-DF5185BC954E}"/>
+                <a16:creationId xmlns="" xmlns:a16="http://schemas.microsoft.com/office/drawing/2014/main" id="{A8074621-AE44-40C4-8323-DF5185BC954E}"/>
               </a:ext>
               <a:ext uri="{C183D7F6-B498-43B3-948B-1728B52AA6E4}">
-                <adec:decorative xmlns:adec="http://schemas.microsoft.com/office/drawing/2017/decorative" xmlns="" val="1"/>
+                <adec:decorative xmlns="" xmlns:adec="http://schemas.microsoft.com/office/drawing/2017/decorative" val="1"/>
               </a:ext>
             </a:extLst>
           </p:cNvPr>
@@ -15653,7 +16875,7 @@
           <p:nvPr>
             <p:extLst>
               <p:ext uri="{386F3935-93C4-4BCD-93E2-E3B085C9AB24}">
-                <p16:designElem xmlns:p16="http://schemas.microsoft.com/office/powerpoint/2015/main" xmlns="" val="1"/>
+                <p16:designElem xmlns="" xmlns:p16="http://schemas.microsoft.com/office/powerpoint/2015/main" val="1"/>
               </p:ext>
             </p:extLst>
           </p:nvPr>
@@ -15705,7 +16927,7 @@
           <p:cNvPr id="2" name="Title 1">
             <a:extLst>
               <a:ext uri="{FF2B5EF4-FFF2-40B4-BE49-F238E27FC236}">
-                <a16:creationId xmlns:a16="http://schemas.microsoft.com/office/drawing/2014/main" xmlns="" id="{98665829-B67C-1898-629C-AC1781FAF9BD}"/>
+                <a16:creationId xmlns="" xmlns:a16="http://schemas.microsoft.com/office/drawing/2014/main" id="{98665829-B67C-1898-629C-AC1781FAF9BD}"/>
               </a:ext>
             </a:extLst>
           </p:cNvPr>
@@ -15784,7 +17006,7 @@
                           <m:fPr>
                             <m:ctrlPr>
                               <a:rPr lang="en-CA" sz="2400" i="1" smtClean="0">
-                                <a:latin typeface="Cambria Math" panose="02040503050406030204" pitchFamily="18" charset="0"/>
+                                <a:latin typeface="Cambria Math"/>
                               </a:rPr>
                             </m:ctrlPr>
                           </m:fPr>
@@ -15834,7 +17056,7 @@
                           <m:dPr>
                             <m:ctrlPr>
                               <a:rPr lang="en-US" sz="2400" b="0" i="1" smtClean="0">
-                                <a:latin typeface="Cambria Math" panose="02040503050406030204" pitchFamily="18" charset="0"/>
+                                <a:latin typeface="Cambria Math"/>
                                 <a:ea typeface="Cambria Math" panose="02040503050406030204" pitchFamily="18" charset="0"/>
                               </a:rPr>
                             </m:ctrlPr>
@@ -15896,7 +17118,7 @@
                           <m:fPr>
                             <m:ctrlPr>
                               <a:rPr lang="en-CA" sz="2400" i="1" smtClean="0">
-                                <a:latin typeface="Cambria Math" panose="02040503050406030204" pitchFamily="18" charset="0"/>
+                                <a:latin typeface="Cambria Math"/>
                               </a:rPr>
                             </m:ctrlPr>
                           </m:fPr>
@@ -16010,7 +17232,7 @@
                           <m:fPr>
                             <m:ctrlPr>
                               <a:rPr lang="en-CA" sz="2400" b="0" i="1" smtClean="0">
-                                <a:latin typeface="Cambria Math" panose="02040503050406030204" pitchFamily="18" charset="0"/>
+                                <a:latin typeface="Cambria Math"/>
                               </a:rPr>
                             </m:ctrlPr>
                           </m:fPr>
@@ -16124,7 +17346,7 @@
                           <m:dPr>
                             <m:ctrlPr>
                               <a:rPr lang="en-US" sz="2400" b="0" i="1" smtClean="0">
-                                <a:latin typeface="Cambria Math" panose="02040503050406030204" pitchFamily="18" charset="0"/>
+                                <a:latin typeface="Cambria Math"/>
                                 <a:ea typeface="Cambria Math" panose="02040503050406030204" pitchFamily="18" charset="0"/>
                               </a:rPr>
                             </m:ctrlPr>
@@ -16460,10 +17682,10 @@
           <p:cNvPr id="36" name="Rectangle 35">
             <a:extLst>
               <a:ext uri="{FF2B5EF4-FFF2-40B4-BE49-F238E27FC236}">
-                <a16:creationId xmlns:a16="http://schemas.microsoft.com/office/drawing/2014/main" xmlns="" id="{8BCFA5F4-1A8E-48F5-9209-7F24485B1D78}"/>
+                <a16:creationId xmlns="" xmlns:a16="http://schemas.microsoft.com/office/drawing/2014/main" id="{8BCFA5F4-1A8E-48F5-9209-7F24485B1D78}"/>
               </a:ext>
               <a:ext uri="{C183D7F6-B498-43B3-948B-1728B52AA6E4}">
-                <adec:decorative xmlns:adec="http://schemas.microsoft.com/office/drawing/2017/decorative" xmlns="" val="1"/>
+                <adec:decorative xmlns="" xmlns:adec="http://schemas.microsoft.com/office/drawing/2017/decorative" val="1"/>
               </a:ext>
             </a:extLst>
           </p:cNvPr>
@@ -16473,7 +17695,7 @@
           <p:nvPr>
             <p:extLst>
               <p:ext uri="{386F3935-93C4-4BCD-93E2-E3B085C9AB24}">
-                <p16:designElem xmlns:p16="http://schemas.microsoft.com/office/powerpoint/2015/main" xmlns="" val="1"/>
+                <p16:designElem xmlns="" xmlns:p16="http://schemas.microsoft.com/office/powerpoint/2015/main" val="1"/>
               </p:ext>
             </p:extLst>
           </p:nvPr>
@@ -16520,10 +17742,10 @@
           <p:cNvPr id="38" name="Rectangle 37">
             <a:extLst>
               <a:ext uri="{FF2B5EF4-FFF2-40B4-BE49-F238E27FC236}">
-                <a16:creationId xmlns:a16="http://schemas.microsoft.com/office/drawing/2014/main" xmlns="" id="{A8074621-AE44-40C4-8323-DF5185BC954E}"/>
+                <a16:creationId xmlns="" xmlns:a16="http://schemas.microsoft.com/office/drawing/2014/main" id="{A8074621-AE44-40C4-8323-DF5185BC954E}"/>
               </a:ext>
               <a:ext uri="{C183D7F6-B498-43B3-948B-1728B52AA6E4}">
-                <adec:decorative xmlns:adec="http://schemas.microsoft.com/office/drawing/2017/decorative" xmlns="" val="1"/>
+                <adec:decorative xmlns="" xmlns:adec="http://schemas.microsoft.com/office/drawing/2017/decorative" val="1"/>
               </a:ext>
             </a:extLst>
           </p:cNvPr>
@@ -16533,7 +17755,7 @@
           <p:nvPr>
             <p:extLst>
               <p:ext uri="{386F3935-93C4-4BCD-93E2-E3B085C9AB24}">
-                <p16:designElem xmlns:p16="http://schemas.microsoft.com/office/powerpoint/2015/main" xmlns="" val="1"/>
+                <p16:designElem xmlns="" xmlns:p16="http://schemas.microsoft.com/office/powerpoint/2015/main" val="1"/>
               </p:ext>
             </p:extLst>
           </p:nvPr>
@@ -16585,7 +17807,7 @@
           <p:cNvPr id="2" name="Title 1">
             <a:extLst>
               <a:ext uri="{FF2B5EF4-FFF2-40B4-BE49-F238E27FC236}">
-                <a16:creationId xmlns:a16="http://schemas.microsoft.com/office/drawing/2014/main" xmlns="" id="{98665829-B67C-1898-629C-AC1781FAF9BD}"/>
+                <a16:creationId xmlns="" xmlns:a16="http://schemas.microsoft.com/office/drawing/2014/main" id="{98665829-B67C-1898-629C-AC1781FAF9BD}"/>
               </a:ext>
             </a:extLst>
           </p:cNvPr>
@@ -16673,10 +17895,10 @@
           <p:cNvPr id="36" name="Rectangle 35">
             <a:extLst>
               <a:ext uri="{FF2B5EF4-FFF2-40B4-BE49-F238E27FC236}">
-                <a16:creationId xmlns:a16="http://schemas.microsoft.com/office/drawing/2014/main" xmlns="" id="{8BCFA5F4-1A8E-48F5-9209-7F24485B1D78}"/>
+                <a16:creationId xmlns="" xmlns:a16="http://schemas.microsoft.com/office/drawing/2014/main" id="{8BCFA5F4-1A8E-48F5-9209-7F24485B1D78}"/>
               </a:ext>
               <a:ext uri="{C183D7F6-B498-43B3-948B-1728B52AA6E4}">
-                <adec:decorative xmlns:adec="http://schemas.microsoft.com/office/drawing/2017/decorative" xmlns="" val="1"/>
+                <adec:decorative xmlns="" xmlns:adec="http://schemas.microsoft.com/office/drawing/2017/decorative" val="1"/>
               </a:ext>
             </a:extLst>
           </p:cNvPr>
@@ -16686,7 +17908,7 @@
           <p:nvPr>
             <p:extLst>
               <p:ext uri="{386F3935-93C4-4BCD-93E2-E3B085C9AB24}">
-                <p16:designElem xmlns:p16="http://schemas.microsoft.com/office/powerpoint/2015/main" xmlns="" val="1"/>
+                <p16:designElem xmlns="" xmlns:p16="http://schemas.microsoft.com/office/powerpoint/2015/main" val="1"/>
               </p:ext>
             </p:extLst>
           </p:nvPr>
@@ -16733,10 +17955,10 @@
           <p:cNvPr id="38" name="Rectangle 37">
             <a:extLst>
               <a:ext uri="{FF2B5EF4-FFF2-40B4-BE49-F238E27FC236}">
-                <a16:creationId xmlns:a16="http://schemas.microsoft.com/office/drawing/2014/main" xmlns="" id="{A8074621-AE44-40C4-8323-DF5185BC954E}"/>
+                <a16:creationId xmlns="" xmlns:a16="http://schemas.microsoft.com/office/drawing/2014/main" id="{A8074621-AE44-40C4-8323-DF5185BC954E}"/>
               </a:ext>
               <a:ext uri="{C183D7F6-B498-43B3-948B-1728B52AA6E4}">
-                <adec:decorative xmlns:adec="http://schemas.microsoft.com/office/drawing/2017/decorative" xmlns="" val="1"/>
+                <adec:decorative xmlns="" xmlns:adec="http://schemas.microsoft.com/office/drawing/2017/decorative" val="1"/>
               </a:ext>
             </a:extLst>
           </p:cNvPr>
@@ -16746,7 +17968,7 @@
           <p:nvPr>
             <p:extLst>
               <p:ext uri="{386F3935-93C4-4BCD-93E2-E3B085C9AB24}">
-                <p16:designElem xmlns:p16="http://schemas.microsoft.com/office/powerpoint/2015/main" xmlns="" val="1"/>
+                <p16:designElem xmlns="" xmlns:p16="http://schemas.microsoft.com/office/powerpoint/2015/main" val="1"/>
               </p:ext>
             </p:extLst>
           </p:nvPr>
@@ -16798,7 +18020,7 @@
           <p:cNvPr id="2" name="Title 1">
             <a:extLst>
               <a:ext uri="{FF2B5EF4-FFF2-40B4-BE49-F238E27FC236}">
-                <a16:creationId xmlns:a16="http://schemas.microsoft.com/office/drawing/2014/main" xmlns="" id="{98665829-B67C-1898-629C-AC1781FAF9BD}"/>
+                <a16:creationId xmlns="" xmlns:a16="http://schemas.microsoft.com/office/drawing/2014/main" id="{98665829-B67C-1898-629C-AC1781FAF9BD}"/>
               </a:ext>
             </a:extLst>
           </p:cNvPr>
@@ -16886,10 +18108,10 @@
           <p:cNvPr id="36" name="Rectangle 35">
             <a:extLst>
               <a:ext uri="{FF2B5EF4-FFF2-40B4-BE49-F238E27FC236}">
-                <a16:creationId xmlns:a16="http://schemas.microsoft.com/office/drawing/2014/main" xmlns="" id="{8BCFA5F4-1A8E-48F5-9209-7F24485B1D78}"/>
+                <a16:creationId xmlns="" xmlns:a16="http://schemas.microsoft.com/office/drawing/2014/main" id="{8BCFA5F4-1A8E-48F5-9209-7F24485B1D78}"/>
               </a:ext>
               <a:ext uri="{C183D7F6-B498-43B3-948B-1728B52AA6E4}">
-                <adec:decorative xmlns:adec="http://schemas.microsoft.com/office/drawing/2017/decorative" xmlns="" val="1"/>
+                <adec:decorative xmlns="" xmlns:adec="http://schemas.microsoft.com/office/drawing/2017/decorative" val="1"/>
               </a:ext>
             </a:extLst>
           </p:cNvPr>
@@ -16899,7 +18121,7 @@
           <p:nvPr>
             <p:extLst>
               <p:ext uri="{386F3935-93C4-4BCD-93E2-E3B085C9AB24}">
-                <p16:designElem xmlns:p16="http://schemas.microsoft.com/office/powerpoint/2015/main" xmlns="" val="1"/>
+                <p16:designElem xmlns="" xmlns:p16="http://schemas.microsoft.com/office/powerpoint/2015/main" val="1"/>
               </p:ext>
             </p:extLst>
           </p:nvPr>
@@ -16946,10 +18168,10 @@
           <p:cNvPr id="38" name="Rectangle 37">
             <a:extLst>
               <a:ext uri="{FF2B5EF4-FFF2-40B4-BE49-F238E27FC236}">
-                <a16:creationId xmlns:a16="http://schemas.microsoft.com/office/drawing/2014/main" xmlns="" id="{A8074621-AE44-40C4-8323-DF5185BC954E}"/>
+                <a16:creationId xmlns="" xmlns:a16="http://schemas.microsoft.com/office/drawing/2014/main" id="{A8074621-AE44-40C4-8323-DF5185BC954E}"/>
               </a:ext>
               <a:ext uri="{C183D7F6-B498-43B3-948B-1728B52AA6E4}">
-                <adec:decorative xmlns:adec="http://schemas.microsoft.com/office/drawing/2017/decorative" xmlns="" val="1"/>
+                <adec:decorative xmlns="" xmlns:adec="http://schemas.microsoft.com/office/drawing/2017/decorative" val="1"/>
               </a:ext>
             </a:extLst>
           </p:cNvPr>
@@ -16959,7 +18181,7 @@
           <p:nvPr>
             <p:extLst>
               <p:ext uri="{386F3935-93C4-4BCD-93E2-E3B085C9AB24}">
-                <p16:designElem xmlns:p16="http://schemas.microsoft.com/office/powerpoint/2015/main" xmlns="" val="1"/>
+                <p16:designElem xmlns="" xmlns:p16="http://schemas.microsoft.com/office/powerpoint/2015/main" val="1"/>
               </p:ext>
             </p:extLst>
           </p:nvPr>
@@ -17011,7 +18233,7 @@
           <p:cNvPr id="2" name="Title 1">
             <a:extLst>
               <a:ext uri="{FF2B5EF4-FFF2-40B4-BE49-F238E27FC236}">
-                <a16:creationId xmlns:a16="http://schemas.microsoft.com/office/drawing/2014/main" xmlns="" id="{98665829-B67C-1898-629C-AC1781FAF9BD}"/>
+                <a16:creationId xmlns="" xmlns:a16="http://schemas.microsoft.com/office/drawing/2014/main" id="{98665829-B67C-1898-629C-AC1781FAF9BD}"/>
               </a:ext>
             </a:extLst>
           </p:cNvPr>
@@ -17037,8 +18259,8 @@
           </a:p>
         </p:txBody>
       </p:sp>
-      <mc:AlternateContent xmlns:mc="http://schemas.openxmlformats.org/markup-compatibility/2006">
-        <mc:Choice xmlns:a14="http://schemas.microsoft.com/office/drawing/2010/main" Requires="a14">
+      <mc:AlternateContent xmlns:mc="http://schemas.openxmlformats.org/markup-compatibility/2006" xmlns:a14="http://schemas.microsoft.com/office/drawing/2010/main">
+        <mc:Choice Requires="a14">
           <p:sp>
             <p:nvSpPr>
               <p:cNvPr id="4" name="Content Placeholder 3"/>
@@ -17068,7 +18290,7 @@
                           <m:ctrlPr>
                             <a:rPr lang="en-CA" i="1" smtClean="0">
                               <a:effectLst/>
-                              <a:latin typeface="Cambria Math" panose="02040503050406030204" pitchFamily="18" charset="0"/>
+                              <a:latin typeface="Cambria Math"/>
                             </a:rPr>
                           </m:ctrlPr>
                         </m:fPr>
@@ -17111,7 +18333,7 @@
                           <m:ctrlPr>
                             <a:rPr lang="en-US" b="0" i="1" smtClean="0">
                               <a:effectLst/>
-                              <a:latin typeface="Cambria Math" panose="02040503050406030204" pitchFamily="18" charset="0"/>
+                              <a:latin typeface="Cambria Math"/>
                               <a:ea typeface="Cambria Math" panose="02040503050406030204" pitchFamily="18" charset="0"/>
                             </a:rPr>
                           </m:ctrlPr>
@@ -17154,7 +18376,7 @@
                               <m:ctrlPr>
                                 <a:rPr lang="en-US" b="0" i="1" smtClean="0">
                                   <a:effectLst/>
-                                  <a:latin typeface="Cambria Math" panose="02040503050406030204" pitchFamily="18" charset="0"/>
+                                  <a:latin typeface="Cambria Math"/>
                                   <a:ea typeface="Cambria Math" panose="02040503050406030204" pitchFamily="18" charset="0"/>
                                 </a:rPr>
                               </m:ctrlPr>
@@ -17276,7 +18498,7 @@
                           <m:ctrlPr>
                             <a:rPr lang="en-CA" i="1" smtClean="0">
                               <a:effectLst/>
-                              <a:latin typeface="Cambria Math" panose="02040503050406030204" pitchFamily="18" charset="0"/>
+                              <a:latin typeface="Cambria Math"/>
                             </a:rPr>
                           </m:ctrlPr>
                         </m:fPr>
@@ -17319,7 +18541,7 @@
                           <m:ctrlPr>
                             <a:rPr lang="en-US" i="1">
                               <a:effectLst/>
-                              <a:latin typeface="Cambria Math" panose="02040503050406030204" pitchFamily="18" charset="0"/>
+                              <a:latin typeface="Cambria Math"/>
                               <a:ea typeface="Cambria Math" panose="02040503050406030204" pitchFamily="18" charset="0"/>
                             </a:rPr>
                           </m:ctrlPr>
@@ -17338,7 +18560,7 @@
                               <m:ctrlPr>
                                 <a:rPr lang="en-US" i="1">
                                   <a:effectLst/>
-                                  <a:latin typeface="Cambria Math" panose="02040503050406030204" pitchFamily="18" charset="0"/>
+                                  <a:latin typeface="Cambria Math"/>
                                   <a:ea typeface="Cambria Math" panose="02040503050406030204" pitchFamily="18" charset="0"/>
                                 </a:rPr>
                               </m:ctrlPr>
@@ -17365,7 +18587,7 @@
                                   <m:ctrlPr>
                                     <a:rPr lang="en-US" b="0" i="1" smtClean="0">
                                       <a:effectLst/>
-                                      <a:latin typeface="Cambria Math" panose="02040503050406030204" pitchFamily="18" charset="0"/>
+                                      <a:latin typeface="Cambria Math"/>
                                       <a:ea typeface="Cambria Math" panose="02040503050406030204" pitchFamily="18" charset="0"/>
                                     </a:rPr>
                                   </m:ctrlPr>
@@ -17408,7 +18630,7 @@
                           <m:ctrlPr>
                             <a:rPr lang="en-US" i="1">
                               <a:effectLst/>
-                              <a:latin typeface="Cambria Math" panose="02040503050406030204" pitchFamily="18" charset="0"/>
+                              <a:latin typeface="Cambria Math"/>
                               <a:ea typeface="Cambria Math" panose="02040503050406030204" pitchFamily="18" charset="0"/>
                             </a:rPr>
                           </m:ctrlPr>
@@ -17437,7 +18659,7 @@
                           <m:ctrlPr>
                             <a:rPr lang="en-US" i="1">
                               <a:effectLst/>
-                              <a:latin typeface="Cambria Math" panose="02040503050406030204" pitchFamily="18" charset="0"/>
+                              <a:latin typeface="Cambria Math"/>
                               <a:ea typeface="Cambria Math" panose="02040503050406030204" pitchFamily="18" charset="0"/>
                             </a:rPr>
                           </m:ctrlPr>
@@ -17523,7 +18745,7 @@
                           <m:ctrlPr>
                             <a:rPr lang="en-CA" i="1" smtClean="0">
                               <a:effectLst/>
-                              <a:latin typeface="Cambria Math" panose="02040503050406030204" pitchFamily="18" charset="0"/>
+                              <a:latin typeface="Cambria Math"/>
                             </a:rPr>
                           </m:ctrlPr>
                         </m:fPr>
@@ -17579,7 +18801,7 @@
                           <m:ctrlPr>
                             <a:rPr lang="en-US" b="0" i="1" smtClean="0">
                               <a:effectLst/>
-                              <a:latin typeface="Cambria Math" panose="02040503050406030204" pitchFamily="18" charset="0"/>
+                              <a:latin typeface="Cambria Math"/>
                             </a:rPr>
                           </m:ctrlPr>
                         </m:dPr>
@@ -17612,7 +18834,7 @@
                           <m:ctrlPr>
                             <a:rPr lang="en-US" b="0" i="1" smtClean="0">
                               <a:effectLst/>
-                              <a:latin typeface="Cambria Math" panose="02040503050406030204" pitchFamily="18" charset="0"/>
+                              <a:latin typeface="Cambria Math"/>
                             </a:rPr>
                           </m:ctrlPr>
                         </m:dPr>
@@ -17636,7 +18858,7 @@
                               <m:ctrlPr>
                                 <a:rPr lang="en-US" b="0" i="1" smtClean="0">
                                   <a:effectLst/>
-                                  <a:latin typeface="Cambria Math" panose="02040503050406030204" pitchFamily="18" charset="0"/>
+                                  <a:latin typeface="Cambria Math"/>
                                 </a:rPr>
                               </m:ctrlPr>
                             </m:sSubPr>
@@ -17690,7 +18912,7 @@
                           <m:ctrlPr>
                             <a:rPr lang="en-US" i="1">
                               <a:effectLst/>
-                              <a:latin typeface="Cambria Math" panose="02040503050406030204" pitchFamily="18" charset="0"/>
+                              <a:latin typeface="Cambria Math"/>
                             </a:rPr>
                           </m:ctrlPr>
                         </m:dPr>
@@ -17714,7 +18936,7 @@
                               <m:ctrlPr>
                                 <a:rPr lang="en-US" i="1">
                                   <a:effectLst/>
-                                  <a:latin typeface="Cambria Math" panose="02040503050406030204" pitchFamily="18" charset="0"/>
+                                  <a:latin typeface="Cambria Math"/>
                                 </a:rPr>
                               </m:ctrlPr>
                             </m:sSubPr>
@@ -17807,7 +19029,7 @@
                         <m:ctrlPr>
                           <a:rPr lang="en-US" b="0" i="1" smtClean="0">
                             <a:effectLst/>
-                            <a:latin typeface="Cambria Math" panose="02040503050406030204" pitchFamily="18" charset="0"/>
+                            <a:latin typeface="Cambria Math"/>
                             <a:ea typeface="Cambria Math" panose="02040503050406030204" pitchFamily="18" charset="0"/>
                           </a:rPr>
                         </m:ctrlPr>
@@ -17843,7 +19065,7 @@
                         <m:ctrlPr>
                           <a:rPr lang="en-US" i="1">
                             <a:effectLst/>
-                            <a:latin typeface="Cambria Math" panose="02040503050406030204" pitchFamily="18" charset="0"/>
+                            <a:latin typeface="Cambria Math"/>
                           </a:rPr>
                         </m:ctrlPr>
                       </m:dPr>
@@ -17876,7 +19098,7 @@
                         <m:ctrlPr>
                           <a:rPr lang="en-US" i="1">
                             <a:effectLst/>
-                            <a:latin typeface="Cambria Math" panose="02040503050406030204" pitchFamily="18" charset="0"/>
+                            <a:latin typeface="Cambria Math"/>
                           </a:rPr>
                         </m:ctrlPr>
                       </m:dPr>
@@ -17906,7 +19128,7 @@
             </p:txBody>
           </p:sp>
         </mc:Choice>
-        <mc:Fallback>
+        <mc:Fallback xmlns="">
           <p:sp>
             <p:nvSpPr>
               <p:cNvPr id="4" name="Content Placeholder 3"/>
@@ -17983,10 +19205,10 @@
           <p:cNvPr id="36" name="Rectangle 35">
             <a:extLst>
               <a:ext uri="{FF2B5EF4-FFF2-40B4-BE49-F238E27FC236}">
-                <a16:creationId xmlns:a16="http://schemas.microsoft.com/office/drawing/2014/main" xmlns="" id="{8BCFA5F4-1A8E-48F5-9209-7F24485B1D78}"/>
+                <a16:creationId xmlns="" xmlns:a16="http://schemas.microsoft.com/office/drawing/2014/main" id="{8BCFA5F4-1A8E-48F5-9209-7F24485B1D78}"/>
               </a:ext>
               <a:ext uri="{C183D7F6-B498-43B3-948B-1728B52AA6E4}">
-                <adec:decorative xmlns:adec="http://schemas.microsoft.com/office/drawing/2017/decorative" xmlns="" val="1"/>
+                <adec:decorative xmlns="" xmlns:adec="http://schemas.microsoft.com/office/drawing/2017/decorative" val="1"/>
               </a:ext>
             </a:extLst>
           </p:cNvPr>
@@ -17996,7 +19218,7 @@
           <p:nvPr>
             <p:extLst>
               <p:ext uri="{386F3935-93C4-4BCD-93E2-E3B085C9AB24}">
-                <p16:designElem xmlns:p16="http://schemas.microsoft.com/office/powerpoint/2015/main" xmlns="" val="1"/>
+                <p16:designElem xmlns="" xmlns:p16="http://schemas.microsoft.com/office/powerpoint/2015/main" val="1"/>
               </p:ext>
             </p:extLst>
           </p:nvPr>
@@ -18039,10 +19261,10 @@
           <p:cNvPr id="38" name="Rectangle 37">
             <a:extLst>
               <a:ext uri="{FF2B5EF4-FFF2-40B4-BE49-F238E27FC236}">
-                <a16:creationId xmlns:a16="http://schemas.microsoft.com/office/drawing/2014/main" xmlns="" id="{A8074621-AE44-40C4-8323-DF5185BC954E}"/>
+                <a16:creationId xmlns="" xmlns:a16="http://schemas.microsoft.com/office/drawing/2014/main" id="{A8074621-AE44-40C4-8323-DF5185BC954E}"/>
               </a:ext>
               <a:ext uri="{C183D7F6-B498-43B3-948B-1728B52AA6E4}">
-                <adec:decorative xmlns:adec="http://schemas.microsoft.com/office/drawing/2017/decorative" xmlns="" val="1"/>
+                <adec:decorative xmlns="" xmlns:adec="http://schemas.microsoft.com/office/drawing/2017/decorative" val="1"/>
               </a:ext>
             </a:extLst>
           </p:cNvPr>
@@ -18052,7 +19274,7 @@
           <p:nvPr>
             <p:extLst>
               <p:ext uri="{386F3935-93C4-4BCD-93E2-E3B085C9AB24}">
-                <p16:designElem xmlns:p16="http://schemas.microsoft.com/office/powerpoint/2015/main" xmlns="" val="1"/>
+                <p16:designElem xmlns="" xmlns:p16="http://schemas.microsoft.com/office/powerpoint/2015/main" val="1"/>
               </p:ext>
             </p:extLst>
           </p:nvPr>
@@ -18104,7 +19326,7 @@
           <p:cNvPr id="2" name="Title 1">
             <a:extLst>
               <a:ext uri="{FF2B5EF4-FFF2-40B4-BE49-F238E27FC236}">
-                <a16:creationId xmlns:a16="http://schemas.microsoft.com/office/drawing/2014/main" xmlns="" id="{98665829-B67C-1898-629C-AC1781FAF9BD}"/>
+                <a16:creationId xmlns="" xmlns:a16="http://schemas.microsoft.com/office/drawing/2014/main" id="{98665829-B67C-1898-629C-AC1781FAF9BD}"/>
               </a:ext>
             </a:extLst>
           </p:cNvPr>
@@ -19100,10 +20322,10 @@
           <p:cNvPr id="36" name="Rectangle 35">
             <a:extLst>
               <a:ext uri="{FF2B5EF4-FFF2-40B4-BE49-F238E27FC236}">
-                <a16:creationId xmlns:a16="http://schemas.microsoft.com/office/drawing/2014/main" xmlns="" id="{8BCFA5F4-1A8E-48F5-9209-7F24485B1D78}"/>
+                <a16:creationId xmlns="" xmlns:a16="http://schemas.microsoft.com/office/drawing/2014/main" id="{8BCFA5F4-1A8E-48F5-9209-7F24485B1D78}"/>
               </a:ext>
               <a:ext uri="{C183D7F6-B498-43B3-948B-1728B52AA6E4}">
-                <adec:decorative xmlns:adec="http://schemas.microsoft.com/office/drawing/2017/decorative" xmlns="" val="1"/>
+                <adec:decorative xmlns="" xmlns:adec="http://schemas.microsoft.com/office/drawing/2017/decorative" val="1"/>
               </a:ext>
             </a:extLst>
           </p:cNvPr>
@@ -19113,7 +20335,7 @@
           <p:nvPr>
             <p:extLst>
               <p:ext uri="{386F3935-93C4-4BCD-93E2-E3B085C9AB24}">
-                <p16:designElem xmlns:p16="http://schemas.microsoft.com/office/powerpoint/2015/main" xmlns="" val="1"/>
+                <p16:designElem xmlns="" xmlns:p16="http://schemas.microsoft.com/office/powerpoint/2015/main" val="1"/>
               </p:ext>
             </p:extLst>
           </p:nvPr>
@@ -19160,10 +20382,10 @@
           <p:cNvPr id="38" name="Rectangle 37">
             <a:extLst>
               <a:ext uri="{FF2B5EF4-FFF2-40B4-BE49-F238E27FC236}">
-                <a16:creationId xmlns:a16="http://schemas.microsoft.com/office/drawing/2014/main" xmlns="" id="{A8074621-AE44-40C4-8323-DF5185BC954E}"/>
+                <a16:creationId xmlns="" xmlns:a16="http://schemas.microsoft.com/office/drawing/2014/main" id="{A8074621-AE44-40C4-8323-DF5185BC954E}"/>
               </a:ext>
               <a:ext uri="{C183D7F6-B498-43B3-948B-1728B52AA6E4}">
-                <adec:decorative xmlns:adec="http://schemas.microsoft.com/office/drawing/2017/decorative" xmlns="" val="1"/>
+                <adec:decorative xmlns="" xmlns:adec="http://schemas.microsoft.com/office/drawing/2017/decorative" val="1"/>
               </a:ext>
             </a:extLst>
           </p:cNvPr>
@@ -19173,7 +20395,7 @@
           <p:nvPr>
             <p:extLst>
               <p:ext uri="{386F3935-93C4-4BCD-93E2-E3B085C9AB24}">
-                <p16:designElem xmlns:p16="http://schemas.microsoft.com/office/powerpoint/2015/main" xmlns="" val="1"/>
+                <p16:designElem xmlns="" xmlns:p16="http://schemas.microsoft.com/office/powerpoint/2015/main" val="1"/>
               </p:ext>
             </p:extLst>
           </p:nvPr>
@@ -19225,7 +20447,7 @@
           <p:cNvPr id="2" name="Title 1">
             <a:extLst>
               <a:ext uri="{FF2B5EF4-FFF2-40B4-BE49-F238E27FC236}">
-                <a16:creationId xmlns:a16="http://schemas.microsoft.com/office/drawing/2014/main" xmlns="" id="{98665829-B67C-1898-629C-AC1781FAF9BD}"/>
+                <a16:creationId xmlns="" xmlns:a16="http://schemas.microsoft.com/office/drawing/2014/main" id="{98665829-B67C-1898-629C-AC1781FAF9BD}"/>
               </a:ext>
             </a:extLst>
           </p:cNvPr>
@@ -19268,13 +20490,20 @@
           </a:xfrm>
         </p:spPr>
         <p:txBody>
-          <a:bodyPr/>
+          <a:bodyPr>
+            <a:normAutofit lnSpcReduction="10000"/>
+          </a:bodyPr>
           <a:lstStyle/>
           <a:p>
             <a:r>
               <a:rPr lang="en-US" cap="none" dirty="0" smtClean="0"/>
-              <a:t>Negative above baseline and positive below when infections are low</a:t>
+              <a:t>Negative above baseline and positive below </a:t>
             </a:r>
+            <a:r>
+              <a:rPr lang="en-US" cap="none" dirty="0" smtClean="0"/>
+              <a:t>in absence of infection</a:t>
+            </a:r>
+            <a:endParaRPr lang="en-US" cap="none" dirty="0" smtClean="0"/>
           </a:p>
           <a:p>
             <a:r>
@@ -19285,7 +20514,11 @@
           <a:p>
             <a:r>
               <a:rPr lang="en-US" cap="none" dirty="0" smtClean="0"/>
-              <a:t>Monotonic decreasing in I and </a:t>
+              <a:t>Monotonic decreasing </a:t>
+            </a:r>
+            <a:r>
+              <a:rPr lang="en-US" cap="none" dirty="0" smtClean="0"/>
+              <a:t>in I and </a:t>
             </a:r>
             <a:r>
               <a:rPr lang="el-GR" cap="none" dirty="0" smtClean="0">
@@ -20559,10 +21792,10 @@
           <p:cNvPr id="36" name="Rectangle 35">
             <a:extLst>
               <a:ext uri="{FF2B5EF4-FFF2-40B4-BE49-F238E27FC236}">
-                <a16:creationId xmlns:a16="http://schemas.microsoft.com/office/drawing/2014/main" xmlns="" id="{8BCFA5F4-1A8E-48F5-9209-7F24485B1D78}"/>
+                <a16:creationId xmlns="" xmlns:a16="http://schemas.microsoft.com/office/drawing/2014/main" id="{8BCFA5F4-1A8E-48F5-9209-7F24485B1D78}"/>
               </a:ext>
               <a:ext uri="{C183D7F6-B498-43B3-948B-1728B52AA6E4}">
-                <adec:decorative xmlns:adec="http://schemas.microsoft.com/office/drawing/2017/decorative" xmlns="" val="1"/>
+                <adec:decorative xmlns="" xmlns:adec="http://schemas.microsoft.com/office/drawing/2017/decorative" val="1"/>
               </a:ext>
             </a:extLst>
           </p:cNvPr>
@@ -20572,7 +21805,7 @@
           <p:nvPr>
             <p:extLst>
               <p:ext uri="{386F3935-93C4-4BCD-93E2-E3B085C9AB24}">
-                <p16:designElem xmlns:p16="http://schemas.microsoft.com/office/powerpoint/2015/main" xmlns="" val="1"/>
+                <p16:designElem xmlns="" xmlns:p16="http://schemas.microsoft.com/office/powerpoint/2015/main" val="1"/>
               </p:ext>
             </p:extLst>
           </p:nvPr>
@@ -20619,10 +21852,10 @@
           <p:cNvPr id="38" name="Rectangle 37">
             <a:extLst>
               <a:ext uri="{FF2B5EF4-FFF2-40B4-BE49-F238E27FC236}">
-                <a16:creationId xmlns:a16="http://schemas.microsoft.com/office/drawing/2014/main" xmlns="" id="{A8074621-AE44-40C4-8323-DF5185BC954E}"/>
+                <a16:creationId xmlns="" xmlns:a16="http://schemas.microsoft.com/office/drawing/2014/main" id="{A8074621-AE44-40C4-8323-DF5185BC954E}"/>
               </a:ext>
               <a:ext uri="{C183D7F6-B498-43B3-948B-1728B52AA6E4}">
-                <adec:decorative xmlns:adec="http://schemas.microsoft.com/office/drawing/2017/decorative" xmlns="" val="1"/>
+                <adec:decorative xmlns="" xmlns:adec="http://schemas.microsoft.com/office/drawing/2017/decorative" val="1"/>
               </a:ext>
             </a:extLst>
           </p:cNvPr>
@@ -20632,7 +21865,7 @@
           <p:nvPr>
             <p:extLst>
               <p:ext uri="{386F3935-93C4-4BCD-93E2-E3B085C9AB24}">
-                <p16:designElem xmlns:p16="http://schemas.microsoft.com/office/powerpoint/2015/main" xmlns="" val="1"/>
+                <p16:designElem xmlns="" xmlns:p16="http://schemas.microsoft.com/office/powerpoint/2015/main" val="1"/>
               </p:ext>
             </p:extLst>
           </p:nvPr>
@@ -20684,7 +21917,7 @@
           <p:cNvPr id="2" name="Title 1">
             <a:extLst>
               <a:ext uri="{FF2B5EF4-FFF2-40B4-BE49-F238E27FC236}">
-                <a16:creationId xmlns:a16="http://schemas.microsoft.com/office/drawing/2014/main" xmlns="" id="{98665829-B67C-1898-629C-AC1781FAF9BD}"/>
+                <a16:creationId xmlns="" xmlns:a16="http://schemas.microsoft.com/office/drawing/2014/main" id="{98665829-B67C-1898-629C-AC1781FAF9BD}"/>
               </a:ext>
             </a:extLst>
           </p:cNvPr>
@@ -21400,7 +22633,7 @@
   <a:extraClrSchemeLst/>
   <a:extLst>
     <a:ext uri="{05A4C25C-085E-4340-85A3-A5531E510DB2}">
-      <thm15:themeFamily xmlns:thm15="http://schemas.microsoft.com/office/thememl/2012/main" name="Mesh" id="{789EC3FE-34FD-429C-9918-760025E6C145}" vid="{B8BE45C0-8141-4D58-8C71-A009BC26FBBB}"/>
+      <thm15:themeFamily xmlns:thm15="http://schemas.microsoft.com/office/thememl/2012/main" xmlns="" name="Mesh" id="{789EC3FE-34FD-429C-9918-760025E6C145}" vid="{B8BE45C0-8141-4D58-8C71-A009BC26FBBB}"/>
     </a:ext>
   </a:extLst>
 </a:theme>
@@ -21664,7 +22897,7 @@
   <a:extraClrSchemeLst/>
   <a:extLst>
     <a:ext uri="{05A4C25C-085E-4340-85A3-A5531E510DB2}">
-      <thm15:themeFamily xmlns:thm15="http://schemas.microsoft.com/office/thememl/2012/main" name="Droplet" id="{8984A317-299A-4E50-B45D-BFC9EDE2337A}" vid="{892FADA9-420D-4323-A7A4-C1060166525B}"/>
+      <thm15:themeFamily xmlns:thm15="http://schemas.microsoft.com/office/thememl/2012/main" xmlns="" name="Droplet" id="{8984A317-299A-4E50-B45D-BFC9EDE2337A}" vid="{892FADA9-420D-4323-A7A4-C1060166525B}"/>
     </a:ext>
   </a:extLst>
 </a:theme>

</xml_diff>